<commit_message>
updated presentations, added all other presentations
</commit_message>
<xml_diff>
--- a/AzureFunctionsV3.pptx
+++ b/AzureFunctionsV3.pptx
@@ -6,20 +6,22 @@
   </p:sldMasterIdLst>
   <p:sldIdLst>
     <p:sldId id="256" r:id="rId2"/>
-    <p:sldId id="267" r:id="rId3"/>
-    <p:sldId id="268" r:id="rId4"/>
-    <p:sldId id="273" r:id="rId5"/>
-    <p:sldId id="258" r:id="rId6"/>
-    <p:sldId id="259" r:id="rId7"/>
-    <p:sldId id="260" r:id="rId8"/>
-    <p:sldId id="261" r:id="rId9"/>
-    <p:sldId id="262" r:id="rId10"/>
-    <p:sldId id="266" r:id="rId11"/>
-    <p:sldId id="269" r:id="rId12"/>
-    <p:sldId id="271" r:id="rId13"/>
-    <p:sldId id="272" r:id="rId14"/>
-    <p:sldId id="270" r:id="rId15"/>
-    <p:sldId id="264" r:id="rId16"/>
+    <p:sldId id="275" r:id="rId3"/>
+    <p:sldId id="274" r:id="rId4"/>
+    <p:sldId id="267" r:id="rId5"/>
+    <p:sldId id="268" r:id="rId6"/>
+    <p:sldId id="273" r:id="rId7"/>
+    <p:sldId id="258" r:id="rId8"/>
+    <p:sldId id="259" r:id="rId9"/>
+    <p:sldId id="260" r:id="rId10"/>
+    <p:sldId id="261" r:id="rId11"/>
+    <p:sldId id="262" r:id="rId12"/>
+    <p:sldId id="266" r:id="rId13"/>
+    <p:sldId id="269" r:id="rId14"/>
+    <p:sldId id="271" r:id="rId15"/>
+    <p:sldId id="272" r:id="rId16"/>
+    <p:sldId id="270" r:id="rId17"/>
+    <p:sldId id="264" r:id="rId18"/>
   </p:sldIdLst>
   <p:sldSz cx="12192000" cy="6858000"/>
   <p:notesSz cx="6858000" cy="9144000"/>
@@ -176,7 +178,7 @@
           <a:noFill/>
           <a:extLst>
             <a:ext uri="{909E8E84-426E-40dd-AFC4-6F175D3DCCD1}">
-              <a14:hiddenFill xmlns="" xmlns:a14="http://schemas.microsoft.com/office/drawing/2010/main">
+              <a14:hiddenFill xmlns:a14="http://schemas.microsoft.com/office/drawing/2010/main" xmlns="">
                 <a:solidFill>
                   <a:srgbClr val="FFFFFF"/>
                 </a:solidFill>
@@ -236,7 +238,7 @@
             </a:ln>
             <a:extLst>
               <a:ext uri="{91240B29-F687-4f45-9708-019B960494DF}">
-                <a14:hiddenLine xmlns="" xmlns:a14="http://schemas.microsoft.com/office/drawing/2010/main" w="9525">
+                <a14:hiddenLine xmlns:a14="http://schemas.microsoft.com/office/drawing/2010/main" xmlns="" w="9525">
                   <a:solidFill>
                     <a:srgbClr val="000000"/>
                   </a:solidFill>
@@ -326,7 +328,7 @@
             </a:ln>
             <a:extLst>
               <a:ext uri="{91240B29-F687-4f45-9708-019B960494DF}">
-                <a14:hiddenLine xmlns="" xmlns:a14="http://schemas.microsoft.com/office/drawing/2010/main" w="9525">
+                <a14:hiddenLine xmlns:a14="http://schemas.microsoft.com/office/drawing/2010/main" xmlns="" w="9525">
                   <a:solidFill>
                     <a:srgbClr val="000000"/>
                   </a:solidFill>
@@ -416,7 +418,7 @@
             </a:ln>
             <a:extLst>
               <a:ext uri="{91240B29-F687-4f45-9708-019B960494DF}">
-                <a14:hiddenLine xmlns="" xmlns:a14="http://schemas.microsoft.com/office/drawing/2010/main" w="9525">
+                <a14:hiddenLine xmlns:a14="http://schemas.microsoft.com/office/drawing/2010/main" xmlns="" w="9525">
                   <a:solidFill>
                     <a:srgbClr val="000000"/>
                   </a:solidFill>
@@ -450,7 +452,7 @@
             </a:ln>
             <a:extLst>
               <a:ext uri="{91240B29-F687-4f45-9708-019B960494DF}">
-                <a14:hiddenLine xmlns="" xmlns:a14="http://schemas.microsoft.com/office/drawing/2010/main" w="9525">
+                <a14:hiddenLine xmlns:a14="http://schemas.microsoft.com/office/drawing/2010/main" xmlns="" w="9525">
                   <a:solidFill>
                     <a:srgbClr val="000000"/>
                   </a:solidFill>
@@ -540,7 +542,7 @@
             </a:ln>
             <a:extLst>
               <a:ext uri="{91240B29-F687-4f45-9708-019B960494DF}">
-                <a14:hiddenLine xmlns="" xmlns:a14="http://schemas.microsoft.com/office/drawing/2010/main" w="9525">
+                <a14:hiddenLine xmlns:a14="http://schemas.microsoft.com/office/drawing/2010/main" xmlns="" w="9525">
                   <a:solidFill>
                     <a:srgbClr val="000000"/>
                   </a:solidFill>
@@ -602,7 +604,7 @@
             </a:ln>
             <a:extLst>
               <a:ext uri="{91240B29-F687-4f45-9708-019B960494DF}">
-                <a14:hiddenLine xmlns="" xmlns:a14="http://schemas.microsoft.com/office/drawing/2010/main" w="9525">
+                <a14:hiddenLine xmlns:a14="http://schemas.microsoft.com/office/drawing/2010/main" xmlns="" w="9525">
                   <a:solidFill>
                     <a:srgbClr val="000000"/>
                   </a:solidFill>
@@ -664,7 +666,7 @@
             </a:ln>
             <a:extLst>
               <a:ext uri="{91240B29-F687-4f45-9708-019B960494DF}">
-                <a14:hiddenLine xmlns="" xmlns:a14="http://schemas.microsoft.com/office/drawing/2010/main" w="9525">
+                <a14:hiddenLine xmlns:a14="http://schemas.microsoft.com/office/drawing/2010/main" xmlns="" w="9525">
                   <a:solidFill>
                     <a:srgbClr val="000000"/>
                   </a:solidFill>
@@ -754,7 +756,7 @@
             </a:ln>
             <a:extLst>
               <a:ext uri="{91240B29-F687-4f45-9708-019B960494DF}">
-                <a14:hiddenLine xmlns="" xmlns:a14="http://schemas.microsoft.com/office/drawing/2010/main" w="9525">
+                <a14:hiddenLine xmlns:a14="http://schemas.microsoft.com/office/drawing/2010/main" xmlns="" w="9525">
                   <a:solidFill>
                     <a:srgbClr val="000000"/>
                   </a:solidFill>
@@ -816,7 +818,7 @@
             </a:ln>
             <a:extLst>
               <a:ext uri="{91240B29-F687-4f45-9708-019B960494DF}">
-                <a14:hiddenLine xmlns="" xmlns:a14="http://schemas.microsoft.com/office/drawing/2010/main" w="9525">
+                <a14:hiddenLine xmlns:a14="http://schemas.microsoft.com/office/drawing/2010/main" xmlns="" w="9525">
                   <a:solidFill>
                     <a:srgbClr val="000000"/>
                   </a:solidFill>
@@ -878,7 +880,7 @@
             </a:ln>
             <a:extLst>
               <a:ext uri="{91240B29-F687-4f45-9708-019B960494DF}">
-                <a14:hiddenLine xmlns="" xmlns:a14="http://schemas.microsoft.com/office/drawing/2010/main" w="9525">
+                <a14:hiddenLine xmlns:a14="http://schemas.microsoft.com/office/drawing/2010/main" xmlns="" w="9525">
                   <a:solidFill>
                     <a:srgbClr val="000000"/>
                   </a:solidFill>
@@ -968,7 +970,7 @@
             </a:ln>
             <a:extLst>
               <a:ext uri="{91240B29-F687-4f45-9708-019B960494DF}">
-                <a14:hiddenLine xmlns="" xmlns:a14="http://schemas.microsoft.com/office/drawing/2010/main" w="9525">
+                <a14:hiddenLine xmlns:a14="http://schemas.microsoft.com/office/drawing/2010/main" xmlns="" w="9525">
                   <a:solidFill>
                     <a:srgbClr val="000000"/>
                   </a:solidFill>
@@ -1058,7 +1060,7 @@
             </a:ln>
             <a:extLst>
               <a:ext uri="{91240B29-F687-4f45-9708-019B960494DF}">
-                <a14:hiddenLine xmlns="" xmlns:a14="http://schemas.microsoft.com/office/drawing/2010/main" w="9525">
+                <a14:hiddenLine xmlns:a14="http://schemas.microsoft.com/office/drawing/2010/main" xmlns="" w="9525">
                   <a:solidFill>
                     <a:srgbClr val="000000"/>
                   </a:solidFill>
@@ -1120,7 +1122,7 @@
             </a:ln>
             <a:extLst>
               <a:ext uri="{91240B29-F687-4f45-9708-019B960494DF}">
-                <a14:hiddenLine xmlns="" xmlns:a14="http://schemas.microsoft.com/office/drawing/2010/main" w="9525">
+                <a14:hiddenLine xmlns:a14="http://schemas.microsoft.com/office/drawing/2010/main" xmlns="" w="9525">
                   <a:solidFill>
                     <a:srgbClr val="000000"/>
                   </a:solidFill>
@@ -1230,7 +1232,7 @@
             </a:ln>
             <a:extLst>
               <a:ext uri="{91240B29-F687-4f45-9708-019B960494DF}">
-                <a14:hiddenLine xmlns="" xmlns:a14="http://schemas.microsoft.com/office/drawing/2010/main" w="9525">
+                <a14:hiddenLine xmlns:a14="http://schemas.microsoft.com/office/drawing/2010/main" xmlns="" w="9525">
                   <a:solidFill>
                     <a:srgbClr val="000000"/>
                   </a:solidFill>
@@ -1292,7 +1294,7 @@
             </a:ln>
             <a:extLst>
               <a:ext uri="{91240B29-F687-4f45-9708-019B960494DF}">
-                <a14:hiddenLine xmlns="" xmlns:a14="http://schemas.microsoft.com/office/drawing/2010/main" w="9525">
+                <a14:hiddenLine xmlns:a14="http://schemas.microsoft.com/office/drawing/2010/main" xmlns="" w="9525">
                   <a:solidFill>
                     <a:srgbClr val="000000"/>
                   </a:solidFill>
@@ -1382,7 +1384,7 @@
             </a:ln>
             <a:extLst>
               <a:ext uri="{91240B29-F687-4f45-9708-019B960494DF}">
-                <a14:hiddenLine xmlns="" xmlns:a14="http://schemas.microsoft.com/office/drawing/2010/main" w="9525">
+                <a14:hiddenLine xmlns:a14="http://schemas.microsoft.com/office/drawing/2010/main" xmlns="" w="9525">
                   <a:solidFill>
                     <a:srgbClr val="000000"/>
                   </a:solidFill>
@@ -1472,7 +1474,7 @@
             </a:ln>
             <a:extLst>
               <a:ext uri="{91240B29-F687-4f45-9708-019B960494DF}">
-                <a14:hiddenLine xmlns="" xmlns:a14="http://schemas.microsoft.com/office/drawing/2010/main" w="9525">
+                <a14:hiddenLine xmlns:a14="http://schemas.microsoft.com/office/drawing/2010/main" xmlns="" w="9525">
                   <a:solidFill>
                     <a:srgbClr val="000000"/>
                   </a:solidFill>
@@ -1534,7 +1536,7 @@
             </a:ln>
             <a:extLst>
               <a:ext uri="{91240B29-F687-4f45-9708-019B960494DF}">
-                <a14:hiddenLine xmlns="" xmlns:a14="http://schemas.microsoft.com/office/drawing/2010/main" w="9525">
+                <a14:hiddenLine xmlns:a14="http://schemas.microsoft.com/office/drawing/2010/main" xmlns="" w="9525">
                   <a:solidFill>
                     <a:srgbClr val="000000"/>
                   </a:solidFill>
@@ -1624,7 +1626,7 @@
             </a:ln>
             <a:extLst>
               <a:ext uri="{91240B29-F687-4f45-9708-019B960494DF}">
-                <a14:hiddenLine xmlns="" xmlns:a14="http://schemas.microsoft.com/office/drawing/2010/main" w="9525">
+                <a14:hiddenLine xmlns:a14="http://schemas.microsoft.com/office/drawing/2010/main" xmlns="" w="9525">
                   <a:solidFill>
                     <a:srgbClr val="000000"/>
                   </a:solidFill>
@@ -1714,7 +1716,7 @@
             </a:ln>
             <a:extLst>
               <a:ext uri="{91240B29-F687-4f45-9708-019B960494DF}">
-                <a14:hiddenLine xmlns="" xmlns:a14="http://schemas.microsoft.com/office/drawing/2010/main" w="9525">
+                <a14:hiddenLine xmlns:a14="http://schemas.microsoft.com/office/drawing/2010/main" xmlns="" w="9525">
                   <a:solidFill>
                     <a:srgbClr val="000000"/>
                   </a:solidFill>
@@ -1770,7 +1772,7 @@
             </a:ln>
             <a:extLst>
               <a:ext uri="{91240B29-F687-4f45-9708-019B960494DF}">
-                <a14:hiddenLine xmlns="" xmlns:a14="http://schemas.microsoft.com/office/drawing/2010/main" w="9525">
+                <a14:hiddenLine xmlns:a14="http://schemas.microsoft.com/office/drawing/2010/main" xmlns="" w="9525">
                   <a:solidFill>
                     <a:srgbClr val="000000"/>
                   </a:solidFill>
@@ -1860,7 +1862,7 @@
             </a:ln>
             <a:extLst>
               <a:ext uri="{91240B29-F687-4f45-9708-019B960494DF}">
-                <a14:hiddenLine xmlns="" xmlns:a14="http://schemas.microsoft.com/office/drawing/2010/main" w="9525">
+                <a14:hiddenLine xmlns:a14="http://schemas.microsoft.com/office/drawing/2010/main" xmlns="" w="9525">
                   <a:solidFill>
                     <a:srgbClr val="000000"/>
                   </a:solidFill>
@@ -1916,7 +1918,7 @@
             </a:ln>
             <a:extLst>
               <a:ext uri="{91240B29-F687-4f45-9708-019B960494DF}">
-                <a14:hiddenLine xmlns="" xmlns:a14="http://schemas.microsoft.com/office/drawing/2010/main" w="9525">
+                <a14:hiddenLine xmlns:a14="http://schemas.microsoft.com/office/drawing/2010/main" xmlns="" w="9525">
                   <a:solidFill>
                     <a:srgbClr val="000000"/>
                   </a:solidFill>
@@ -2006,7 +2008,7 @@
             </a:ln>
             <a:extLst>
               <a:ext uri="{91240B29-F687-4f45-9708-019B960494DF}">
-                <a14:hiddenLine xmlns="" xmlns:a14="http://schemas.microsoft.com/office/drawing/2010/main" w="9525">
+                <a14:hiddenLine xmlns:a14="http://schemas.microsoft.com/office/drawing/2010/main" xmlns="" w="9525">
                   <a:solidFill>
                     <a:srgbClr val="000000"/>
                   </a:solidFill>
@@ -2074,7 +2076,7 @@
             </a:ln>
             <a:extLst>
               <a:ext uri="{91240B29-F687-4f45-9708-019B960494DF}">
-                <a14:hiddenLine xmlns="" xmlns:a14="http://schemas.microsoft.com/office/drawing/2010/main" w="9525">
+                <a14:hiddenLine xmlns:a14="http://schemas.microsoft.com/office/drawing/2010/main" xmlns="" w="9525">
                   <a:solidFill>
                     <a:srgbClr val="000000"/>
                   </a:solidFill>
@@ -2164,7 +2166,7 @@
             </a:ln>
             <a:extLst>
               <a:ext uri="{91240B29-F687-4f45-9708-019B960494DF}">
-                <a14:hiddenLine xmlns="" xmlns:a14="http://schemas.microsoft.com/office/drawing/2010/main" w="9525">
+                <a14:hiddenLine xmlns:a14="http://schemas.microsoft.com/office/drawing/2010/main" xmlns="" w="9525">
                   <a:solidFill>
                     <a:srgbClr val="000000"/>
                   </a:solidFill>
@@ -2232,7 +2234,7 @@
             </a:ln>
             <a:extLst>
               <a:ext uri="{91240B29-F687-4f45-9708-019B960494DF}">
-                <a14:hiddenLine xmlns="" xmlns:a14="http://schemas.microsoft.com/office/drawing/2010/main" w="9525">
+                <a14:hiddenLine xmlns:a14="http://schemas.microsoft.com/office/drawing/2010/main" xmlns="" w="9525">
                   <a:solidFill>
                     <a:srgbClr val="000000"/>
                   </a:solidFill>
@@ -2322,7 +2324,7 @@
             </a:ln>
             <a:extLst>
               <a:ext uri="{91240B29-F687-4f45-9708-019B960494DF}">
-                <a14:hiddenLine xmlns="" xmlns:a14="http://schemas.microsoft.com/office/drawing/2010/main" w="9525">
+                <a14:hiddenLine xmlns:a14="http://schemas.microsoft.com/office/drawing/2010/main" xmlns="" w="9525">
                   <a:solidFill>
                     <a:srgbClr val="000000"/>
                   </a:solidFill>
@@ -2356,7 +2358,7 @@
             </a:ln>
             <a:extLst>
               <a:ext uri="{91240B29-F687-4f45-9708-019B960494DF}">
-                <a14:hiddenLine xmlns="" xmlns:a14="http://schemas.microsoft.com/office/drawing/2010/main" w="9525">
+                <a14:hiddenLine xmlns:a14="http://schemas.microsoft.com/office/drawing/2010/main" xmlns="" w="9525">
                   <a:solidFill>
                     <a:srgbClr val="000000"/>
                   </a:solidFill>
@@ -2446,7 +2448,7 @@
             </a:ln>
             <a:extLst>
               <a:ext uri="{91240B29-F687-4f45-9708-019B960494DF}">
-                <a14:hiddenLine xmlns="" xmlns:a14="http://schemas.microsoft.com/office/drawing/2010/main" w="9525">
+                <a14:hiddenLine xmlns:a14="http://schemas.microsoft.com/office/drawing/2010/main" xmlns="" w="9525">
                   <a:solidFill>
                     <a:srgbClr val="000000"/>
                   </a:solidFill>
@@ -2508,7 +2510,7 @@
             </a:ln>
             <a:extLst>
               <a:ext uri="{91240B29-F687-4f45-9708-019B960494DF}">
-                <a14:hiddenLine xmlns="" xmlns:a14="http://schemas.microsoft.com/office/drawing/2010/main" w="9525">
+                <a14:hiddenLine xmlns:a14="http://schemas.microsoft.com/office/drawing/2010/main" xmlns="" w="9525">
                   <a:solidFill>
                     <a:srgbClr val="000000"/>
                   </a:solidFill>
@@ -2570,7 +2572,7 @@
             </a:ln>
             <a:extLst>
               <a:ext uri="{91240B29-F687-4f45-9708-019B960494DF}">
-                <a14:hiddenLine xmlns="" xmlns:a14="http://schemas.microsoft.com/office/drawing/2010/main" w="9525">
+                <a14:hiddenLine xmlns:a14="http://schemas.microsoft.com/office/drawing/2010/main" xmlns="" w="9525">
                   <a:solidFill>
                     <a:srgbClr val="000000"/>
                   </a:solidFill>
@@ -2660,7 +2662,7 @@
             </a:ln>
             <a:extLst>
               <a:ext uri="{91240B29-F687-4f45-9708-019B960494DF}">
-                <a14:hiddenLine xmlns="" xmlns:a14="http://schemas.microsoft.com/office/drawing/2010/main" w="9525">
+                <a14:hiddenLine xmlns:a14="http://schemas.microsoft.com/office/drawing/2010/main" xmlns="" w="9525">
                   <a:solidFill>
                     <a:srgbClr val="000000"/>
                   </a:solidFill>
@@ -2728,7 +2730,7 @@
             </a:ln>
             <a:extLst>
               <a:ext uri="{91240B29-F687-4f45-9708-019B960494DF}">
-                <a14:hiddenLine xmlns="" xmlns:a14="http://schemas.microsoft.com/office/drawing/2010/main" w="9525">
+                <a14:hiddenLine xmlns:a14="http://schemas.microsoft.com/office/drawing/2010/main" xmlns="" w="9525">
                   <a:solidFill>
                     <a:srgbClr val="000000"/>
                   </a:solidFill>
@@ -2790,7 +2792,7 @@
             </a:ln>
             <a:extLst>
               <a:ext uri="{91240B29-F687-4f45-9708-019B960494DF}">
-                <a14:hiddenLine xmlns="" xmlns:a14="http://schemas.microsoft.com/office/drawing/2010/main" w="9525">
+                <a14:hiddenLine xmlns:a14="http://schemas.microsoft.com/office/drawing/2010/main" xmlns="" w="9525">
                   <a:solidFill>
                     <a:srgbClr val="000000"/>
                   </a:solidFill>
@@ -2880,7 +2882,7 @@
             </a:ln>
             <a:extLst>
               <a:ext uri="{91240B29-F687-4f45-9708-019B960494DF}">
-                <a14:hiddenLine xmlns="" xmlns:a14="http://schemas.microsoft.com/office/drawing/2010/main" w="9525">
+                <a14:hiddenLine xmlns:a14="http://schemas.microsoft.com/office/drawing/2010/main" xmlns="" w="9525">
                   <a:solidFill>
                     <a:srgbClr val="000000"/>
                   </a:solidFill>
@@ -2942,7 +2944,7 @@
             </a:ln>
             <a:extLst>
               <a:ext uri="{91240B29-F687-4f45-9708-019B960494DF}">
-                <a14:hiddenLine xmlns="" xmlns:a14="http://schemas.microsoft.com/office/drawing/2010/main" w="9525">
+                <a14:hiddenLine xmlns:a14="http://schemas.microsoft.com/office/drawing/2010/main" xmlns="" w="9525">
                   <a:solidFill>
                     <a:srgbClr val="000000"/>
                   </a:solidFill>
@@ -3032,7 +3034,7 @@
             </a:ln>
             <a:extLst>
               <a:ext uri="{91240B29-F687-4f45-9708-019B960494DF}">
-                <a14:hiddenLine xmlns="" xmlns:a14="http://schemas.microsoft.com/office/drawing/2010/main" w="9525">
+                <a14:hiddenLine xmlns:a14="http://schemas.microsoft.com/office/drawing/2010/main" xmlns="" w="9525">
                   <a:solidFill>
                     <a:srgbClr val="000000"/>
                   </a:solidFill>
@@ -3094,7 +3096,7 @@
             </a:ln>
             <a:extLst>
               <a:ext uri="{91240B29-F687-4f45-9708-019B960494DF}">
-                <a14:hiddenLine xmlns="" xmlns:a14="http://schemas.microsoft.com/office/drawing/2010/main" w="9525">
+                <a14:hiddenLine xmlns:a14="http://schemas.microsoft.com/office/drawing/2010/main" xmlns="" w="9525">
                   <a:solidFill>
                     <a:srgbClr val="000000"/>
                   </a:solidFill>
@@ -3184,7 +3186,7 @@
             </a:ln>
             <a:extLst>
               <a:ext uri="{91240B29-F687-4f45-9708-019B960494DF}">
-                <a14:hiddenLine xmlns="" xmlns:a14="http://schemas.microsoft.com/office/drawing/2010/main" w="9525">
+                <a14:hiddenLine xmlns:a14="http://schemas.microsoft.com/office/drawing/2010/main" xmlns="" w="9525">
                   <a:solidFill>
                     <a:srgbClr val="000000"/>
                   </a:solidFill>
@@ -3218,7 +3220,7 @@
             </a:ln>
             <a:extLst>
               <a:ext uri="{91240B29-F687-4f45-9708-019B960494DF}">
-                <a14:hiddenLine xmlns="" xmlns:a14="http://schemas.microsoft.com/office/drawing/2010/main" w="9525">
+                <a14:hiddenLine xmlns:a14="http://schemas.microsoft.com/office/drawing/2010/main" xmlns="" w="9525">
                   <a:solidFill>
                     <a:srgbClr val="000000"/>
                   </a:solidFill>
@@ -3283,7 +3285,7 @@
             </a:ln>
             <a:extLst>
               <a:ext uri="{91240B29-F687-4f45-9708-019B960494DF}">
-                <a14:hiddenLine xmlns="" xmlns:a14="http://schemas.microsoft.com/office/drawing/2010/main" w="9525">
+                <a14:hiddenLine xmlns:a14="http://schemas.microsoft.com/office/drawing/2010/main" xmlns="" w="9525">
                   <a:solidFill>
                     <a:srgbClr val="000000"/>
                   </a:solidFill>
@@ -3373,7 +3375,7 @@
             </a:ln>
             <a:extLst>
               <a:ext uri="{91240B29-F687-4f45-9708-019B960494DF}">
-                <a14:hiddenLine xmlns="" xmlns:a14="http://schemas.microsoft.com/office/drawing/2010/main" w="9525">
+                <a14:hiddenLine xmlns:a14="http://schemas.microsoft.com/office/drawing/2010/main" xmlns="" w="9525">
                   <a:solidFill>
                     <a:srgbClr val="000000"/>
                   </a:solidFill>
@@ -3435,7 +3437,7 @@
             </a:ln>
             <a:extLst>
               <a:ext uri="{91240B29-F687-4f45-9708-019B960494DF}">
-                <a14:hiddenLine xmlns="" xmlns:a14="http://schemas.microsoft.com/office/drawing/2010/main" w="9525">
+                <a14:hiddenLine xmlns:a14="http://schemas.microsoft.com/office/drawing/2010/main" xmlns="" w="9525">
                   <a:solidFill>
                     <a:srgbClr val="000000"/>
                   </a:solidFill>
@@ -3525,7 +3527,7 @@
             </a:ln>
             <a:extLst>
               <a:ext uri="{91240B29-F687-4f45-9708-019B960494DF}">
-                <a14:hiddenLine xmlns="" xmlns:a14="http://schemas.microsoft.com/office/drawing/2010/main" w="9525">
+                <a14:hiddenLine xmlns:a14="http://schemas.microsoft.com/office/drawing/2010/main" xmlns="" w="9525">
                   <a:solidFill>
                     <a:srgbClr val="000000"/>
                   </a:solidFill>
@@ -3615,7 +3617,7 @@
             </a:ln>
             <a:extLst>
               <a:ext uri="{91240B29-F687-4f45-9708-019B960494DF}">
-                <a14:hiddenLine xmlns="" xmlns:a14="http://schemas.microsoft.com/office/drawing/2010/main" w="9525">
+                <a14:hiddenLine xmlns:a14="http://schemas.microsoft.com/office/drawing/2010/main" xmlns="" w="9525">
                   <a:solidFill>
                     <a:srgbClr val="000000"/>
                   </a:solidFill>
@@ -3680,7 +3682,7 @@
             </a:ln>
             <a:extLst>
               <a:ext uri="{91240B29-F687-4f45-9708-019B960494DF}">
-                <a14:hiddenLine xmlns="" xmlns:a14="http://schemas.microsoft.com/office/drawing/2010/main" w="9525">
+                <a14:hiddenLine xmlns:a14="http://schemas.microsoft.com/office/drawing/2010/main" xmlns="" w="9525">
                   <a:solidFill>
                     <a:srgbClr val="000000"/>
                   </a:solidFill>
@@ -3742,7 +3744,7 @@
             </a:ln>
             <a:extLst>
               <a:ext uri="{91240B29-F687-4f45-9708-019B960494DF}">
-                <a14:hiddenLine xmlns="" xmlns:a14="http://schemas.microsoft.com/office/drawing/2010/main" w="9525">
+                <a14:hiddenLine xmlns:a14="http://schemas.microsoft.com/office/drawing/2010/main" xmlns="" w="9525">
                   <a:solidFill>
                     <a:srgbClr val="000000"/>
                   </a:solidFill>
@@ -3832,7 +3834,7 @@
             </a:ln>
             <a:extLst>
               <a:ext uri="{91240B29-F687-4f45-9708-019B960494DF}">
-                <a14:hiddenLine xmlns="" xmlns:a14="http://schemas.microsoft.com/office/drawing/2010/main" w="9525">
+                <a14:hiddenLine xmlns:a14="http://schemas.microsoft.com/office/drawing/2010/main" xmlns="" w="9525">
                   <a:solidFill>
                     <a:srgbClr val="000000"/>
                   </a:solidFill>
@@ -3922,7 +3924,7 @@
             </a:ln>
             <a:extLst>
               <a:ext uri="{91240B29-F687-4f45-9708-019B960494DF}">
-                <a14:hiddenLine xmlns="" xmlns:a14="http://schemas.microsoft.com/office/drawing/2010/main" w="9525">
+                <a14:hiddenLine xmlns:a14="http://schemas.microsoft.com/office/drawing/2010/main" xmlns="" w="9525">
                   <a:solidFill>
                     <a:srgbClr val="000000"/>
                   </a:solidFill>
@@ -3984,7 +3986,7 @@
             </a:ln>
             <a:extLst>
               <a:ext uri="{91240B29-F687-4f45-9708-019B960494DF}">
-                <a14:hiddenLine xmlns="" xmlns:a14="http://schemas.microsoft.com/office/drawing/2010/main" w="9525">
+                <a14:hiddenLine xmlns:a14="http://schemas.microsoft.com/office/drawing/2010/main" xmlns="" w="9525">
                   <a:solidFill>
                     <a:srgbClr val="000000"/>
                   </a:solidFill>
@@ -4104,7 +4106,7 @@
             </a:ln>
             <a:extLst>
               <a:ext uri="{91240B29-F687-4f45-9708-019B960494DF}">
-                <a14:hiddenLine xmlns="" xmlns:a14="http://schemas.microsoft.com/office/drawing/2010/main" w="9525">
+                <a14:hiddenLine xmlns:a14="http://schemas.microsoft.com/office/drawing/2010/main" xmlns="" w="9525">
                   <a:solidFill>
                     <a:srgbClr val="000000"/>
                   </a:solidFill>
@@ -4172,7 +4174,7 @@
             </a:ln>
             <a:extLst>
               <a:ext uri="{91240B29-F687-4f45-9708-019B960494DF}">
-                <a14:hiddenLine xmlns="" xmlns:a14="http://schemas.microsoft.com/office/drawing/2010/main" w="9525">
+                <a14:hiddenLine xmlns:a14="http://schemas.microsoft.com/office/drawing/2010/main" xmlns="" w="9525">
                   <a:solidFill>
                     <a:srgbClr val="000000"/>
                   </a:solidFill>
@@ -4262,7 +4264,7 @@
             </a:ln>
             <a:extLst>
               <a:ext uri="{91240B29-F687-4f45-9708-019B960494DF}">
-                <a14:hiddenLine xmlns="" xmlns:a14="http://schemas.microsoft.com/office/drawing/2010/main" w="9525">
+                <a14:hiddenLine xmlns:a14="http://schemas.microsoft.com/office/drawing/2010/main" xmlns="" w="9525">
                   <a:solidFill>
                     <a:srgbClr val="000000"/>
                   </a:solidFill>
@@ -8984,7 +8986,7 @@
           <a:noFill/>
           <a:extLst>
             <a:ext uri="{909E8E84-426E-40dd-AFC4-6F175D3DCCD1}">
-              <a14:hiddenFill xmlns="" xmlns:a14="http://schemas.microsoft.com/office/drawing/2010/main">
+              <a14:hiddenFill xmlns:a14="http://schemas.microsoft.com/office/drawing/2010/main" xmlns="">
                 <a:solidFill>
                   <a:srgbClr val="FFFFFF"/>
                 </a:solidFill>
@@ -9058,7 +9060,7 @@
               </a:ln>
               <a:extLst>
                 <a:ext uri="{91240B29-F687-4f45-9708-019B960494DF}">
-                  <a14:hiddenLine xmlns="" xmlns:a14="http://schemas.microsoft.com/office/drawing/2010/main" w="9525">
+                  <a14:hiddenLine xmlns:a14="http://schemas.microsoft.com/office/drawing/2010/main" xmlns="" w="9525">
                     <a:solidFill>
                       <a:srgbClr val="000000"/>
                     </a:solidFill>
@@ -9148,7 +9150,7 @@
               </a:ln>
               <a:extLst>
                 <a:ext uri="{91240B29-F687-4f45-9708-019B960494DF}">
-                  <a14:hiddenLine xmlns="" xmlns:a14="http://schemas.microsoft.com/office/drawing/2010/main" w="9525">
+                  <a14:hiddenLine xmlns:a14="http://schemas.microsoft.com/office/drawing/2010/main" xmlns="" w="9525">
                     <a:solidFill>
                       <a:srgbClr val="000000"/>
                     </a:solidFill>
@@ -9238,7 +9240,7 @@
               </a:ln>
               <a:extLst>
                 <a:ext uri="{91240B29-F687-4f45-9708-019B960494DF}">
-                  <a14:hiddenLine xmlns="" xmlns:a14="http://schemas.microsoft.com/office/drawing/2010/main" w="9525">
+                  <a14:hiddenLine xmlns:a14="http://schemas.microsoft.com/office/drawing/2010/main" xmlns="" w="9525">
                     <a:solidFill>
                       <a:srgbClr val="000000"/>
                     </a:solidFill>
@@ -9300,7 +9302,7 @@
               </a:ln>
               <a:extLst>
                 <a:ext uri="{91240B29-F687-4f45-9708-019B960494DF}">
-                  <a14:hiddenLine xmlns="" xmlns:a14="http://schemas.microsoft.com/office/drawing/2010/main" w="9525">
+                  <a14:hiddenLine xmlns:a14="http://schemas.microsoft.com/office/drawing/2010/main" xmlns="" w="9525">
                     <a:solidFill>
                       <a:srgbClr val="000000"/>
                     </a:solidFill>
@@ -9390,7 +9392,7 @@
               </a:ln>
               <a:extLst>
                 <a:ext uri="{91240B29-F687-4f45-9708-019B960494DF}">
-                  <a14:hiddenLine xmlns="" xmlns:a14="http://schemas.microsoft.com/office/drawing/2010/main" w="9525">
+                  <a14:hiddenLine xmlns:a14="http://schemas.microsoft.com/office/drawing/2010/main" xmlns="" w="9525">
                     <a:solidFill>
                       <a:srgbClr val="000000"/>
                     </a:solidFill>
@@ -9452,7 +9454,7 @@
               </a:ln>
               <a:extLst>
                 <a:ext uri="{91240B29-F687-4f45-9708-019B960494DF}">
-                  <a14:hiddenLine xmlns="" xmlns:a14="http://schemas.microsoft.com/office/drawing/2010/main" w="9525">
+                  <a14:hiddenLine xmlns:a14="http://schemas.microsoft.com/office/drawing/2010/main" xmlns="" w="9525">
                     <a:solidFill>
                       <a:srgbClr val="000000"/>
                     </a:solidFill>
@@ -9514,7 +9516,7 @@
               </a:ln>
               <a:extLst>
                 <a:ext uri="{91240B29-F687-4f45-9708-019B960494DF}">
-                  <a14:hiddenLine xmlns="" xmlns:a14="http://schemas.microsoft.com/office/drawing/2010/main" w="9525">
+                  <a14:hiddenLine xmlns:a14="http://schemas.microsoft.com/office/drawing/2010/main" xmlns="" w="9525">
                     <a:solidFill>
                       <a:srgbClr val="000000"/>
                     </a:solidFill>
@@ -9604,7 +9606,7 @@
               </a:ln>
               <a:extLst>
                 <a:ext uri="{91240B29-F687-4f45-9708-019B960494DF}">
-                  <a14:hiddenLine xmlns="" xmlns:a14="http://schemas.microsoft.com/office/drawing/2010/main" w="9525">
+                  <a14:hiddenLine xmlns:a14="http://schemas.microsoft.com/office/drawing/2010/main" xmlns="" w="9525">
                     <a:solidFill>
                       <a:srgbClr val="000000"/>
                     </a:solidFill>
@@ -9694,7 +9696,7 @@
               </a:ln>
               <a:extLst>
                 <a:ext uri="{91240B29-F687-4f45-9708-019B960494DF}">
-                  <a14:hiddenLine xmlns="" xmlns:a14="http://schemas.microsoft.com/office/drawing/2010/main" w="9525">
+                  <a14:hiddenLine xmlns:a14="http://schemas.microsoft.com/office/drawing/2010/main" xmlns="" w="9525">
                     <a:solidFill>
                       <a:srgbClr val="000000"/>
                     </a:solidFill>
@@ -9756,7 +9758,7 @@
               </a:ln>
               <a:extLst>
                 <a:ext uri="{91240B29-F687-4f45-9708-019B960494DF}">
-                  <a14:hiddenLine xmlns="" xmlns:a14="http://schemas.microsoft.com/office/drawing/2010/main" w="9525">
+                  <a14:hiddenLine xmlns:a14="http://schemas.microsoft.com/office/drawing/2010/main" xmlns="" w="9525">
                     <a:solidFill>
                       <a:srgbClr val="000000"/>
                     </a:solidFill>
@@ -9866,7 +9868,7 @@
               </a:ln>
               <a:extLst>
                 <a:ext uri="{91240B29-F687-4f45-9708-019B960494DF}">
-                  <a14:hiddenLine xmlns="" xmlns:a14="http://schemas.microsoft.com/office/drawing/2010/main" w="9525">
+                  <a14:hiddenLine xmlns:a14="http://schemas.microsoft.com/office/drawing/2010/main" xmlns="" w="9525">
                     <a:solidFill>
                       <a:srgbClr val="000000"/>
                     </a:solidFill>
@@ -9950,7 +9952,7 @@
               </a:ln>
               <a:extLst>
                 <a:ext uri="{91240B29-F687-4f45-9708-019B960494DF}">
-                  <a14:hiddenLine xmlns="" xmlns:a14="http://schemas.microsoft.com/office/drawing/2010/main" w="9525">
+                  <a14:hiddenLine xmlns:a14="http://schemas.microsoft.com/office/drawing/2010/main" xmlns="" w="9525">
                     <a:solidFill>
                       <a:srgbClr val="000000"/>
                     </a:solidFill>
@@ -10012,7 +10014,7 @@
               </a:ln>
               <a:extLst>
                 <a:ext uri="{91240B29-F687-4f45-9708-019B960494DF}">
-                  <a14:hiddenLine xmlns="" xmlns:a14="http://schemas.microsoft.com/office/drawing/2010/main" w="9525">
+                  <a14:hiddenLine xmlns:a14="http://schemas.microsoft.com/office/drawing/2010/main" xmlns="" w="9525">
                     <a:solidFill>
                       <a:srgbClr val="000000"/>
                     </a:solidFill>
@@ -10074,7 +10076,7 @@
               </a:ln>
               <a:extLst>
                 <a:ext uri="{91240B29-F687-4f45-9708-019B960494DF}">
-                  <a14:hiddenLine xmlns="" xmlns:a14="http://schemas.microsoft.com/office/drawing/2010/main" w="9525">
+                  <a14:hiddenLine xmlns:a14="http://schemas.microsoft.com/office/drawing/2010/main" xmlns="" w="9525">
                     <a:solidFill>
                       <a:srgbClr val="000000"/>
                     </a:solidFill>
@@ -10164,7 +10166,7 @@
               </a:ln>
               <a:extLst>
                 <a:ext uri="{91240B29-F687-4f45-9708-019B960494DF}">
-                  <a14:hiddenLine xmlns="" xmlns:a14="http://schemas.microsoft.com/office/drawing/2010/main" w="9525">
+                  <a14:hiddenLine xmlns:a14="http://schemas.microsoft.com/office/drawing/2010/main" xmlns="" w="9525">
                     <a:solidFill>
                       <a:srgbClr val="000000"/>
                     </a:solidFill>
@@ -10198,7 +10200,7 @@
               </a:ln>
               <a:extLst>
                 <a:ext uri="{91240B29-F687-4f45-9708-019B960494DF}">
-                  <a14:hiddenLine xmlns="" xmlns:a14="http://schemas.microsoft.com/office/drawing/2010/main" w="9525">
+                  <a14:hiddenLine xmlns:a14="http://schemas.microsoft.com/office/drawing/2010/main" xmlns="" w="9525">
                     <a:solidFill>
                       <a:srgbClr val="000000"/>
                     </a:solidFill>
@@ -10263,7 +10265,7 @@
               </a:ln>
               <a:extLst>
                 <a:ext uri="{91240B29-F687-4f45-9708-019B960494DF}">
-                  <a14:hiddenLine xmlns="" xmlns:a14="http://schemas.microsoft.com/office/drawing/2010/main" w="9525">
+                  <a14:hiddenLine xmlns:a14="http://schemas.microsoft.com/office/drawing/2010/main" xmlns="" w="9525">
                     <a:solidFill>
                       <a:srgbClr val="000000"/>
                     </a:solidFill>
@@ -10353,7 +10355,7 @@
               </a:ln>
               <a:extLst>
                 <a:ext uri="{91240B29-F687-4f45-9708-019B960494DF}">
-                  <a14:hiddenLine xmlns="" xmlns:a14="http://schemas.microsoft.com/office/drawing/2010/main" w="9525">
+                  <a14:hiddenLine xmlns:a14="http://schemas.microsoft.com/office/drawing/2010/main" xmlns="" w="9525">
                     <a:solidFill>
                       <a:srgbClr val="000000"/>
                     </a:solidFill>
@@ -10415,7 +10417,7 @@
               </a:ln>
               <a:extLst>
                 <a:ext uri="{91240B29-F687-4f45-9708-019B960494DF}">
-                  <a14:hiddenLine xmlns="" xmlns:a14="http://schemas.microsoft.com/office/drawing/2010/main" w="9525">
+                  <a14:hiddenLine xmlns:a14="http://schemas.microsoft.com/office/drawing/2010/main" xmlns="" w="9525">
                     <a:solidFill>
                       <a:srgbClr val="000000"/>
                     </a:solidFill>
@@ -10505,7 +10507,7 @@
               </a:ln>
               <a:extLst>
                 <a:ext uri="{91240B29-F687-4f45-9708-019B960494DF}">
-                  <a14:hiddenLine xmlns="" xmlns:a14="http://schemas.microsoft.com/office/drawing/2010/main" w="9525">
+                  <a14:hiddenLine xmlns:a14="http://schemas.microsoft.com/office/drawing/2010/main" xmlns="" w="9525">
                     <a:solidFill>
                       <a:srgbClr val="000000"/>
                     </a:solidFill>
@@ -10570,7 +10572,7 @@
               </a:ln>
               <a:extLst>
                 <a:ext uri="{91240B29-F687-4f45-9708-019B960494DF}">
-                  <a14:hiddenLine xmlns="" xmlns:a14="http://schemas.microsoft.com/office/drawing/2010/main" w="9525">
+                  <a14:hiddenLine xmlns:a14="http://schemas.microsoft.com/office/drawing/2010/main" xmlns="" w="9525">
                     <a:solidFill>
                       <a:srgbClr val="000000"/>
                     </a:solidFill>
@@ -10632,7 +10634,7 @@
               </a:ln>
               <a:extLst>
                 <a:ext uri="{91240B29-F687-4f45-9708-019B960494DF}">
-                  <a14:hiddenLine xmlns="" xmlns:a14="http://schemas.microsoft.com/office/drawing/2010/main" w="9525">
+                  <a14:hiddenLine xmlns:a14="http://schemas.microsoft.com/office/drawing/2010/main" xmlns="" w="9525">
                     <a:solidFill>
                       <a:srgbClr val="000000"/>
                     </a:solidFill>
@@ -10722,7 +10724,7 @@
               </a:ln>
               <a:extLst>
                 <a:ext uri="{91240B29-F687-4f45-9708-019B960494DF}">
-                  <a14:hiddenLine xmlns="" xmlns:a14="http://schemas.microsoft.com/office/drawing/2010/main" w="9525">
+                  <a14:hiddenLine xmlns:a14="http://schemas.microsoft.com/office/drawing/2010/main" xmlns="" w="9525">
                     <a:solidFill>
                       <a:srgbClr val="000000"/>
                     </a:solidFill>
@@ -10812,7 +10814,7 @@
               </a:ln>
               <a:extLst>
                 <a:ext uri="{91240B29-F687-4f45-9708-019B960494DF}">
-                  <a14:hiddenLine xmlns="" xmlns:a14="http://schemas.microsoft.com/office/drawing/2010/main" w="9525">
+                  <a14:hiddenLine xmlns:a14="http://schemas.microsoft.com/office/drawing/2010/main" xmlns="" w="9525">
                     <a:solidFill>
                       <a:srgbClr val="000000"/>
                     </a:solidFill>
@@ -10877,7 +10879,7 @@
               </a:ln>
               <a:extLst>
                 <a:ext uri="{91240B29-F687-4f45-9708-019B960494DF}">
-                  <a14:hiddenLine xmlns="" xmlns:a14="http://schemas.microsoft.com/office/drawing/2010/main" w="9525">
+                  <a14:hiddenLine xmlns:a14="http://schemas.microsoft.com/office/drawing/2010/main" xmlns="" w="9525">
                     <a:solidFill>
                       <a:srgbClr val="000000"/>
                     </a:solidFill>
@@ -10997,7 +10999,7 @@
               </a:ln>
               <a:extLst>
                 <a:ext uri="{91240B29-F687-4f45-9708-019B960494DF}">
-                  <a14:hiddenLine xmlns="" xmlns:a14="http://schemas.microsoft.com/office/drawing/2010/main" w="9525">
+                  <a14:hiddenLine xmlns:a14="http://schemas.microsoft.com/office/drawing/2010/main" xmlns="" w="9525">
                     <a:solidFill>
                       <a:srgbClr val="000000"/>
                     </a:solidFill>
@@ -11095,7 +11097,7 @@
               </a:ln>
               <a:extLst>
                 <a:ext uri="{91240B29-F687-4f45-9708-019B960494DF}">
-                  <a14:hiddenLine xmlns="" xmlns:a14="http://schemas.microsoft.com/office/drawing/2010/main" w="9525">
+                  <a14:hiddenLine xmlns:a14="http://schemas.microsoft.com/office/drawing/2010/main" xmlns="" w="9525">
                     <a:solidFill>
                       <a:srgbClr val="000000"/>
                     </a:solidFill>
@@ -11210,7 +11212,7 @@
               </a:ln>
               <a:extLst>
                 <a:ext uri="{91240B29-F687-4f45-9708-019B960494DF}">
-                  <a14:hiddenLine xmlns="" xmlns:a14="http://schemas.microsoft.com/office/drawing/2010/main" w="9525">
+                  <a14:hiddenLine xmlns:a14="http://schemas.microsoft.com/office/drawing/2010/main" xmlns="" w="9525">
                     <a:solidFill>
                       <a:srgbClr val="000000"/>
                     </a:solidFill>
@@ -11300,7 +11302,7 @@
               </a:ln>
               <a:extLst>
                 <a:ext uri="{91240B29-F687-4f45-9708-019B960494DF}">
-                  <a14:hiddenLine xmlns="" xmlns:a14="http://schemas.microsoft.com/office/drawing/2010/main" w="9525">
+                  <a14:hiddenLine xmlns:a14="http://schemas.microsoft.com/office/drawing/2010/main" xmlns="" w="9525">
                     <a:solidFill>
                       <a:srgbClr val="000000"/>
                     </a:solidFill>
@@ -11365,7 +11367,7 @@
               </a:ln>
               <a:extLst>
                 <a:ext uri="{91240B29-F687-4f45-9708-019B960494DF}">
-                  <a14:hiddenLine xmlns="" xmlns:a14="http://schemas.microsoft.com/office/drawing/2010/main" w="9525">
+                  <a14:hiddenLine xmlns:a14="http://schemas.microsoft.com/office/drawing/2010/main" xmlns="" w="9525">
                     <a:solidFill>
                       <a:srgbClr val="000000"/>
                     </a:solidFill>
@@ -11455,7 +11457,7 @@
               </a:ln>
               <a:extLst>
                 <a:ext uri="{91240B29-F687-4f45-9708-019B960494DF}">
-                  <a14:hiddenLine xmlns="" xmlns:a14="http://schemas.microsoft.com/office/drawing/2010/main" w="9525">
+                  <a14:hiddenLine xmlns:a14="http://schemas.microsoft.com/office/drawing/2010/main" xmlns="" w="9525">
                     <a:solidFill>
                       <a:srgbClr val="000000"/>
                     </a:solidFill>
@@ -11523,7 +11525,7 @@
               </a:ln>
               <a:extLst>
                 <a:ext uri="{91240B29-F687-4f45-9708-019B960494DF}">
-                  <a14:hiddenLine xmlns="" xmlns:a14="http://schemas.microsoft.com/office/drawing/2010/main" w="9525">
+                  <a14:hiddenLine xmlns:a14="http://schemas.microsoft.com/office/drawing/2010/main" xmlns="" w="9525">
                     <a:solidFill>
                       <a:srgbClr val="000000"/>
                     </a:solidFill>
@@ -11613,7 +11615,7 @@
               </a:ln>
               <a:extLst>
                 <a:ext uri="{91240B29-F687-4f45-9708-019B960494DF}">
-                  <a14:hiddenLine xmlns="" xmlns:a14="http://schemas.microsoft.com/office/drawing/2010/main" w="9525">
+                  <a14:hiddenLine xmlns:a14="http://schemas.microsoft.com/office/drawing/2010/main" xmlns="" w="9525">
                     <a:solidFill>
                       <a:srgbClr val="000000"/>
                     </a:solidFill>
@@ -11681,7 +11683,7 @@
               </a:ln>
               <a:extLst>
                 <a:ext uri="{91240B29-F687-4f45-9708-019B960494DF}">
-                  <a14:hiddenLine xmlns="" xmlns:a14="http://schemas.microsoft.com/office/drawing/2010/main" w="9525">
+                  <a14:hiddenLine xmlns:a14="http://schemas.microsoft.com/office/drawing/2010/main" xmlns="" w="9525">
                     <a:solidFill>
                       <a:srgbClr val="000000"/>
                     </a:solidFill>
@@ -11771,7 +11773,7 @@
               </a:ln>
               <a:extLst>
                 <a:ext uri="{91240B29-F687-4f45-9708-019B960494DF}">
-                  <a14:hiddenLine xmlns="" xmlns:a14="http://schemas.microsoft.com/office/drawing/2010/main" w="9525">
+                  <a14:hiddenLine xmlns:a14="http://schemas.microsoft.com/office/drawing/2010/main" xmlns="" w="9525">
                     <a:solidFill>
                       <a:srgbClr val="000000"/>
                     </a:solidFill>
@@ -11805,7 +11807,7 @@
               </a:ln>
               <a:extLst>
                 <a:ext uri="{91240B29-F687-4f45-9708-019B960494DF}">
-                  <a14:hiddenLine xmlns="" xmlns:a14="http://schemas.microsoft.com/office/drawing/2010/main" w="9525">
+                  <a14:hiddenLine xmlns:a14="http://schemas.microsoft.com/office/drawing/2010/main" xmlns="" w="9525">
                     <a:solidFill>
                       <a:srgbClr val="000000"/>
                     </a:solidFill>
@@ -12450,6 +12452,461 @@
           <p:cNvPr id="2" name="Title 1">
             <a:extLst>
               <a:ext uri="{FF2B5EF4-FFF2-40B4-BE49-F238E27FC236}">
+                <a16:creationId xmlns:a16="http://schemas.microsoft.com/office/drawing/2014/main" id="{18AB1DAC-28FD-4282-8843-E1A4E19CA250}"/>
+              </a:ext>
+            </a:extLst>
+          </p:cNvPr>
+          <p:cNvSpPr>
+            <a:spLocks noGrp="1"/>
+          </p:cNvSpPr>
+          <p:nvPr>
+            <p:ph type="title"/>
+          </p:nvPr>
+        </p:nvSpPr>
+        <p:spPr/>
+        <p:txBody>
+          <a:bodyPr/>
+          <a:lstStyle/>
+          <a:p>
+            <a:r>
+              <a:rPr lang="en-CA" dirty="0"/>
+              <a:t>Azure Functions V2</a:t>
+            </a:r>
+            <a:br>
+              <a:rPr lang="en-CA" dirty="0"/>
+            </a:br>
+            <a:r>
+              <a:rPr lang="en-CA" dirty="0"/>
+              <a:t>(Preview)</a:t>
+            </a:r>
+            <a:endParaRPr lang="en-US" dirty="0"/>
+          </a:p>
+        </p:txBody>
+      </p:sp>
+      <p:sp>
+        <p:nvSpPr>
+          <p:cNvPr id="4" name="Text Placeholder 3">
+            <a:extLst>
+              <a:ext uri="{FF2B5EF4-FFF2-40B4-BE49-F238E27FC236}">
+                <a16:creationId xmlns:a16="http://schemas.microsoft.com/office/drawing/2014/main" id="{CB63142D-9E34-42D0-917A-37D57039C7BF}"/>
+              </a:ext>
+            </a:extLst>
+          </p:cNvPr>
+          <p:cNvSpPr>
+            <a:spLocks noGrp="1"/>
+          </p:cNvSpPr>
+          <p:nvPr>
+            <p:ph type="body" idx="1"/>
+          </p:nvPr>
+        </p:nvSpPr>
+        <p:spPr/>
+        <p:txBody>
+          <a:bodyPr/>
+          <a:lstStyle/>
+          <a:p>
+            <a:r>
+              <a:rPr lang="en-US" dirty="0"/>
+              <a:t>Features</a:t>
+            </a:r>
+          </a:p>
+        </p:txBody>
+      </p:sp>
+      <p:sp>
+        <p:nvSpPr>
+          <p:cNvPr id="3" name="Content Placeholder 2">
+            <a:extLst>
+              <a:ext uri="{FF2B5EF4-FFF2-40B4-BE49-F238E27FC236}">
+                <a16:creationId xmlns:a16="http://schemas.microsoft.com/office/drawing/2014/main" id="{6633C9AC-D137-4511-8049-664F9776374C}"/>
+              </a:ext>
+            </a:extLst>
+          </p:cNvPr>
+          <p:cNvSpPr>
+            <a:spLocks noGrp="1"/>
+          </p:cNvSpPr>
+          <p:nvPr>
+            <p:ph sz="half" idx="2"/>
+          </p:nvPr>
+        </p:nvSpPr>
+        <p:spPr/>
+        <p:txBody>
+          <a:bodyPr/>
+          <a:lstStyle/>
+          <a:p>
+            <a:r>
+              <a:rPr lang="en-CA" dirty="0"/>
+              <a:t>BYOB</a:t>
+            </a:r>
+          </a:p>
+          <a:p>
+            <a:r>
+              <a:rPr lang="en-CA" dirty="0"/>
+              <a:t>.NET Core</a:t>
+            </a:r>
+            <a:endParaRPr lang="en-US" dirty="0"/>
+          </a:p>
+        </p:txBody>
+      </p:sp>
+      <p:sp>
+        <p:nvSpPr>
+          <p:cNvPr id="5" name="Text Placeholder 4">
+            <a:extLst>
+              <a:ext uri="{FF2B5EF4-FFF2-40B4-BE49-F238E27FC236}">
+                <a16:creationId xmlns:a16="http://schemas.microsoft.com/office/drawing/2014/main" id="{24C403BB-4441-47E9-BBFE-2381C6D74FD1}"/>
+              </a:ext>
+            </a:extLst>
+          </p:cNvPr>
+          <p:cNvSpPr>
+            <a:spLocks noGrp="1"/>
+          </p:cNvSpPr>
+          <p:nvPr>
+            <p:ph type="body" sz="quarter" idx="3"/>
+          </p:nvPr>
+        </p:nvSpPr>
+        <p:spPr/>
+        <p:txBody>
+          <a:bodyPr/>
+          <a:lstStyle/>
+          <a:p>
+            <a:r>
+              <a:rPr lang="en-US" dirty="0"/>
+              <a:t>Cons</a:t>
+            </a:r>
+          </a:p>
+        </p:txBody>
+      </p:sp>
+      <p:sp>
+        <p:nvSpPr>
+          <p:cNvPr id="6" name="Content Placeholder 5">
+            <a:extLst>
+              <a:ext uri="{FF2B5EF4-FFF2-40B4-BE49-F238E27FC236}">
+                <a16:creationId xmlns:a16="http://schemas.microsoft.com/office/drawing/2014/main" id="{6C9924E9-A97B-4F11-A165-D504723393D2}"/>
+              </a:ext>
+            </a:extLst>
+          </p:cNvPr>
+          <p:cNvSpPr>
+            <a:spLocks noGrp="1"/>
+          </p:cNvSpPr>
+          <p:nvPr>
+            <p:ph sz="quarter" idx="4"/>
+          </p:nvPr>
+        </p:nvSpPr>
+        <p:spPr/>
+        <p:txBody>
+          <a:bodyPr/>
+          <a:lstStyle/>
+          <a:p>
+            <a:r>
+              <a:rPr lang="en-US" dirty="0"/>
+              <a:t>The Steffen-Issue</a:t>
+            </a:r>
+          </a:p>
+          <a:p>
+            <a:r>
+              <a:rPr lang="en-US" dirty="0"/>
+              <a:t>Limited on a few assemblies that are needed in a specific version by core</a:t>
+            </a:r>
+          </a:p>
+          <a:p>
+            <a:r>
+              <a:rPr lang="en-US" dirty="0"/>
+              <a:t>Less supported Languages*</a:t>
+            </a:r>
+          </a:p>
+        </p:txBody>
+      </p:sp>
+    </p:spTree>
+    <p:extLst>
+      <p:ext uri="{BB962C8B-B14F-4D97-AF65-F5344CB8AC3E}">
+        <p14:creationId xmlns:p14="http://schemas.microsoft.com/office/powerpoint/2010/main" val="3241859040"/>
+      </p:ext>
+    </p:extLst>
+  </p:cSld>
+  <p:clrMapOvr>
+    <a:masterClrMapping/>
+  </p:clrMapOvr>
+</p:sld>
+</file>
+
+<file path=ppt/slides/slide11.xml><?xml version="1.0" encoding="utf-8"?>
+<p:sld xmlns:a="http://schemas.openxmlformats.org/drawingml/2006/main" xmlns:r="http://schemas.openxmlformats.org/officeDocument/2006/relationships" xmlns:p="http://schemas.openxmlformats.org/presentationml/2006/main">
+  <p:cSld>
+    <p:spTree>
+      <p:nvGrpSpPr>
+        <p:cNvPr id="1" name=""/>
+        <p:cNvGrpSpPr/>
+        <p:nvPr/>
+      </p:nvGrpSpPr>
+      <p:grpSpPr>
+        <a:xfrm>
+          <a:off x="0" y="0"/>
+          <a:ext cx="0" cy="0"/>
+          <a:chOff x="0" y="0"/>
+          <a:chExt cx="0" cy="0"/>
+        </a:xfrm>
+      </p:grpSpPr>
+      <p:sp>
+        <p:nvSpPr>
+          <p:cNvPr id="2" name="Title 1">
+            <a:extLst>
+              <a:ext uri="{FF2B5EF4-FFF2-40B4-BE49-F238E27FC236}">
+                <a16:creationId xmlns:a16="http://schemas.microsoft.com/office/drawing/2014/main" id="{9EB7865A-211F-49C6-B670-6F4B13612BDA}"/>
+              </a:ext>
+            </a:extLst>
+          </p:cNvPr>
+          <p:cNvSpPr>
+            <a:spLocks noGrp="1"/>
+          </p:cNvSpPr>
+          <p:nvPr>
+            <p:ph type="title"/>
+          </p:nvPr>
+        </p:nvSpPr>
+        <p:spPr/>
+        <p:txBody>
+          <a:bodyPr/>
+          <a:lstStyle/>
+          <a:p>
+            <a:r>
+              <a:rPr lang="en-CA" dirty="0"/>
+              <a:t>Azure Functions </a:t>
+            </a:r>
+            <a:r>
+              <a:rPr lang="en-CA" cap="none" dirty="0"/>
+              <a:t>V2 (GA)</a:t>
+            </a:r>
+            <a:endParaRPr lang="en-US" dirty="0"/>
+          </a:p>
+        </p:txBody>
+      </p:sp>
+      <p:sp>
+        <p:nvSpPr>
+          <p:cNvPr id="6" name="Text Placeholder 5">
+            <a:extLst>
+              <a:ext uri="{FF2B5EF4-FFF2-40B4-BE49-F238E27FC236}">
+                <a16:creationId xmlns:a16="http://schemas.microsoft.com/office/drawing/2014/main" id="{DB589ECB-D9BD-4DCF-966C-7219F454B873}"/>
+              </a:ext>
+            </a:extLst>
+          </p:cNvPr>
+          <p:cNvSpPr>
+            <a:spLocks noGrp="1"/>
+          </p:cNvSpPr>
+          <p:nvPr>
+            <p:ph type="body" idx="1"/>
+          </p:nvPr>
+        </p:nvSpPr>
+        <p:spPr/>
+        <p:txBody>
+          <a:bodyPr/>
+          <a:lstStyle/>
+          <a:p>
+            <a:r>
+              <a:rPr lang="en-US" dirty="0"/>
+              <a:t>Features</a:t>
+            </a:r>
+          </a:p>
+        </p:txBody>
+      </p:sp>
+      <p:sp>
+        <p:nvSpPr>
+          <p:cNvPr id="3" name="Content Placeholder 2">
+            <a:extLst>
+              <a:ext uri="{FF2B5EF4-FFF2-40B4-BE49-F238E27FC236}">
+                <a16:creationId xmlns:a16="http://schemas.microsoft.com/office/drawing/2014/main" id="{2734AA78-7D5D-4F99-A2D7-3F0F01B2E7F1}"/>
+              </a:ext>
+            </a:extLst>
+          </p:cNvPr>
+          <p:cNvSpPr>
+            <a:spLocks noGrp="1"/>
+          </p:cNvSpPr>
+          <p:nvPr>
+            <p:ph sz="half" idx="2"/>
+          </p:nvPr>
+        </p:nvSpPr>
+        <p:spPr/>
+        <p:txBody>
+          <a:bodyPr>
+            <a:normAutofit fontScale="62500" lnSpcReduction="20000"/>
+          </a:bodyPr>
+          <a:lstStyle/>
+          <a:p>
+            <a:r>
+              <a:rPr lang="en-CA" dirty="0"/>
+              <a:t>Out-of-Proc Worker (</a:t>
+            </a:r>
+            <a:r>
+              <a:rPr lang="en-CA" dirty="0" err="1"/>
+              <a:t>gRPC</a:t>
+            </a:r>
+            <a:r>
+              <a:rPr lang="en-CA" dirty="0"/>
+              <a:t>) for JavaScript</a:t>
+            </a:r>
+          </a:p>
+          <a:p>
+            <a:r>
+              <a:rPr lang="en-CA" dirty="0"/>
+              <a:t>Supported Languages (</a:t>
+            </a:r>
+            <a:r>
+              <a:rPr lang="en-CA" dirty="0" err="1"/>
+              <a:t>ooproc</a:t>
+            </a:r>
+            <a:r>
+              <a:rPr lang="en-CA" dirty="0"/>
+              <a:t>): Node.js, Java, Golang, Python</a:t>
+            </a:r>
+          </a:p>
+          <a:p>
+            <a:r>
+              <a:rPr lang="en-CA" dirty="0"/>
+              <a:t>Docker Support</a:t>
+            </a:r>
+          </a:p>
+          <a:p>
+            <a:r>
+              <a:rPr lang="en-CA" dirty="0"/>
+              <a:t>Better Scaling</a:t>
+            </a:r>
+          </a:p>
+          <a:p>
+            <a:r>
+              <a:rPr lang="en-CA" dirty="0"/>
+              <a:t>Better Performance</a:t>
+            </a:r>
+          </a:p>
+          <a:p>
+            <a:r>
+              <a:rPr lang="en-CA" dirty="0"/>
+              <a:t>Host runs on Service Fabric Mesh*</a:t>
+            </a:r>
+          </a:p>
+          <a:p>
+            <a:r>
+              <a:rPr lang="en-CA" dirty="0"/>
+              <a:t>New </a:t>
+            </a:r>
+            <a:r>
+              <a:rPr lang="en-CA" dirty="0" err="1"/>
+              <a:t>host.json</a:t>
+            </a:r>
+            <a:r>
+              <a:rPr lang="en-CA" dirty="0"/>
+              <a:t> (V2)</a:t>
+            </a:r>
+            <a:endParaRPr lang="en-US" dirty="0"/>
+          </a:p>
+        </p:txBody>
+      </p:sp>
+      <p:sp>
+        <p:nvSpPr>
+          <p:cNvPr id="7" name="Text Placeholder 6">
+            <a:extLst>
+              <a:ext uri="{FF2B5EF4-FFF2-40B4-BE49-F238E27FC236}">
+                <a16:creationId xmlns:a16="http://schemas.microsoft.com/office/drawing/2014/main" id="{679F4E80-9B0F-4F55-B4E8-11388F67E588}"/>
+              </a:ext>
+            </a:extLst>
+          </p:cNvPr>
+          <p:cNvSpPr>
+            <a:spLocks noGrp="1"/>
+          </p:cNvSpPr>
+          <p:nvPr>
+            <p:ph type="body" sz="quarter" idx="3"/>
+          </p:nvPr>
+        </p:nvSpPr>
+        <p:spPr/>
+        <p:txBody>
+          <a:bodyPr/>
+          <a:lstStyle/>
+          <a:p>
+            <a:r>
+              <a:rPr lang="en-US" dirty="0"/>
+              <a:t>CONS</a:t>
+            </a:r>
+          </a:p>
+        </p:txBody>
+      </p:sp>
+      <p:sp>
+        <p:nvSpPr>
+          <p:cNvPr id="8" name="Content Placeholder 7">
+            <a:extLst>
+              <a:ext uri="{FF2B5EF4-FFF2-40B4-BE49-F238E27FC236}">
+                <a16:creationId xmlns:a16="http://schemas.microsoft.com/office/drawing/2014/main" id="{6AE6B0FC-6B08-483E-A783-84F151D2DE7B}"/>
+              </a:ext>
+            </a:extLst>
+          </p:cNvPr>
+          <p:cNvSpPr>
+            <a:spLocks noGrp="1"/>
+          </p:cNvSpPr>
+          <p:nvPr>
+            <p:ph sz="quarter" idx="4"/>
+          </p:nvPr>
+        </p:nvSpPr>
+        <p:spPr/>
+        <p:txBody>
+          <a:bodyPr>
+            <a:normAutofit fontScale="62500" lnSpcReduction="20000"/>
+          </a:bodyPr>
+          <a:lstStyle/>
+          <a:p>
+            <a:r>
+              <a:rPr lang="en-US" dirty="0"/>
+              <a:t>The Steffen-Issue</a:t>
+            </a:r>
+          </a:p>
+          <a:p>
+            <a:r>
+              <a:rPr lang="en-US" dirty="0"/>
+              <a:t>Breaking Changes to V2 Preview</a:t>
+            </a:r>
+          </a:p>
+          <a:p>
+            <a:r>
+              <a:rPr lang="en-US" dirty="0"/>
+              <a:t>C#/F# Worker still In-Proc</a:t>
+            </a:r>
+          </a:p>
+          <a:p>
+            <a:r>
+              <a:rPr lang="en-US" dirty="0"/>
+              <a:t>Only one language per Function App supported</a:t>
+            </a:r>
+          </a:p>
+        </p:txBody>
+      </p:sp>
+    </p:spTree>
+    <p:extLst>
+      <p:ext uri="{BB962C8B-B14F-4D97-AF65-F5344CB8AC3E}">
+        <p14:creationId xmlns:p14="http://schemas.microsoft.com/office/powerpoint/2010/main" val="2310348885"/>
+      </p:ext>
+    </p:extLst>
+  </p:cSld>
+  <p:clrMapOvr>
+    <a:masterClrMapping/>
+  </p:clrMapOvr>
+</p:sld>
+</file>
+
+<file path=ppt/slides/slide12.xml><?xml version="1.0" encoding="utf-8"?>
+<p:sld xmlns:a="http://schemas.openxmlformats.org/drawingml/2006/main" xmlns:r="http://schemas.openxmlformats.org/officeDocument/2006/relationships" xmlns:p="http://schemas.openxmlformats.org/presentationml/2006/main">
+  <p:cSld>
+    <p:spTree>
+      <p:nvGrpSpPr>
+        <p:cNvPr id="1" name=""/>
+        <p:cNvGrpSpPr/>
+        <p:nvPr/>
+      </p:nvGrpSpPr>
+      <p:grpSpPr>
+        <a:xfrm>
+          <a:off x="0" y="0"/>
+          <a:ext cx="0" cy="0"/>
+          <a:chOff x="0" y="0"/>
+          <a:chExt cx="0" cy="0"/>
+        </a:xfrm>
+      </p:grpSpPr>
+      <p:sp>
+        <p:nvSpPr>
+          <p:cNvPr id="2" name="Title 1">
+            <a:extLst>
+              <a:ext uri="{FF2B5EF4-FFF2-40B4-BE49-F238E27FC236}">
                 <a16:creationId xmlns:a16="http://schemas.microsoft.com/office/drawing/2014/main" id="{9EB7865A-211F-49C6-B670-6F4B13612BDA}"/>
               </a:ext>
             </a:extLst>
@@ -12666,7 +13123,7 @@
 </p:sld>
 </file>
 
-<file path=ppt/slides/slide11.xml><?xml version="1.0" encoding="utf-8"?>
+<file path=ppt/slides/slide13.xml><?xml version="1.0" encoding="utf-8"?>
 <p:sld xmlns:a="http://schemas.openxmlformats.org/drawingml/2006/main" xmlns:r="http://schemas.openxmlformats.org/officeDocument/2006/relationships" xmlns:p="http://schemas.openxmlformats.org/presentationml/2006/main">
   <p:cSld>
     <p:spTree>
@@ -13012,7 +13469,7 @@
 </p:sld>
 </file>
 
-<file path=ppt/slides/slide12.xml><?xml version="1.0" encoding="utf-8"?>
+<file path=ppt/slides/slide14.xml><?xml version="1.0" encoding="utf-8"?>
 <p:sld xmlns:a="http://schemas.openxmlformats.org/drawingml/2006/main" xmlns:r="http://schemas.openxmlformats.org/officeDocument/2006/relationships" xmlns:p="http://schemas.openxmlformats.org/presentationml/2006/main">
   <p:cSld>
     <p:spTree>
@@ -13300,7 +13757,7 @@
 </p:sld>
 </file>
 
-<file path=ppt/slides/slide13.xml><?xml version="1.0" encoding="utf-8"?>
+<file path=ppt/slides/slide15.xml><?xml version="1.0" encoding="utf-8"?>
 <p:sld xmlns:a="http://schemas.openxmlformats.org/drawingml/2006/main" xmlns:r="http://schemas.openxmlformats.org/officeDocument/2006/relationships" xmlns:p="http://schemas.openxmlformats.org/presentationml/2006/main">
   <p:cSld>
     <p:spTree>
@@ -13616,7 +14073,7 @@
 </p:sld>
 </file>
 
-<file path=ppt/slides/slide14.xml><?xml version="1.0" encoding="utf-8"?>
+<file path=ppt/slides/slide16.xml><?xml version="1.0" encoding="utf-8"?>
 <p:sld xmlns:a="http://schemas.openxmlformats.org/drawingml/2006/main" xmlns:r="http://schemas.openxmlformats.org/officeDocument/2006/relationships" xmlns:p="http://schemas.openxmlformats.org/presentationml/2006/main">
   <p:cSld>
     <p:bg>
@@ -13689,7 +14146,7 @@
           <a:noFill/>
           <a:extLst>
             <a:ext uri="{909E8E84-426E-40dd-AFC4-6F175D3DCCD1}">
-              <a14:hiddenFill xmlns="" xmlns:a16="http://schemas.microsoft.com/office/drawing/2014/main" xmlns:p14="http://schemas.microsoft.com/office/powerpoint/2010/main" xmlns:a14="http://schemas.microsoft.com/office/drawing/2010/main">
+              <a14:hiddenFill xmlns:a14="http://schemas.microsoft.com/office/drawing/2010/main" xmlns:p14="http://schemas.microsoft.com/office/powerpoint/2010/main" xmlns:a16="http://schemas.microsoft.com/office/drawing/2014/main" xmlns="">
                 <a:solidFill>
                   <a:srgbClr val="FFFFFF"/>
                 </a:solidFill>
@@ -13781,7 +14238,7 @@
             </a:ln>
             <a:extLst>
               <a:ext uri="{91240B29-F687-4f45-9708-019B960494DF}">
-                <a14:hiddenLine xmlns="" xmlns:a16="http://schemas.microsoft.com/office/drawing/2014/main" xmlns:p14="http://schemas.microsoft.com/office/powerpoint/2010/main" xmlns:a14="http://schemas.microsoft.com/office/drawing/2010/main" w="9525">
+                <a14:hiddenLine xmlns:a14="http://schemas.microsoft.com/office/drawing/2010/main" xmlns:p14="http://schemas.microsoft.com/office/powerpoint/2010/main" xmlns:a16="http://schemas.microsoft.com/office/drawing/2014/main" xmlns="" w="9525">
                   <a:solidFill>
                     <a:srgbClr val="000000"/>
                   </a:solidFill>
@@ -13886,7 +14343,7 @@
             </a:ln>
             <a:extLst>
               <a:ext uri="{91240B29-F687-4f45-9708-019B960494DF}">
-                <a14:hiddenLine xmlns="" xmlns:a16="http://schemas.microsoft.com/office/drawing/2014/main" xmlns:p14="http://schemas.microsoft.com/office/powerpoint/2010/main" xmlns:a14="http://schemas.microsoft.com/office/drawing/2010/main" w="9525">
+                <a14:hiddenLine xmlns:a14="http://schemas.microsoft.com/office/drawing/2010/main" xmlns:p14="http://schemas.microsoft.com/office/powerpoint/2010/main" xmlns:a16="http://schemas.microsoft.com/office/drawing/2014/main" xmlns="" w="9525">
                   <a:solidFill>
                     <a:srgbClr val="000000"/>
                   </a:solidFill>
@@ -13991,7 +14448,7 @@
             </a:ln>
             <a:extLst>
               <a:ext uri="{91240B29-F687-4f45-9708-019B960494DF}">
-                <a14:hiddenLine xmlns="" xmlns:a16="http://schemas.microsoft.com/office/drawing/2014/main" xmlns:p14="http://schemas.microsoft.com/office/powerpoint/2010/main" xmlns:a14="http://schemas.microsoft.com/office/drawing/2010/main" w="9525">
+                <a14:hiddenLine xmlns:a14="http://schemas.microsoft.com/office/drawing/2010/main" xmlns:p14="http://schemas.microsoft.com/office/powerpoint/2010/main" xmlns:a16="http://schemas.microsoft.com/office/drawing/2014/main" xmlns="" w="9525">
                   <a:solidFill>
                     <a:srgbClr val="000000"/>
                   </a:solidFill>
@@ -14040,7 +14497,7 @@
             </a:ln>
             <a:extLst>
               <a:ext uri="{91240B29-F687-4f45-9708-019B960494DF}">
-                <a14:hiddenLine xmlns="" xmlns:a16="http://schemas.microsoft.com/office/drawing/2014/main" xmlns:p14="http://schemas.microsoft.com/office/powerpoint/2010/main" xmlns:a14="http://schemas.microsoft.com/office/drawing/2010/main" w="9525">
+                <a14:hiddenLine xmlns:a14="http://schemas.microsoft.com/office/drawing/2010/main" xmlns:p14="http://schemas.microsoft.com/office/powerpoint/2010/main" xmlns:a16="http://schemas.microsoft.com/office/drawing/2014/main" xmlns="" w="9525">
                   <a:solidFill>
                     <a:srgbClr val="000000"/>
                   </a:solidFill>
@@ -14145,7 +14602,7 @@
             </a:ln>
             <a:extLst>
               <a:ext uri="{91240B29-F687-4f45-9708-019B960494DF}">
-                <a14:hiddenLine xmlns="" xmlns:a16="http://schemas.microsoft.com/office/drawing/2014/main" xmlns:p14="http://schemas.microsoft.com/office/powerpoint/2010/main" xmlns:a14="http://schemas.microsoft.com/office/drawing/2010/main" w="9525">
+                <a14:hiddenLine xmlns:a14="http://schemas.microsoft.com/office/drawing/2010/main" xmlns:p14="http://schemas.microsoft.com/office/powerpoint/2010/main" xmlns:a16="http://schemas.microsoft.com/office/drawing/2014/main" xmlns="" w="9525">
                   <a:solidFill>
                     <a:srgbClr val="000000"/>
                   </a:solidFill>
@@ -14222,7 +14679,7 @@
             </a:ln>
             <a:extLst>
               <a:ext uri="{91240B29-F687-4f45-9708-019B960494DF}">
-                <a14:hiddenLine xmlns="" xmlns:a16="http://schemas.microsoft.com/office/drawing/2014/main" xmlns:p14="http://schemas.microsoft.com/office/powerpoint/2010/main" xmlns:a14="http://schemas.microsoft.com/office/drawing/2010/main" w="9525">
+                <a14:hiddenLine xmlns:a14="http://schemas.microsoft.com/office/drawing/2010/main" xmlns:p14="http://schemas.microsoft.com/office/powerpoint/2010/main" xmlns:a16="http://schemas.microsoft.com/office/drawing/2014/main" xmlns="" w="9525">
                   <a:solidFill>
                     <a:srgbClr val="000000"/>
                   </a:solidFill>
@@ -14299,7 +14756,7 @@
             </a:ln>
             <a:extLst>
               <a:ext uri="{91240B29-F687-4f45-9708-019B960494DF}">
-                <a14:hiddenLine xmlns="" xmlns:a16="http://schemas.microsoft.com/office/drawing/2014/main" xmlns:p14="http://schemas.microsoft.com/office/powerpoint/2010/main" xmlns:a14="http://schemas.microsoft.com/office/drawing/2010/main" w="9525">
+                <a14:hiddenLine xmlns:a14="http://schemas.microsoft.com/office/drawing/2010/main" xmlns:p14="http://schemas.microsoft.com/office/powerpoint/2010/main" xmlns:a16="http://schemas.microsoft.com/office/drawing/2014/main" xmlns="" w="9525">
                   <a:solidFill>
                     <a:srgbClr val="000000"/>
                   </a:solidFill>
@@ -14404,7 +14861,7 @@
             </a:ln>
             <a:extLst>
               <a:ext uri="{91240B29-F687-4f45-9708-019B960494DF}">
-                <a14:hiddenLine xmlns="" xmlns:a16="http://schemas.microsoft.com/office/drawing/2014/main" xmlns:p14="http://schemas.microsoft.com/office/powerpoint/2010/main" xmlns:a14="http://schemas.microsoft.com/office/drawing/2010/main" w="9525">
+                <a14:hiddenLine xmlns:a14="http://schemas.microsoft.com/office/drawing/2010/main" xmlns:p14="http://schemas.microsoft.com/office/powerpoint/2010/main" xmlns:a16="http://schemas.microsoft.com/office/drawing/2014/main" xmlns="" w="9525">
                   <a:solidFill>
                     <a:srgbClr val="000000"/>
                   </a:solidFill>
@@ -14481,7 +14938,7 @@
             </a:ln>
             <a:extLst>
               <a:ext uri="{91240B29-F687-4f45-9708-019B960494DF}">
-                <a14:hiddenLine xmlns="" xmlns:a16="http://schemas.microsoft.com/office/drawing/2014/main" xmlns:p14="http://schemas.microsoft.com/office/powerpoint/2010/main" xmlns:a14="http://schemas.microsoft.com/office/drawing/2010/main" w="9525">
+                <a14:hiddenLine xmlns:a14="http://schemas.microsoft.com/office/drawing/2010/main" xmlns:p14="http://schemas.microsoft.com/office/powerpoint/2010/main" xmlns:a16="http://schemas.microsoft.com/office/drawing/2014/main" xmlns="" w="9525">
                   <a:solidFill>
                     <a:srgbClr val="000000"/>
                   </a:solidFill>
@@ -14558,7 +15015,7 @@
             </a:ln>
             <a:extLst>
               <a:ext uri="{91240B29-F687-4f45-9708-019B960494DF}">
-                <a14:hiddenLine xmlns="" xmlns:a16="http://schemas.microsoft.com/office/drawing/2014/main" xmlns:p14="http://schemas.microsoft.com/office/powerpoint/2010/main" xmlns:a14="http://schemas.microsoft.com/office/drawing/2010/main" w="9525">
+                <a14:hiddenLine xmlns:a14="http://schemas.microsoft.com/office/drawing/2010/main" xmlns:p14="http://schemas.microsoft.com/office/powerpoint/2010/main" xmlns:a16="http://schemas.microsoft.com/office/drawing/2014/main" xmlns="" w="9525">
                   <a:solidFill>
                     <a:srgbClr val="000000"/>
                   </a:solidFill>
@@ -14663,7 +15120,7 @@
             </a:ln>
             <a:extLst>
               <a:ext uri="{91240B29-F687-4f45-9708-019B960494DF}">
-                <a14:hiddenLine xmlns="" xmlns:a16="http://schemas.microsoft.com/office/drawing/2014/main" xmlns:p14="http://schemas.microsoft.com/office/powerpoint/2010/main" xmlns:a14="http://schemas.microsoft.com/office/drawing/2010/main" w="9525">
+                <a14:hiddenLine xmlns:a14="http://schemas.microsoft.com/office/drawing/2010/main" xmlns:p14="http://schemas.microsoft.com/office/powerpoint/2010/main" xmlns:a16="http://schemas.microsoft.com/office/drawing/2014/main" xmlns="" w="9525">
                   <a:solidFill>
                     <a:srgbClr val="000000"/>
                   </a:solidFill>
@@ -14768,7 +15225,7 @@
             </a:ln>
             <a:extLst>
               <a:ext uri="{91240B29-F687-4f45-9708-019B960494DF}">
-                <a14:hiddenLine xmlns="" xmlns:a16="http://schemas.microsoft.com/office/drawing/2014/main" xmlns:p14="http://schemas.microsoft.com/office/powerpoint/2010/main" xmlns:a14="http://schemas.microsoft.com/office/drawing/2010/main" w="9525">
+                <a14:hiddenLine xmlns:a14="http://schemas.microsoft.com/office/drawing/2010/main" xmlns:p14="http://schemas.microsoft.com/office/powerpoint/2010/main" xmlns:a16="http://schemas.microsoft.com/office/drawing/2014/main" xmlns="" w="9525">
                   <a:solidFill>
                     <a:srgbClr val="000000"/>
                   </a:solidFill>
@@ -14845,7 +15302,7 @@
             </a:ln>
             <a:extLst>
               <a:ext uri="{91240B29-F687-4f45-9708-019B960494DF}">
-                <a14:hiddenLine xmlns="" xmlns:a16="http://schemas.microsoft.com/office/drawing/2014/main" xmlns:p14="http://schemas.microsoft.com/office/powerpoint/2010/main" xmlns:a14="http://schemas.microsoft.com/office/drawing/2010/main" w="9525">
+                <a14:hiddenLine xmlns:a14="http://schemas.microsoft.com/office/drawing/2010/main" xmlns:p14="http://schemas.microsoft.com/office/powerpoint/2010/main" xmlns:a16="http://schemas.microsoft.com/office/drawing/2014/main" xmlns="" w="9525">
                   <a:solidFill>
                     <a:srgbClr val="000000"/>
                   </a:solidFill>
@@ -14970,7 +15427,7 @@
             </a:ln>
             <a:extLst>
               <a:ext uri="{91240B29-F687-4f45-9708-019B960494DF}">
-                <a14:hiddenLine xmlns="" xmlns:a16="http://schemas.microsoft.com/office/drawing/2014/main" xmlns:p14="http://schemas.microsoft.com/office/powerpoint/2010/main" xmlns:a14="http://schemas.microsoft.com/office/drawing/2010/main" w="9525">
+                <a14:hiddenLine xmlns:a14="http://schemas.microsoft.com/office/drawing/2010/main" xmlns:p14="http://schemas.microsoft.com/office/powerpoint/2010/main" xmlns:a16="http://schemas.microsoft.com/office/drawing/2014/main" xmlns="" w="9525">
                   <a:solidFill>
                     <a:srgbClr val="000000"/>
                   </a:solidFill>
@@ -15047,7 +15504,7 @@
             </a:ln>
             <a:extLst>
               <a:ext uri="{91240B29-F687-4f45-9708-019B960494DF}">
-                <a14:hiddenLine xmlns="" xmlns:a16="http://schemas.microsoft.com/office/drawing/2014/main" xmlns:p14="http://schemas.microsoft.com/office/powerpoint/2010/main" xmlns:a14="http://schemas.microsoft.com/office/drawing/2010/main" w="9525">
+                <a14:hiddenLine xmlns:a14="http://schemas.microsoft.com/office/drawing/2010/main" xmlns:p14="http://schemas.microsoft.com/office/powerpoint/2010/main" xmlns:a16="http://schemas.microsoft.com/office/drawing/2014/main" xmlns="" w="9525">
                   <a:solidFill>
                     <a:srgbClr val="000000"/>
                   </a:solidFill>
@@ -15152,7 +15609,7 @@
             </a:ln>
             <a:extLst>
               <a:ext uri="{91240B29-F687-4f45-9708-019B960494DF}">
-                <a14:hiddenLine xmlns="" xmlns:a16="http://schemas.microsoft.com/office/drawing/2014/main" xmlns:p14="http://schemas.microsoft.com/office/powerpoint/2010/main" xmlns:a14="http://schemas.microsoft.com/office/drawing/2010/main" w="9525">
+                <a14:hiddenLine xmlns:a14="http://schemas.microsoft.com/office/drawing/2010/main" xmlns:p14="http://schemas.microsoft.com/office/powerpoint/2010/main" xmlns:a16="http://schemas.microsoft.com/office/drawing/2014/main" xmlns="" w="9525">
                   <a:solidFill>
                     <a:srgbClr val="000000"/>
                   </a:solidFill>
@@ -15257,7 +15714,7 @@
             </a:ln>
             <a:extLst>
               <a:ext uri="{91240B29-F687-4f45-9708-019B960494DF}">
-                <a14:hiddenLine xmlns="" xmlns:a16="http://schemas.microsoft.com/office/drawing/2014/main" xmlns:p14="http://schemas.microsoft.com/office/powerpoint/2010/main" xmlns:a14="http://schemas.microsoft.com/office/drawing/2010/main" w="9525">
+                <a14:hiddenLine xmlns:a14="http://schemas.microsoft.com/office/drawing/2010/main" xmlns:p14="http://schemas.microsoft.com/office/powerpoint/2010/main" xmlns:a16="http://schemas.microsoft.com/office/drawing/2014/main" xmlns="" w="9525">
                   <a:solidFill>
                     <a:srgbClr val="000000"/>
                   </a:solidFill>
@@ -15334,7 +15791,7 @@
             </a:ln>
             <a:extLst>
               <a:ext uri="{91240B29-F687-4f45-9708-019B960494DF}">
-                <a14:hiddenLine xmlns="" xmlns:a16="http://schemas.microsoft.com/office/drawing/2014/main" xmlns:p14="http://schemas.microsoft.com/office/powerpoint/2010/main" xmlns:a14="http://schemas.microsoft.com/office/drawing/2010/main" w="9525">
+                <a14:hiddenLine xmlns:a14="http://schemas.microsoft.com/office/drawing/2010/main" xmlns:p14="http://schemas.microsoft.com/office/powerpoint/2010/main" xmlns:a16="http://schemas.microsoft.com/office/drawing/2014/main" xmlns="" w="9525">
                   <a:solidFill>
                     <a:srgbClr val="000000"/>
                   </a:solidFill>
@@ -15439,7 +15896,7 @@
             </a:ln>
             <a:extLst>
               <a:ext uri="{91240B29-F687-4f45-9708-019B960494DF}">
-                <a14:hiddenLine xmlns="" xmlns:a16="http://schemas.microsoft.com/office/drawing/2014/main" xmlns:p14="http://schemas.microsoft.com/office/powerpoint/2010/main" xmlns:a14="http://schemas.microsoft.com/office/drawing/2010/main" w="9525">
+                <a14:hiddenLine xmlns:a14="http://schemas.microsoft.com/office/drawing/2010/main" xmlns:p14="http://schemas.microsoft.com/office/powerpoint/2010/main" xmlns:a16="http://schemas.microsoft.com/office/drawing/2014/main" xmlns="" w="9525">
                   <a:solidFill>
                     <a:srgbClr val="000000"/>
                   </a:solidFill>
@@ -15544,7 +16001,7 @@
             </a:ln>
             <a:extLst>
               <a:ext uri="{91240B29-F687-4f45-9708-019B960494DF}">
-                <a14:hiddenLine xmlns="" xmlns:a16="http://schemas.microsoft.com/office/drawing/2014/main" xmlns:p14="http://schemas.microsoft.com/office/powerpoint/2010/main" xmlns:a14="http://schemas.microsoft.com/office/drawing/2010/main" w="9525">
+                <a14:hiddenLine xmlns:a14="http://schemas.microsoft.com/office/drawing/2010/main" xmlns:p14="http://schemas.microsoft.com/office/powerpoint/2010/main" xmlns:a16="http://schemas.microsoft.com/office/drawing/2014/main" xmlns="" w="9525">
                   <a:solidFill>
                     <a:srgbClr val="000000"/>
                   </a:solidFill>
@@ -15615,7 +16072,7 @@
             </a:ln>
             <a:extLst>
               <a:ext uri="{91240B29-F687-4f45-9708-019B960494DF}">
-                <a14:hiddenLine xmlns="" xmlns:a16="http://schemas.microsoft.com/office/drawing/2014/main" xmlns:p14="http://schemas.microsoft.com/office/powerpoint/2010/main" xmlns:a14="http://schemas.microsoft.com/office/drawing/2010/main" w="9525">
+                <a14:hiddenLine xmlns:a14="http://schemas.microsoft.com/office/drawing/2010/main" xmlns:p14="http://schemas.microsoft.com/office/powerpoint/2010/main" xmlns:a16="http://schemas.microsoft.com/office/drawing/2014/main" xmlns="" w="9525">
                   <a:solidFill>
                     <a:srgbClr val="000000"/>
                   </a:solidFill>
@@ -15720,7 +16177,7 @@
             </a:ln>
             <a:extLst>
               <a:ext uri="{91240B29-F687-4f45-9708-019B960494DF}">
-                <a14:hiddenLine xmlns="" xmlns:a16="http://schemas.microsoft.com/office/drawing/2014/main" xmlns:p14="http://schemas.microsoft.com/office/powerpoint/2010/main" xmlns:a14="http://schemas.microsoft.com/office/drawing/2010/main" w="9525">
+                <a14:hiddenLine xmlns:a14="http://schemas.microsoft.com/office/drawing/2010/main" xmlns:p14="http://schemas.microsoft.com/office/powerpoint/2010/main" xmlns:a16="http://schemas.microsoft.com/office/drawing/2014/main" xmlns="" w="9525">
                   <a:solidFill>
                     <a:srgbClr val="000000"/>
                   </a:solidFill>
@@ -15791,7 +16248,7 @@
             </a:ln>
             <a:extLst>
               <a:ext uri="{91240B29-F687-4f45-9708-019B960494DF}">
-                <a14:hiddenLine xmlns="" xmlns:a16="http://schemas.microsoft.com/office/drawing/2014/main" xmlns:p14="http://schemas.microsoft.com/office/powerpoint/2010/main" xmlns:a14="http://schemas.microsoft.com/office/drawing/2010/main" w="9525">
+                <a14:hiddenLine xmlns:a14="http://schemas.microsoft.com/office/drawing/2010/main" xmlns:p14="http://schemas.microsoft.com/office/powerpoint/2010/main" xmlns:a16="http://schemas.microsoft.com/office/drawing/2014/main" xmlns="" w="9525">
                   <a:solidFill>
                     <a:srgbClr val="000000"/>
                   </a:solidFill>
@@ -15896,7 +16353,7 @@
             </a:ln>
             <a:extLst>
               <a:ext uri="{91240B29-F687-4f45-9708-019B960494DF}">
-                <a14:hiddenLine xmlns="" xmlns:a16="http://schemas.microsoft.com/office/drawing/2014/main" xmlns:p14="http://schemas.microsoft.com/office/powerpoint/2010/main" xmlns:a14="http://schemas.microsoft.com/office/drawing/2010/main" w="9525">
+                <a14:hiddenLine xmlns:a14="http://schemas.microsoft.com/office/drawing/2010/main" xmlns:p14="http://schemas.microsoft.com/office/powerpoint/2010/main" xmlns:a16="http://schemas.microsoft.com/office/drawing/2014/main" xmlns="" w="9525">
                   <a:solidFill>
                     <a:srgbClr val="000000"/>
                   </a:solidFill>
@@ -15979,7 +16436,7 @@
             </a:ln>
             <a:extLst>
               <a:ext uri="{91240B29-F687-4f45-9708-019B960494DF}">
-                <a14:hiddenLine xmlns="" xmlns:a16="http://schemas.microsoft.com/office/drawing/2014/main" xmlns:p14="http://schemas.microsoft.com/office/powerpoint/2010/main" xmlns:a14="http://schemas.microsoft.com/office/drawing/2010/main" w="9525">
+                <a14:hiddenLine xmlns:a14="http://schemas.microsoft.com/office/drawing/2010/main" xmlns:p14="http://schemas.microsoft.com/office/powerpoint/2010/main" xmlns:a16="http://schemas.microsoft.com/office/drawing/2014/main" xmlns="" w="9525">
                   <a:solidFill>
                     <a:srgbClr val="000000"/>
                   </a:solidFill>
@@ -16084,7 +16541,7 @@
             </a:ln>
             <a:extLst>
               <a:ext uri="{91240B29-F687-4f45-9708-019B960494DF}">
-                <a14:hiddenLine xmlns="" xmlns:a16="http://schemas.microsoft.com/office/drawing/2014/main" xmlns:p14="http://schemas.microsoft.com/office/powerpoint/2010/main" xmlns:a14="http://schemas.microsoft.com/office/drawing/2010/main" w="9525">
+                <a14:hiddenLine xmlns:a14="http://schemas.microsoft.com/office/drawing/2010/main" xmlns:p14="http://schemas.microsoft.com/office/powerpoint/2010/main" xmlns:a16="http://schemas.microsoft.com/office/drawing/2014/main" xmlns="" w="9525">
                   <a:solidFill>
                     <a:srgbClr val="000000"/>
                   </a:solidFill>
@@ -16167,7 +16624,7 @@
             </a:ln>
             <a:extLst>
               <a:ext uri="{91240B29-F687-4f45-9708-019B960494DF}">
-                <a14:hiddenLine xmlns="" xmlns:a16="http://schemas.microsoft.com/office/drawing/2014/main" xmlns:p14="http://schemas.microsoft.com/office/powerpoint/2010/main" xmlns:a14="http://schemas.microsoft.com/office/drawing/2010/main" w="9525">
+                <a14:hiddenLine xmlns:a14="http://schemas.microsoft.com/office/drawing/2010/main" xmlns:p14="http://schemas.microsoft.com/office/powerpoint/2010/main" xmlns:a16="http://schemas.microsoft.com/office/drawing/2014/main" xmlns="" w="9525">
                   <a:solidFill>
                     <a:srgbClr val="000000"/>
                   </a:solidFill>
@@ -16272,7 +16729,7 @@
             </a:ln>
             <a:extLst>
               <a:ext uri="{91240B29-F687-4f45-9708-019B960494DF}">
-                <a14:hiddenLine xmlns="" xmlns:a16="http://schemas.microsoft.com/office/drawing/2014/main" xmlns:p14="http://schemas.microsoft.com/office/powerpoint/2010/main" xmlns:a14="http://schemas.microsoft.com/office/drawing/2010/main" w="9525">
+                <a14:hiddenLine xmlns:a14="http://schemas.microsoft.com/office/drawing/2010/main" xmlns:p14="http://schemas.microsoft.com/office/powerpoint/2010/main" xmlns:a16="http://schemas.microsoft.com/office/drawing/2014/main" xmlns="" w="9525">
                   <a:solidFill>
                     <a:srgbClr val="000000"/>
                   </a:solidFill>
@@ -16321,7 +16778,7 @@
             </a:ln>
             <a:extLst>
               <a:ext uri="{91240B29-F687-4f45-9708-019B960494DF}">
-                <a14:hiddenLine xmlns="" xmlns:a16="http://schemas.microsoft.com/office/drawing/2014/main" xmlns:p14="http://schemas.microsoft.com/office/powerpoint/2010/main" xmlns:a14="http://schemas.microsoft.com/office/drawing/2010/main" w="9525">
+                <a14:hiddenLine xmlns:a14="http://schemas.microsoft.com/office/drawing/2010/main" xmlns:p14="http://schemas.microsoft.com/office/powerpoint/2010/main" xmlns:a16="http://schemas.microsoft.com/office/drawing/2014/main" xmlns="" w="9525">
                   <a:solidFill>
                     <a:srgbClr val="000000"/>
                   </a:solidFill>
@@ -16426,7 +16883,7 @@
             </a:ln>
             <a:extLst>
               <a:ext uri="{91240B29-F687-4f45-9708-019B960494DF}">
-                <a14:hiddenLine xmlns="" xmlns:a16="http://schemas.microsoft.com/office/drawing/2014/main" xmlns:p14="http://schemas.microsoft.com/office/powerpoint/2010/main" xmlns:a14="http://schemas.microsoft.com/office/drawing/2010/main" w="9525">
+                <a14:hiddenLine xmlns:a14="http://schemas.microsoft.com/office/drawing/2010/main" xmlns:p14="http://schemas.microsoft.com/office/powerpoint/2010/main" xmlns:a16="http://schemas.microsoft.com/office/drawing/2014/main" xmlns="" w="9525">
                   <a:solidFill>
                     <a:srgbClr val="000000"/>
                   </a:solidFill>
@@ -16503,7 +16960,7 @@
             </a:ln>
             <a:extLst>
               <a:ext uri="{91240B29-F687-4f45-9708-019B960494DF}">
-                <a14:hiddenLine xmlns="" xmlns:a16="http://schemas.microsoft.com/office/drawing/2014/main" xmlns:p14="http://schemas.microsoft.com/office/powerpoint/2010/main" xmlns:a14="http://schemas.microsoft.com/office/drawing/2010/main" w="9525">
+                <a14:hiddenLine xmlns:a14="http://schemas.microsoft.com/office/drawing/2010/main" xmlns:p14="http://schemas.microsoft.com/office/powerpoint/2010/main" xmlns:a16="http://schemas.microsoft.com/office/drawing/2014/main" xmlns="" w="9525">
                   <a:solidFill>
                     <a:srgbClr val="000000"/>
                   </a:solidFill>
@@ -16580,7 +17037,7 @@
             </a:ln>
             <a:extLst>
               <a:ext uri="{91240B29-F687-4f45-9708-019B960494DF}">
-                <a14:hiddenLine xmlns="" xmlns:a16="http://schemas.microsoft.com/office/drawing/2014/main" xmlns:p14="http://schemas.microsoft.com/office/powerpoint/2010/main" xmlns:a14="http://schemas.microsoft.com/office/drawing/2010/main" w="9525">
+                <a14:hiddenLine xmlns:a14="http://schemas.microsoft.com/office/drawing/2010/main" xmlns:p14="http://schemas.microsoft.com/office/powerpoint/2010/main" xmlns:a16="http://schemas.microsoft.com/office/drawing/2014/main" xmlns="" w="9525">
                   <a:solidFill>
                     <a:srgbClr val="000000"/>
                   </a:solidFill>
@@ -16685,7 +17142,7 @@
             </a:ln>
             <a:extLst>
               <a:ext uri="{91240B29-F687-4f45-9708-019B960494DF}">
-                <a14:hiddenLine xmlns="" xmlns:a16="http://schemas.microsoft.com/office/drawing/2014/main" xmlns:p14="http://schemas.microsoft.com/office/powerpoint/2010/main" xmlns:a14="http://schemas.microsoft.com/office/drawing/2010/main" w="9525">
+                <a14:hiddenLine xmlns:a14="http://schemas.microsoft.com/office/drawing/2010/main" xmlns:p14="http://schemas.microsoft.com/office/powerpoint/2010/main" xmlns:a16="http://schemas.microsoft.com/office/drawing/2014/main" xmlns="" w="9525">
                   <a:solidFill>
                     <a:srgbClr val="000000"/>
                   </a:solidFill>
@@ -16768,7 +17225,7 @@
             </a:ln>
             <a:extLst>
               <a:ext uri="{91240B29-F687-4f45-9708-019B960494DF}">
-                <a14:hiddenLine xmlns="" xmlns:a16="http://schemas.microsoft.com/office/drawing/2014/main" xmlns:p14="http://schemas.microsoft.com/office/powerpoint/2010/main" xmlns:a14="http://schemas.microsoft.com/office/drawing/2010/main" w="9525">
+                <a14:hiddenLine xmlns:a14="http://schemas.microsoft.com/office/drawing/2010/main" xmlns:p14="http://schemas.microsoft.com/office/powerpoint/2010/main" xmlns:a16="http://schemas.microsoft.com/office/drawing/2014/main" xmlns="" w="9525">
                   <a:solidFill>
                     <a:srgbClr val="000000"/>
                   </a:solidFill>
@@ -16845,7 +17302,7 @@
             </a:ln>
             <a:extLst>
               <a:ext uri="{91240B29-F687-4f45-9708-019B960494DF}">
-                <a14:hiddenLine xmlns="" xmlns:a16="http://schemas.microsoft.com/office/drawing/2014/main" xmlns:p14="http://schemas.microsoft.com/office/powerpoint/2010/main" xmlns:a14="http://schemas.microsoft.com/office/drawing/2010/main" w="9525">
+                <a14:hiddenLine xmlns:a14="http://schemas.microsoft.com/office/drawing/2010/main" xmlns:p14="http://schemas.microsoft.com/office/powerpoint/2010/main" xmlns:a16="http://schemas.microsoft.com/office/drawing/2014/main" xmlns="" w="9525">
                   <a:solidFill>
                     <a:srgbClr val="000000"/>
                   </a:solidFill>
@@ -16950,7 +17407,7 @@
             </a:ln>
             <a:extLst>
               <a:ext uri="{91240B29-F687-4f45-9708-019B960494DF}">
-                <a14:hiddenLine xmlns="" xmlns:a16="http://schemas.microsoft.com/office/drawing/2014/main" xmlns:p14="http://schemas.microsoft.com/office/powerpoint/2010/main" xmlns:a14="http://schemas.microsoft.com/office/drawing/2010/main" w="9525">
+                <a14:hiddenLine xmlns:a14="http://schemas.microsoft.com/office/drawing/2010/main" xmlns:p14="http://schemas.microsoft.com/office/powerpoint/2010/main" xmlns:a16="http://schemas.microsoft.com/office/drawing/2014/main" xmlns="" w="9525">
                   <a:solidFill>
                     <a:srgbClr val="000000"/>
                   </a:solidFill>
@@ -17027,7 +17484,7 @@
             </a:ln>
             <a:extLst>
               <a:ext uri="{91240B29-F687-4f45-9708-019B960494DF}">
-                <a14:hiddenLine xmlns="" xmlns:a16="http://schemas.microsoft.com/office/drawing/2014/main" xmlns:p14="http://schemas.microsoft.com/office/powerpoint/2010/main" xmlns:a14="http://schemas.microsoft.com/office/drawing/2010/main" w="9525">
+                <a14:hiddenLine xmlns:a14="http://schemas.microsoft.com/office/drawing/2010/main" xmlns:p14="http://schemas.microsoft.com/office/powerpoint/2010/main" xmlns:a16="http://schemas.microsoft.com/office/drawing/2014/main" xmlns="" w="9525">
                   <a:solidFill>
                     <a:srgbClr val="000000"/>
                   </a:solidFill>
@@ -17132,7 +17589,7 @@
             </a:ln>
             <a:extLst>
               <a:ext uri="{91240B29-F687-4f45-9708-019B960494DF}">
-                <a14:hiddenLine xmlns="" xmlns:a16="http://schemas.microsoft.com/office/drawing/2014/main" xmlns:p14="http://schemas.microsoft.com/office/powerpoint/2010/main" xmlns:a14="http://schemas.microsoft.com/office/drawing/2010/main" w="9525">
+                <a14:hiddenLine xmlns:a14="http://schemas.microsoft.com/office/drawing/2010/main" xmlns:p14="http://schemas.microsoft.com/office/powerpoint/2010/main" xmlns:a16="http://schemas.microsoft.com/office/drawing/2014/main" xmlns="" w="9525">
                   <a:solidFill>
                     <a:srgbClr val="000000"/>
                   </a:solidFill>
@@ -17209,7 +17666,7 @@
             </a:ln>
             <a:extLst>
               <a:ext uri="{91240B29-F687-4f45-9708-019B960494DF}">
-                <a14:hiddenLine xmlns="" xmlns:a16="http://schemas.microsoft.com/office/drawing/2014/main" xmlns:p14="http://schemas.microsoft.com/office/powerpoint/2010/main" xmlns:a14="http://schemas.microsoft.com/office/drawing/2010/main" w="9525">
+                <a14:hiddenLine xmlns:a14="http://schemas.microsoft.com/office/drawing/2010/main" xmlns:p14="http://schemas.microsoft.com/office/powerpoint/2010/main" xmlns:a16="http://schemas.microsoft.com/office/drawing/2014/main" xmlns="" w="9525">
                   <a:solidFill>
                     <a:srgbClr val="000000"/>
                   </a:solidFill>
@@ -17314,7 +17771,7 @@
             </a:ln>
             <a:extLst>
               <a:ext uri="{91240B29-F687-4f45-9708-019B960494DF}">
-                <a14:hiddenLine xmlns="" xmlns:a16="http://schemas.microsoft.com/office/drawing/2014/main" xmlns:p14="http://schemas.microsoft.com/office/powerpoint/2010/main" xmlns:a14="http://schemas.microsoft.com/office/drawing/2010/main" w="9525">
+                <a14:hiddenLine xmlns:a14="http://schemas.microsoft.com/office/drawing/2010/main" xmlns:p14="http://schemas.microsoft.com/office/powerpoint/2010/main" xmlns:a16="http://schemas.microsoft.com/office/drawing/2014/main" xmlns="" w="9525">
                   <a:solidFill>
                     <a:srgbClr val="000000"/>
                   </a:solidFill>
@@ -17363,7 +17820,7 @@
             </a:ln>
             <a:extLst>
               <a:ext uri="{91240B29-F687-4f45-9708-019B960494DF}">
-                <a14:hiddenLine xmlns="" xmlns:a16="http://schemas.microsoft.com/office/drawing/2014/main" xmlns:p14="http://schemas.microsoft.com/office/powerpoint/2010/main" xmlns:a14="http://schemas.microsoft.com/office/drawing/2010/main" w="9525">
+                <a14:hiddenLine xmlns:a14="http://schemas.microsoft.com/office/drawing/2010/main" xmlns:p14="http://schemas.microsoft.com/office/powerpoint/2010/main" xmlns:a16="http://schemas.microsoft.com/office/drawing/2014/main" xmlns="" w="9525">
                   <a:solidFill>
                     <a:srgbClr val="000000"/>
                   </a:solidFill>
@@ -17443,7 +17900,7 @@
             </a:ln>
             <a:extLst>
               <a:ext uri="{91240B29-F687-4f45-9708-019B960494DF}">
-                <a14:hiddenLine xmlns="" xmlns:a16="http://schemas.microsoft.com/office/drawing/2014/main" xmlns:p14="http://schemas.microsoft.com/office/powerpoint/2010/main" xmlns:a14="http://schemas.microsoft.com/office/drawing/2010/main" w="9525">
+                <a14:hiddenLine xmlns:a14="http://schemas.microsoft.com/office/drawing/2010/main" xmlns:p14="http://schemas.microsoft.com/office/powerpoint/2010/main" xmlns:a16="http://schemas.microsoft.com/office/drawing/2014/main" xmlns="" w="9525">
                   <a:solidFill>
                     <a:srgbClr val="000000"/>
                   </a:solidFill>
@@ -17548,7 +18005,7 @@
             </a:ln>
             <a:extLst>
               <a:ext uri="{91240B29-F687-4f45-9708-019B960494DF}">
-                <a14:hiddenLine xmlns="" xmlns:a16="http://schemas.microsoft.com/office/drawing/2014/main" xmlns:p14="http://schemas.microsoft.com/office/powerpoint/2010/main" xmlns:a14="http://schemas.microsoft.com/office/drawing/2010/main" w="9525">
+                <a14:hiddenLine xmlns:a14="http://schemas.microsoft.com/office/drawing/2010/main" xmlns:p14="http://schemas.microsoft.com/office/powerpoint/2010/main" xmlns:a16="http://schemas.microsoft.com/office/drawing/2014/main" xmlns="" w="9525">
                   <a:solidFill>
                     <a:srgbClr val="000000"/>
                   </a:solidFill>
@@ -17625,7 +18082,7 @@
             </a:ln>
             <a:extLst>
               <a:ext uri="{91240B29-F687-4f45-9708-019B960494DF}">
-                <a14:hiddenLine xmlns="" xmlns:a16="http://schemas.microsoft.com/office/drawing/2014/main" xmlns:p14="http://schemas.microsoft.com/office/powerpoint/2010/main" xmlns:a14="http://schemas.microsoft.com/office/drawing/2010/main" w="9525">
+                <a14:hiddenLine xmlns:a14="http://schemas.microsoft.com/office/drawing/2010/main" xmlns:p14="http://schemas.microsoft.com/office/powerpoint/2010/main" xmlns:a16="http://schemas.microsoft.com/office/drawing/2014/main" xmlns="" w="9525">
                   <a:solidFill>
                     <a:srgbClr val="000000"/>
                   </a:solidFill>
@@ -17730,7 +18187,7 @@
             </a:ln>
             <a:extLst>
               <a:ext uri="{91240B29-F687-4f45-9708-019B960494DF}">
-                <a14:hiddenLine xmlns="" xmlns:a16="http://schemas.microsoft.com/office/drawing/2014/main" xmlns:p14="http://schemas.microsoft.com/office/powerpoint/2010/main" xmlns:a14="http://schemas.microsoft.com/office/drawing/2010/main" w="9525">
+                <a14:hiddenLine xmlns:a14="http://schemas.microsoft.com/office/drawing/2010/main" xmlns:p14="http://schemas.microsoft.com/office/powerpoint/2010/main" xmlns:a16="http://schemas.microsoft.com/office/drawing/2014/main" xmlns="" w="9525">
                   <a:solidFill>
                     <a:srgbClr val="000000"/>
                   </a:solidFill>
@@ -17835,7 +18292,7 @@
             </a:ln>
             <a:extLst>
               <a:ext uri="{91240B29-F687-4f45-9708-019B960494DF}">
-                <a14:hiddenLine xmlns="" xmlns:a16="http://schemas.microsoft.com/office/drawing/2014/main" xmlns:p14="http://schemas.microsoft.com/office/powerpoint/2010/main" xmlns:a14="http://schemas.microsoft.com/office/drawing/2010/main" w="9525">
+                <a14:hiddenLine xmlns:a14="http://schemas.microsoft.com/office/drawing/2010/main" xmlns:p14="http://schemas.microsoft.com/office/powerpoint/2010/main" xmlns:a16="http://schemas.microsoft.com/office/drawing/2014/main" xmlns="" w="9525">
                   <a:solidFill>
                     <a:srgbClr val="000000"/>
                   </a:solidFill>
@@ -17915,7 +18372,7 @@
             </a:ln>
             <a:extLst>
               <a:ext uri="{91240B29-F687-4f45-9708-019B960494DF}">
-                <a14:hiddenLine xmlns="" xmlns:a16="http://schemas.microsoft.com/office/drawing/2014/main" xmlns:p14="http://schemas.microsoft.com/office/powerpoint/2010/main" xmlns:a14="http://schemas.microsoft.com/office/drawing/2010/main" w="9525">
+                <a14:hiddenLine xmlns:a14="http://schemas.microsoft.com/office/drawing/2010/main" xmlns:p14="http://schemas.microsoft.com/office/powerpoint/2010/main" xmlns:a16="http://schemas.microsoft.com/office/drawing/2014/main" xmlns="" w="9525">
                   <a:solidFill>
                     <a:srgbClr val="000000"/>
                   </a:solidFill>
@@ -17992,7 +18449,7 @@
             </a:ln>
             <a:extLst>
               <a:ext uri="{91240B29-F687-4f45-9708-019B960494DF}">
-                <a14:hiddenLine xmlns="" xmlns:a16="http://schemas.microsoft.com/office/drawing/2014/main" xmlns:p14="http://schemas.microsoft.com/office/powerpoint/2010/main" xmlns:a14="http://schemas.microsoft.com/office/drawing/2010/main" w="9525">
+                <a14:hiddenLine xmlns:a14="http://schemas.microsoft.com/office/drawing/2010/main" xmlns:p14="http://schemas.microsoft.com/office/powerpoint/2010/main" xmlns:a16="http://schemas.microsoft.com/office/drawing/2014/main" xmlns="" w="9525">
                   <a:solidFill>
                     <a:srgbClr val="000000"/>
                   </a:solidFill>
@@ -18097,7 +18554,7 @@
             </a:ln>
             <a:extLst>
               <a:ext uri="{91240B29-F687-4f45-9708-019B960494DF}">
-                <a14:hiddenLine xmlns="" xmlns:a16="http://schemas.microsoft.com/office/drawing/2014/main" xmlns:p14="http://schemas.microsoft.com/office/powerpoint/2010/main" xmlns:a14="http://schemas.microsoft.com/office/drawing/2010/main" w="9525">
+                <a14:hiddenLine xmlns:a14="http://schemas.microsoft.com/office/drawing/2010/main" xmlns:p14="http://schemas.microsoft.com/office/powerpoint/2010/main" xmlns:a16="http://schemas.microsoft.com/office/drawing/2014/main" xmlns="" w="9525">
                   <a:solidFill>
                     <a:srgbClr val="000000"/>
                   </a:solidFill>
@@ -18202,7 +18659,7 @@
             </a:ln>
             <a:extLst>
               <a:ext uri="{91240B29-F687-4f45-9708-019B960494DF}">
-                <a14:hiddenLine xmlns="" xmlns:a16="http://schemas.microsoft.com/office/drawing/2014/main" xmlns:p14="http://schemas.microsoft.com/office/powerpoint/2010/main" xmlns:a14="http://schemas.microsoft.com/office/drawing/2010/main" w="9525">
+                <a14:hiddenLine xmlns:a14="http://schemas.microsoft.com/office/drawing/2010/main" xmlns:p14="http://schemas.microsoft.com/office/powerpoint/2010/main" xmlns:a16="http://schemas.microsoft.com/office/drawing/2014/main" xmlns="" w="9525">
                   <a:solidFill>
                     <a:srgbClr val="000000"/>
                   </a:solidFill>
@@ -18279,7 +18736,7 @@
             </a:ln>
             <a:extLst>
               <a:ext uri="{91240B29-F687-4f45-9708-019B960494DF}">
-                <a14:hiddenLine xmlns="" xmlns:a16="http://schemas.microsoft.com/office/drawing/2014/main" xmlns:p14="http://schemas.microsoft.com/office/powerpoint/2010/main" xmlns:a14="http://schemas.microsoft.com/office/drawing/2010/main" w="9525">
+                <a14:hiddenLine xmlns:a14="http://schemas.microsoft.com/office/drawing/2010/main" xmlns:p14="http://schemas.microsoft.com/office/powerpoint/2010/main" xmlns:a16="http://schemas.microsoft.com/office/drawing/2014/main" xmlns="" w="9525">
                   <a:solidFill>
                     <a:srgbClr val="000000"/>
                   </a:solidFill>
@@ -18414,7 +18871,7 @@
             </a:ln>
             <a:extLst>
               <a:ext uri="{91240B29-F687-4f45-9708-019B960494DF}">
-                <a14:hiddenLine xmlns="" xmlns:a16="http://schemas.microsoft.com/office/drawing/2014/main" xmlns:p14="http://schemas.microsoft.com/office/powerpoint/2010/main" xmlns:a14="http://schemas.microsoft.com/office/drawing/2010/main" w="9525">
+                <a14:hiddenLine xmlns:a14="http://schemas.microsoft.com/office/drawing/2010/main" xmlns:p14="http://schemas.microsoft.com/office/powerpoint/2010/main" xmlns:a16="http://schemas.microsoft.com/office/drawing/2014/main" xmlns="" w="9525">
                   <a:solidFill>
                     <a:srgbClr val="000000"/>
                   </a:solidFill>
@@ -18497,7 +18954,7 @@
             </a:ln>
             <a:extLst>
               <a:ext uri="{91240B29-F687-4f45-9708-019B960494DF}">
-                <a14:hiddenLine xmlns="" xmlns:a16="http://schemas.microsoft.com/office/drawing/2014/main" xmlns:p14="http://schemas.microsoft.com/office/powerpoint/2010/main" xmlns:a14="http://schemas.microsoft.com/office/drawing/2010/main" w="9525">
+                <a14:hiddenLine xmlns:a14="http://schemas.microsoft.com/office/drawing/2010/main" xmlns:p14="http://schemas.microsoft.com/office/powerpoint/2010/main" xmlns:a16="http://schemas.microsoft.com/office/drawing/2014/main" xmlns="" w="9525">
                   <a:solidFill>
                     <a:srgbClr val="000000"/>
                   </a:solidFill>
@@ -18602,7 +19059,7 @@
             </a:ln>
             <a:extLst>
               <a:ext uri="{91240B29-F687-4f45-9708-019B960494DF}">
-                <a14:hiddenLine xmlns="" xmlns:a16="http://schemas.microsoft.com/office/drawing/2014/main" xmlns:p14="http://schemas.microsoft.com/office/powerpoint/2010/main" xmlns:a14="http://schemas.microsoft.com/office/drawing/2010/main" w="9525">
+                <a14:hiddenLine xmlns:a14="http://schemas.microsoft.com/office/drawing/2010/main" xmlns:p14="http://schemas.microsoft.com/office/powerpoint/2010/main" xmlns:a16="http://schemas.microsoft.com/office/drawing/2014/main" xmlns="" w="9525">
                   <a:solidFill>
                     <a:srgbClr val="000000"/>
                   </a:solidFill>
@@ -18723,7 +19180,7 @@
           <a:noFill/>
           <a:extLst>
             <a:ext uri="{909E8E84-426E-40dd-AFC4-6F175D3DCCD1}">
-              <a14:hiddenFill xmlns="" xmlns:a16="http://schemas.microsoft.com/office/drawing/2014/main" xmlns:p14="http://schemas.microsoft.com/office/powerpoint/2010/main" xmlns:a14="http://schemas.microsoft.com/office/drawing/2010/main">
+              <a14:hiddenFill xmlns:a14="http://schemas.microsoft.com/office/drawing/2010/main" xmlns:p14="http://schemas.microsoft.com/office/powerpoint/2010/main" xmlns:a16="http://schemas.microsoft.com/office/drawing/2014/main" xmlns="">
                 <a:solidFill>
                   <a:srgbClr val="FFFFFF"/>
                 </a:solidFill>
@@ -18815,7 +19272,7 @@
             </a:ln>
             <a:extLst>
               <a:ext uri="{91240B29-F687-4f45-9708-019B960494DF}">
-                <a14:hiddenLine xmlns="" xmlns:a16="http://schemas.microsoft.com/office/drawing/2014/main" xmlns:p14="http://schemas.microsoft.com/office/powerpoint/2010/main" xmlns:a14="http://schemas.microsoft.com/office/drawing/2010/main" w="9525">
+                <a14:hiddenLine xmlns:a14="http://schemas.microsoft.com/office/drawing/2010/main" xmlns:p14="http://schemas.microsoft.com/office/powerpoint/2010/main" xmlns:a16="http://schemas.microsoft.com/office/drawing/2014/main" xmlns="" w="9525">
                   <a:solidFill>
                     <a:srgbClr val="000000"/>
                   </a:solidFill>
@@ -18920,7 +19377,7 @@
             </a:ln>
             <a:extLst>
               <a:ext uri="{91240B29-F687-4f45-9708-019B960494DF}">
-                <a14:hiddenLine xmlns="" xmlns:a16="http://schemas.microsoft.com/office/drawing/2014/main" xmlns:p14="http://schemas.microsoft.com/office/powerpoint/2010/main" xmlns:a14="http://schemas.microsoft.com/office/drawing/2010/main" w="9525">
+                <a14:hiddenLine xmlns:a14="http://schemas.microsoft.com/office/drawing/2010/main" xmlns:p14="http://schemas.microsoft.com/office/powerpoint/2010/main" xmlns:a16="http://schemas.microsoft.com/office/drawing/2014/main" xmlns="" w="9525">
                   <a:solidFill>
                     <a:srgbClr val="000000"/>
                   </a:solidFill>
@@ -19025,7 +19482,7 @@
             </a:ln>
             <a:extLst>
               <a:ext uri="{91240B29-F687-4f45-9708-019B960494DF}">
-                <a14:hiddenLine xmlns="" xmlns:a16="http://schemas.microsoft.com/office/drawing/2014/main" xmlns:p14="http://schemas.microsoft.com/office/powerpoint/2010/main" xmlns:a14="http://schemas.microsoft.com/office/drawing/2010/main" w="9525">
+                <a14:hiddenLine xmlns:a14="http://schemas.microsoft.com/office/drawing/2010/main" xmlns:p14="http://schemas.microsoft.com/office/powerpoint/2010/main" xmlns:a16="http://schemas.microsoft.com/office/drawing/2014/main" xmlns="" w="9525">
                   <a:solidFill>
                     <a:srgbClr val="000000"/>
                   </a:solidFill>
@@ -19074,7 +19531,7 @@
             </a:ln>
             <a:extLst>
               <a:ext uri="{91240B29-F687-4f45-9708-019B960494DF}">
-                <a14:hiddenLine xmlns="" xmlns:a16="http://schemas.microsoft.com/office/drawing/2014/main" xmlns:p14="http://schemas.microsoft.com/office/powerpoint/2010/main" xmlns:a14="http://schemas.microsoft.com/office/drawing/2010/main" w="9525">
+                <a14:hiddenLine xmlns:a14="http://schemas.microsoft.com/office/drawing/2010/main" xmlns:p14="http://schemas.microsoft.com/office/powerpoint/2010/main" xmlns:a16="http://schemas.microsoft.com/office/drawing/2014/main" xmlns="" w="9525">
                   <a:solidFill>
                     <a:srgbClr val="000000"/>
                   </a:solidFill>
@@ -19179,7 +19636,7 @@
             </a:ln>
             <a:extLst>
               <a:ext uri="{91240B29-F687-4f45-9708-019B960494DF}">
-                <a14:hiddenLine xmlns="" xmlns:a16="http://schemas.microsoft.com/office/drawing/2014/main" xmlns:p14="http://schemas.microsoft.com/office/powerpoint/2010/main" xmlns:a14="http://schemas.microsoft.com/office/drawing/2010/main" w="9525">
+                <a14:hiddenLine xmlns:a14="http://schemas.microsoft.com/office/drawing/2010/main" xmlns:p14="http://schemas.microsoft.com/office/powerpoint/2010/main" xmlns:a16="http://schemas.microsoft.com/office/drawing/2014/main" xmlns="" w="9525">
                   <a:solidFill>
                     <a:srgbClr val="000000"/>
                   </a:solidFill>
@@ -19256,7 +19713,7 @@
             </a:ln>
             <a:extLst>
               <a:ext uri="{91240B29-F687-4f45-9708-019B960494DF}">
-                <a14:hiddenLine xmlns="" xmlns:a16="http://schemas.microsoft.com/office/drawing/2014/main" xmlns:p14="http://schemas.microsoft.com/office/powerpoint/2010/main" xmlns:a14="http://schemas.microsoft.com/office/drawing/2010/main" w="9525">
+                <a14:hiddenLine xmlns:a14="http://schemas.microsoft.com/office/drawing/2010/main" xmlns:p14="http://schemas.microsoft.com/office/powerpoint/2010/main" xmlns:a16="http://schemas.microsoft.com/office/drawing/2014/main" xmlns="" w="9525">
                   <a:solidFill>
                     <a:srgbClr val="000000"/>
                   </a:solidFill>
@@ -19333,7 +19790,7 @@
             </a:ln>
             <a:extLst>
               <a:ext uri="{91240B29-F687-4f45-9708-019B960494DF}">
-                <a14:hiddenLine xmlns="" xmlns:a16="http://schemas.microsoft.com/office/drawing/2014/main" xmlns:p14="http://schemas.microsoft.com/office/powerpoint/2010/main" xmlns:a14="http://schemas.microsoft.com/office/drawing/2010/main" w="9525">
+                <a14:hiddenLine xmlns:a14="http://schemas.microsoft.com/office/drawing/2010/main" xmlns:p14="http://schemas.microsoft.com/office/powerpoint/2010/main" xmlns:a16="http://schemas.microsoft.com/office/drawing/2014/main" xmlns="" w="9525">
                   <a:solidFill>
                     <a:srgbClr val="000000"/>
                   </a:solidFill>
@@ -19438,7 +19895,7 @@
             </a:ln>
             <a:extLst>
               <a:ext uri="{91240B29-F687-4f45-9708-019B960494DF}">
-                <a14:hiddenLine xmlns="" xmlns:a16="http://schemas.microsoft.com/office/drawing/2014/main" xmlns:p14="http://schemas.microsoft.com/office/powerpoint/2010/main" xmlns:a14="http://schemas.microsoft.com/office/drawing/2010/main" w="9525">
+                <a14:hiddenLine xmlns:a14="http://schemas.microsoft.com/office/drawing/2010/main" xmlns:p14="http://schemas.microsoft.com/office/powerpoint/2010/main" xmlns:a16="http://schemas.microsoft.com/office/drawing/2014/main" xmlns="" w="9525">
                   <a:solidFill>
                     <a:srgbClr val="000000"/>
                   </a:solidFill>
@@ -19515,7 +19972,7 @@
             </a:ln>
             <a:extLst>
               <a:ext uri="{91240B29-F687-4f45-9708-019B960494DF}">
-                <a14:hiddenLine xmlns="" xmlns:a16="http://schemas.microsoft.com/office/drawing/2014/main" xmlns:p14="http://schemas.microsoft.com/office/powerpoint/2010/main" xmlns:a14="http://schemas.microsoft.com/office/drawing/2010/main" w="9525">
+                <a14:hiddenLine xmlns:a14="http://schemas.microsoft.com/office/drawing/2010/main" xmlns:p14="http://schemas.microsoft.com/office/powerpoint/2010/main" xmlns:a16="http://schemas.microsoft.com/office/drawing/2014/main" xmlns="" w="9525">
                   <a:solidFill>
                     <a:srgbClr val="000000"/>
                   </a:solidFill>
@@ -19592,7 +20049,7 @@
             </a:ln>
             <a:extLst>
               <a:ext uri="{91240B29-F687-4f45-9708-019B960494DF}">
-                <a14:hiddenLine xmlns="" xmlns:a16="http://schemas.microsoft.com/office/drawing/2014/main" xmlns:p14="http://schemas.microsoft.com/office/powerpoint/2010/main" xmlns:a14="http://schemas.microsoft.com/office/drawing/2010/main" w="9525">
+                <a14:hiddenLine xmlns:a14="http://schemas.microsoft.com/office/drawing/2010/main" xmlns:p14="http://schemas.microsoft.com/office/powerpoint/2010/main" xmlns:a16="http://schemas.microsoft.com/office/drawing/2014/main" xmlns="" w="9525">
                   <a:solidFill>
                     <a:srgbClr val="000000"/>
                   </a:solidFill>
@@ -19697,7 +20154,7 @@
             </a:ln>
             <a:extLst>
               <a:ext uri="{91240B29-F687-4f45-9708-019B960494DF}">
-                <a14:hiddenLine xmlns="" xmlns:a16="http://schemas.microsoft.com/office/drawing/2014/main" xmlns:p14="http://schemas.microsoft.com/office/powerpoint/2010/main" xmlns:a14="http://schemas.microsoft.com/office/drawing/2010/main" w="9525">
+                <a14:hiddenLine xmlns:a14="http://schemas.microsoft.com/office/drawing/2010/main" xmlns:p14="http://schemas.microsoft.com/office/powerpoint/2010/main" xmlns:a16="http://schemas.microsoft.com/office/drawing/2014/main" xmlns="" w="9525">
                   <a:solidFill>
                     <a:srgbClr val="000000"/>
                   </a:solidFill>
@@ -19802,7 +20259,7 @@
             </a:ln>
             <a:extLst>
               <a:ext uri="{91240B29-F687-4f45-9708-019B960494DF}">
-                <a14:hiddenLine xmlns="" xmlns:a16="http://schemas.microsoft.com/office/drawing/2014/main" xmlns:p14="http://schemas.microsoft.com/office/powerpoint/2010/main" xmlns:a14="http://schemas.microsoft.com/office/drawing/2010/main" w="9525">
+                <a14:hiddenLine xmlns:a14="http://schemas.microsoft.com/office/drawing/2010/main" xmlns:p14="http://schemas.microsoft.com/office/powerpoint/2010/main" xmlns:a16="http://schemas.microsoft.com/office/drawing/2014/main" xmlns="" w="9525">
                   <a:solidFill>
                     <a:srgbClr val="000000"/>
                   </a:solidFill>
@@ -19879,7 +20336,7 @@
             </a:ln>
             <a:extLst>
               <a:ext uri="{91240B29-F687-4f45-9708-019B960494DF}">
-                <a14:hiddenLine xmlns="" xmlns:a16="http://schemas.microsoft.com/office/drawing/2014/main" xmlns:p14="http://schemas.microsoft.com/office/powerpoint/2010/main" xmlns:a14="http://schemas.microsoft.com/office/drawing/2010/main" w="9525">
+                <a14:hiddenLine xmlns:a14="http://schemas.microsoft.com/office/drawing/2010/main" xmlns:p14="http://schemas.microsoft.com/office/powerpoint/2010/main" xmlns:a16="http://schemas.microsoft.com/office/drawing/2014/main" xmlns="" w="9525">
                   <a:solidFill>
                     <a:srgbClr val="000000"/>
                   </a:solidFill>
@@ -20004,7 +20461,7 @@
             </a:ln>
             <a:extLst>
               <a:ext uri="{91240B29-F687-4f45-9708-019B960494DF}">
-                <a14:hiddenLine xmlns="" xmlns:a16="http://schemas.microsoft.com/office/drawing/2014/main" xmlns:p14="http://schemas.microsoft.com/office/powerpoint/2010/main" xmlns:a14="http://schemas.microsoft.com/office/drawing/2010/main" w="9525">
+                <a14:hiddenLine xmlns:a14="http://schemas.microsoft.com/office/drawing/2010/main" xmlns:p14="http://schemas.microsoft.com/office/powerpoint/2010/main" xmlns:a16="http://schemas.microsoft.com/office/drawing/2014/main" xmlns="" w="9525">
                   <a:solidFill>
                     <a:srgbClr val="000000"/>
                   </a:solidFill>
@@ -20081,7 +20538,7 @@
             </a:ln>
             <a:extLst>
               <a:ext uri="{91240B29-F687-4f45-9708-019B960494DF}">
-                <a14:hiddenLine xmlns="" xmlns:a16="http://schemas.microsoft.com/office/drawing/2014/main" xmlns:p14="http://schemas.microsoft.com/office/powerpoint/2010/main" xmlns:a14="http://schemas.microsoft.com/office/drawing/2010/main" w="9525">
+                <a14:hiddenLine xmlns:a14="http://schemas.microsoft.com/office/drawing/2010/main" xmlns:p14="http://schemas.microsoft.com/office/powerpoint/2010/main" xmlns:a16="http://schemas.microsoft.com/office/drawing/2014/main" xmlns="" w="9525">
                   <a:solidFill>
                     <a:srgbClr val="000000"/>
                   </a:solidFill>
@@ -20186,7 +20643,7 @@
             </a:ln>
             <a:extLst>
               <a:ext uri="{91240B29-F687-4f45-9708-019B960494DF}">
-                <a14:hiddenLine xmlns="" xmlns:a16="http://schemas.microsoft.com/office/drawing/2014/main" xmlns:p14="http://schemas.microsoft.com/office/powerpoint/2010/main" xmlns:a14="http://schemas.microsoft.com/office/drawing/2010/main" w="9525">
+                <a14:hiddenLine xmlns:a14="http://schemas.microsoft.com/office/drawing/2010/main" xmlns:p14="http://schemas.microsoft.com/office/powerpoint/2010/main" xmlns:a16="http://schemas.microsoft.com/office/drawing/2014/main" xmlns="" w="9525">
                   <a:solidFill>
                     <a:srgbClr val="000000"/>
                   </a:solidFill>
@@ -20291,7 +20748,7 @@
             </a:ln>
             <a:extLst>
               <a:ext uri="{91240B29-F687-4f45-9708-019B960494DF}">
-                <a14:hiddenLine xmlns="" xmlns:a16="http://schemas.microsoft.com/office/drawing/2014/main" xmlns:p14="http://schemas.microsoft.com/office/powerpoint/2010/main" xmlns:a14="http://schemas.microsoft.com/office/drawing/2010/main" w="9525">
+                <a14:hiddenLine xmlns:a14="http://schemas.microsoft.com/office/drawing/2010/main" xmlns:p14="http://schemas.microsoft.com/office/powerpoint/2010/main" xmlns:a16="http://schemas.microsoft.com/office/drawing/2014/main" xmlns="" w="9525">
                   <a:solidFill>
                     <a:srgbClr val="000000"/>
                   </a:solidFill>
@@ -20368,7 +20825,7 @@
             </a:ln>
             <a:extLst>
               <a:ext uri="{91240B29-F687-4f45-9708-019B960494DF}">
-                <a14:hiddenLine xmlns="" xmlns:a16="http://schemas.microsoft.com/office/drawing/2014/main" xmlns:p14="http://schemas.microsoft.com/office/powerpoint/2010/main" xmlns:a14="http://schemas.microsoft.com/office/drawing/2010/main" w="9525">
+                <a14:hiddenLine xmlns:a14="http://schemas.microsoft.com/office/drawing/2010/main" xmlns:p14="http://schemas.microsoft.com/office/powerpoint/2010/main" xmlns:a16="http://schemas.microsoft.com/office/drawing/2014/main" xmlns="" w="9525">
                   <a:solidFill>
                     <a:srgbClr val="000000"/>
                   </a:solidFill>
@@ -20473,7 +20930,7 @@
             </a:ln>
             <a:extLst>
               <a:ext uri="{91240B29-F687-4f45-9708-019B960494DF}">
-                <a14:hiddenLine xmlns="" xmlns:a16="http://schemas.microsoft.com/office/drawing/2014/main" xmlns:p14="http://schemas.microsoft.com/office/powerpoint/2010/main" xmlns:a14="http://schemas.microsoft.com/office/drawing/2010/main" w="9525">
+                <a14:hiddenLine xmlns:a14="http://schemas.microsoft.com/office/drawing/2010/main" xmlns:p14="http://schemas.microsoft.com/office/powerpoint/2010/main" xmlns:a16="http://schemas.microsoft.com/office/drawing/2014/main" xmlns="" w="9525">
                   <a:solidFill>
                     <a:srgbClr val="000000"/>
                   </a:solidFill>
@@ -20578,7 +21035,7 @@
             </a:ln>
             <a:extLst>
               <a:ext uri="{91240B29-F687-4f45-9708-019B960494DF}">
-                <a14:hiddenLine xmlns="" xmlns:a16="http://schemas.microsoft.com/office/drawing/2014/main" xmlns:p14="http://schemas.microsoft.com/office/powerpoint/2010/main" xmlns:a14="http://schemas.microsoft.com/office/drawing/2010/main" w="9525">
+                <a14:hiddenLine xmlns:a14="http://schemas.microsoft.com/office/drawing/2010/main" xmlns:p14="http://schemas.microsoft.com/office/powerpoint/2010/main" xmlns:a16="http://schemas.microsoft.com/office/drawing/2014/main" xmlns="" w="9525">
                   <a:solidFill>
                     <a:srgbClr val="000000"/>
                   </a:solidFill>
@@ -20649,7 +21106,7 @@
             </a:ln>
             <a:extLst>
               <a:ext uri="{91240B29-F687-4f45-9708-019B960494DF}">
-                <a14:hiddenLine xmlns="" xmlns:a16="http://schemas.microsoft.com/office/drawing/2014/main" xmlns:p14="http://schemas.microsoft.com/office/powerpoint/2010/main" xmlns:a14="http://schemas.microsoft.com/office/drawing/2010/main" w="9525">
+                <a14:hiddenLine xmlns:a14="http://schemas.microsoft.com/office/drawing/2010/main" xmlns:p14="http://schemas.microsoft.com/office/powerpoint/2010/main" xmlns:a16="http://schemas.microsoft.com/office/drawing/2014/main" xmlns="" w="9525">
                   <a:solidFill>
                     <a:srgbClr val="000000"/>
                   </a:solidFill>
@@ -20754,7 +21211,7 @@
             </a:ln>
             <a:extLst>
               <a:ext uri="{91240B29-F687-4f45-9708-019B960494DF}">
-                <a14:hiddenLine xmlns="" xmlns:a16="http://schemas.microsoft.com/office/drawing/2014/main" xmlns:p14="http://schemas.microsoft.com/office/powerpoint/2010/main" xmlns:a14="http://schemas.microsoft.com/office/drawing/2010/main" w="9525">
+                <a14:hiddenLine xmlns:a14="http://schemas.microsoft.com/office/drawing/2010/main" xmlns:p14="http://schemas.microsoft.com/office/powerpoint/2010/main" xmlns:a16="http://schemas.microsoft.com/office/drawing/2014/main" xmlns="" w="9525">
                   <a:solidFill>
                     <a:srgbClr val="000000"/>
                   </a:solidFill>
@@ -20825,7 +21282,7 @@
             </a:ln>
             <a:extLst>
               <a:ext uri="{91240B29-F687-4f45-9708-019B960494DF}">
-                <a14:hiddenLine xmlns="" xmlns:a16="http://schemas.microsoft.com/office/drawing/2014/main" xmlns:p14="http://schemas.microsoft.com/office/powerpoint/2010/main" xmlns:a14="http://schemas.microsoft.com/office/drawing/2010/main" w="9525">
+                <a14:hiddenLine xmlns:a14="http://schemas.microsoft.com/office/drawing/2010/main" xmlns:p14="http://schemas.microsoft.com/office/powerpoint/2010/main" xmlns:a16="http://schemas.microsoft.com/office/drawing/2014/main" xmlns="" w="9525">
                   <a:solidFill>
                     <a:srgbClr val="000000"/>
                   </a:solidFill>
@@ -20930,7 +21387,7 @@
             </a:ln>
             <a:extLst>
               <a:ext uri="{91240B29-F687-4f45-9708-019B960494DF}">
-                <a14:hiddenLine xmlns="" xmlns:a16="http://schemas.microsoft.com/office/drawing/2014/main" xmlns:p14="http://schemas.microsoft.com/office/powerpoint/2010/main" xmlns:a14="http://schemas.microsoft.com/office/drawing/2010/main" w="9525">
+                <a14:hiddenLine xmlns:a14="http://schemas.microsoft.com/office/drawing/2010/main" xmlns:p14="http://schemas.microsoft.com/office/powerpoint/2010/main" xmlns:a16="http://schemas.microsoft.com/office/drawing/2014/main" xmlns="" w="9525">
                   <a:solidFill>
                     <a:srgbClr val="000000"/>
                   </a:solidFill>
@@ -21013,7 +21470,7 @@
             </a:ln>
             <a:extLst>
               <a:ext uri="{91240B29-F687-4f45-9708-019B960494DF}">
-                <a14:hiddenLine xmlns="" xmlns:a16="http://schemas.microsoft.com/office/drawing/2014/main" xmlns:p14="http://schemas.microsoft.com/office/powerpoint/2010/main" xmlns:a14="http://schemas.microsoft.com/office/drawing/2010/main" w="9525">
+                <a14:hiddenLine xmlns:a14="http://schemas.microsoft.com/office/drawing/2010/main" xmlns:p14="http://schemas.microsoft.com/office/powerpoint/2010/main" xmlns:a16="http://schemas.microsoft.com/office/drawing/2014/main" xmlns="" w="9525">
                   <a:solidFill>
                     <a:srgbClr val="000000"/>
                   </a:solidFill>
@@ -21118,7 +21575,7 @@
             </a:ln>
             <a:extLst>
               <a:ext uri="{91240B29-F687-4f45-9708-019B960494DF}">
-                <a14:hiddenLine xmlns="" xmlns:a16="http://schemas.microsoft.com/office/drawing/2014/main" xmlns:p14="http://schemas.microsoft.com/office/powerpoint/2010/main" xmlns:a14="http://schemas.microsoft.com/office/drawing/2010/main" w="9525">
+                <a14:hiddenLine xmlns:a14="http://schemas.microsoft.com/office/drawing/2010/main" xmlns:p14="http://schemas.microsoft.com/office/powerpoint/2010/main" xmlns:a16="http://schemas.microsoft.com/office/drawing/2014/main" xmlns="" w="9525">
                   <a:solidFill>
                     <a:srgbClr val="000000"/>
                   </a:solidFill>
@@ -21201,7 +21658,7 @@
             </a:ln>
             <a:extLst>
               <a:ext uri="{91240B29-F687-4f45-9708-019B960494DF}">
-                <a14:hiddenLine xmlns="" xmlns:a16="http://schemas.microsoft.com/office/drawing/2014/main" xmlns:p14="http://schemas.microsoft.com/office/powerpoint/2010/main" xmlns:a14="http://schemas.microsoft.com/office/drawing/2010/main" w="9525">
+                <a14:hiddenLine xmlns:a14="http://schemas.microsoft.com/office/drawing/2010/main" xmlns:p14="http://schemas.microsoft.com/office/powerpoint/2010/main" xmlns:a16="http://schemas.microsoft.com/office/drawing/2014/main" xmlns="" w="9525">
                   <a:solidFill>
                     <a:srgbClr val="000000"/>
                   </a:solidFill>
@@ -21306,7 +21763,7 @@
             </a:ln>
             <a:extLst>
               <a:ext uri="{91240B29-F687-4f45-9708-019B960494DF}">
-                <a14:hiddenLine xmlns="" xmlns:a16="http://schemas.microsoft.com/office/drawing/2014/main" xmlns:p14="http://schemas.microsoft.com/office/powerpoint/2010/main" xmlns:a14="http://schemas.microsoft.com/office/drawing/2010/main" w="9525">
+                <a14:hiddenLine xmlns:a14="http://schemas.microsoft.com/office/drawing/2010/main" xmlns:p14="http://schemas.microsoft.com/office/powerpoint/2010/main" xmlns:a16="http://schemas.microsoft.com/office/drawing/2014/main" xmlns="" w="9525">
                   <a:solidFill>
                     <a:srgbClr val="000000"/>
                   </a:solidFill>
@@ -21355,7 +21812,7 @@
             </a:ln>
             <a:extLst>
               <a:ext uri="{91240B29-F687-4f45-9708-019B960494DF}">
-                <a14:hiddenLine xmlns="" xmlns:a16="http://schemas.microsoft.com/office/drawing/2014/main" xmlns:p14="http://schemas.microsoft.com/office/powerpoint/2010/main" xmlns:a14="http://schemas.microsoft.com/office/drawing/2010/main" w="9525">
+                <a14:hiddenLine xmlns:a14="http://schemas.microsoft.com/office/drawing/2010/main" xmlns:p14="http://schemas.microsoft.com/office/powerpoint/2010/main" xmlns:a16="http://schemas.microsoft.com/office/drawing/2014/main" xmlns="" w="9525">
                   <a:solidFill>
                     <a:srgbClr val="000000"/>
                   </a:solidFill>
@@ -21460,7 +21917,7 @@
             </a:ln>
             <a:extLst>
               <a:ext uri="{91240B29-F687-4f45-9708-019B960494DF}">
-                <a14:hiddenLine xmlns="" xmlns:a16="http://schemas.microsoft.com/office/drawing/2014/main" xmlns:p14="http://schemas.microsoft.com/office/powerpoint/2010/main" xmlns:a14="http://schemas.microsoft.com/office/drawing/2010/main" w="9525">
+                <a14:hiddenLine xmlns:a14="http://schemas.microsoft.com/office/drawing/2010/main" xmlns:p14="http://schemas.microsoft.com/office/powerpoint/2010/main" xmlns:a16="http://schemas.microsoft.com/office/drawing/2014/main" xmlns="" w="9525">
                   <a:solidFill>
                     <a:srgbClr val="000000"/>
                   </a:solidFill>
@@ -21537,7 +21994,7 @@
             </a:ln>
             <a:extLst>
               <a:ext uri="{91240B29-F687-4f45-9708-019B960494DF}">
-                <a14:hiddenLine xmlns="" xmlns:a16="http://schemas.microsoft.com/office/drawing/2014/main" xmlns:p14="http://schemas.microsoft.com/office/powerpoint/2010/main" xmlns:a14="http://schemas.microsoft.com/office/drawing/2010/main" w="9525">
+                <a14:hiddenLine xmlns:a14="http://schemas.microsoft.com/office/drawing/2010/main" xmlns:p14="http://schemas.microsoft.com/office/powerpoint/2010/main" xmlns:a16="http://schemas.microsoft.com/office/drawing/2014/main" xmlns="" w="9525">
                   <a:solidFill>
                     <a:srgbClr val="000000"/>
                   </a:solidFill>
@@ -21614,7 +22071,7 @@
             </a:ln>
             <a:extLst>
               <a:ext uri="{91240B29-F687-4f45-9708-019B960494DF}">
-                <a14:hiddenLine xmlns="" xmlns:a16="http://schemas.microsoft.com/office/drawing/2014/main" xmlns:p14="http://schemas.microsoft.com/office/powerpoint/2010/main" xmlns:a14="http://schemas.microsoft.com/office/drawing/2010/main" w="9525">
+                <a14:hiddenLine xmlns:a14="http://schemas.microsoft.com/office/drawing/2010/main" xmlns:p14="http://schemas.microsoft.com/office/powerpoint/2010/main" xmlns:a16="http://schemas.microsoft.com/office/drawing/2014/main" xmlns="" w="9525">
                   <a:solidFill>
                     <a:srgbClr val="000000"/>
                   </a:solidFill>
@@ -21719,7 +22176,7 @@
             </a:ln>
             <a:extLst>
               <a:ext uri="{91240B29-F687-4f45-9708-019B960494DF}">
-                <a14:hiddenLine xmlns="" xmlns:a16="http://schemas.microsoft.com/office/drawing/2014/main" xmlns:p14="http://schemas.microsoft.com/office/powerpoint/2010/main" xmlns:a14="http://schemas.microsoft.com/office/drawing/2010/main" w="9525">
+                <a14:hiddenLine xmlns:a14="http://schemas.microsoft.com/office/drawing/2010/main" xmlns:p14="http://schemas.microsoft.com/office/powerpoint/2010/main" xmlns:a16="http://schemas.microsoft.com/office/drawing/2014/main" xmlns="" w="9525">
                   <a:solidFill>
                     <a:srgbClr val="000000"/>
                   </a:solidFill>
@@ -21802,7 +22259,7 @@
             </a:ln>
             <a:extLst>
               <a:ext uri="{91240B29-F687-4f45-9708-019B960494DF}">
-                <a14:hiddenLine xmlns="" xmlns:a16="http://schemas.microsoft.com/office/drawing/2014/main" xmlns:p14="http://schemas.microsoft.com/office/powerpoint/2010/main" xmlns:a14="http://schemas.microsoft.com/office/drawing/2010/main" w="9525">
+                <a14:hiddenLine xmlns:a14="http://schemas.microsoft.com/office/drawing/2010/main" xmlns:p14="http://schemas.microsoft.com/office/powerpoint/2010/main" xmlns:a16="http://schemas.microsoft.com/office/drawing/2014/main" xmlns="" w="9525">
                   <a:solidFill>
                     <a:srgbClr val="000000"/>
                   </a:solidFill>
@@ -21879,7 +22336,7 @@
             </a:ln>
             <a:extLst>
               <a:ext uri="{91240B29-F687-4f45-9708-019B960494DF}">
-                <a14:hiddenLine xmlns="" xmlns:a16="http://schemas.microsoft.com/office/drawing/2014/main" xmlns:p14="http://schemas.microsoft.com/office/powerpoint/2010/main" xmlns:a14="http://schemas.microsoft.com/office/drawing/2010/main" w="9525">
+                <a14:hiddenLine xmlns:a14="http://schemas.microsoft.com/office/drawing/2010/main" xmlns:p14="http://schemas.microsoft.com/office/powerpoint/2010/main" xmlns:a16="http://schemas.microsoft.com/office/drawing/2014/main" xmlns="" w="9525">
                   <a:solidFill>
                     <a:srgbClr val="000000"/>
                   </a:solidFill>
@@ -21984,7 +22441,7 @@
             </a:ln>
             <a:extLst>
               <a:ext uri="{91240B29-F687-4f45-9708-019B960494DF}">
-                <a14:hiddenLine xmlns="" xmlns:a16="http://schemas.microsoft.com/office/drawing/2014/main" xmlns:p14="http://schemas.microsoft.com/office/powerpoint/2010/main" xmlns:a14="http://schemas.microsoft.com/office/drawing/2010/main" w="9525">
+                <a14:hiddenLine xmlns:a14="http://schemas.microsoft.com/office/drawing/2010/main" xmlns:p14="http://schemas.microsoft.com/office/powerpoint/2010/main" xmlns:a16="http://schemas.microsoft.com/office/drawing/2014/main" xmlns="" w="9525">
                   <a:solidFill>
                     <a:srgbClr val="000000"/>
                   </a:solidFill>
@@ -22061,7 +22518,7 @@
             </a:ln>
             <a:extLst>
               <a:ext uri="{91240B29-F687-4f45-9708-019B960494DF}">
-                <a14:hiddenLine xmlns="" xmlns:a16="http://schemas.microsoft.com/office/drawing/2014/main" xmlns:p14="http://schemas.microsoft.com/office/powerpoint/2010/main" xmlns:a14="http://schemas.microsoft.com/office/drawing/2010/main" w="9525">
+                <a14:hiddenLine xmlns:a14="http://schemas.microsoft.com/office/drawing/2010/main" xmlns:p14="http://schemas.microsoft.com/office/powerpoint/2010/main" xmlns:a16="http://schemas.microsoft.com/office/drawing/2014/main" xmlns="" w="9525">
                   <a:solidFill>
                     <a:srgbClr val="000000"/>
                   </a:solidFill>
@@ -22166,7 +22623,7 @@
             </a:ln>
             <a:extLst>
               <a:ext uri="{91240B29-F687-4f45-9708-019B960494DF}">
-                <a14:hiddenLine xmlns="" xmlns:a16="http://schemas.microsoft.com/office/drawing/2014/main" xmlns:p14="http://schemas.microsoft.com/office/powerpoint/2010/main" xmlns:a14="http://schemas.microsoft.com/office/drawing/2010/main" w="9525">
+                <a14:hiddenLine xmlns:a14="http://schemas.microsoft.com/office/drawing/2010/main" xmlns:p14="http://schemas.microsoft.com/office/powerpoint/2010/main" xmlns:a16="http://schemas.microsoft.com/office/drawing/2014/main" xmlns="" w="9525">
                   <a:solidFill>
                     <a:srgbClr val="000000"/>
                   </a:solidFill>
@@ -22243,7 +22700,7 @@
             </a:ln>
             <a:extLst>
               <a:ext uri="{91240B29-F687-4f45-9708-019B960494DF}">
-                <a14:hiddenLine xmlns="" xmlns:a16="http://schemas.microsoft.com/office/drawing/2014/main" xmlns:p14="http://schemas.microsoft.com/office/powerpoint/2010/main" xmlns:a14="http://schemas.microsoft.com/office/drawing/2010/main" w="9525">
+                <a14:hiddenLine xmlns:a14="http://schemas.microsoft.com/office/drawing/2010/main" xmlns:p14="http://schemas.microsoft.com/office/powerpoint/2010/main" xmlns:a16="http://schemas.microsoft.com/office/drawing/2014/main" xmlns="" w="9525">
                   <a:solidFill>
                     <a:srgbClr val="000000"/>
                   </a:solidFill>
@@ -22348,7 +22805,7 @@
             </a:ln>
             <a:extLst>
               <a:ext uri="{91240B29-F687-4f45-9708-019B960494DF}">
-                <a14:hiddenLine xmlns="" xmlns:a16="http://schemas.microsoft.com/office/drawing/2014/main" xmlns:p14="http://schemas.microsoft.com/office/powerpoint/2010/main" xmlns:a14="http://schemas.microsoft.com/office/drawing/2010/main" w="9525">
+                <a14:hiddenLine xmlns:a14="http://schemas.microsoft.com/office/drawing/2010/main" xmlns:p14="http://schemas.microsoft.com/office/powerpoint/2010/main" xmlns:a16="http://schemas.microsoft.com/office/drawing/2014/main" xmlns="" w="9525">
                   <a:solidFill>
                     <a:srgbClr val="000000"/>
                   </a:solidFill>
@@ -22397,7 +22854,7 @@
             </a:ln>
             <a:extLst>
               <a:ext uri="{91240B29-F687-4f45-9708-019B960494DF}">
-                <a14:hiddenLine xmlns="" xmlns:a16="http://schemas.microsoft.com/office/drawing/2014/main" xmlns:p14="http://schemas.microsoft.com/office/powerpoint/2010/main" xmlns:a14="http://schemas.microsoft.com/office/drawing/2010/main" w="9525">
+                <a14:hiddenLine xmlns:a14="http://schemas.microsoft.com/office/drawing/2010/main" xmlns:p14="http://schemas.microsoft.com/office/powerpoint/2010/main" xmlns:a16="http://schemas.microsoft.com/office/drawing/2014/main" xmlns="" w="9525">
                   <a:solidFill>
                     <a:srgbClr val="000000"/>
                   </a:solidFill>
@@ -22477,7 +22934,7 @@
             </a:ln>
             <a:extLst>
               <a:ext uri="{91240B29-F687-4f45-9708-019B960494DF}">
-                <a14:hiddenLine xmlns="" xmlns:a16="http://schemas.microsoft.com/office/drawing/2014/main" xmlns:p14="http://schemas.microsoft.com/office/powerpoint/2010/main" xmlns:a14="http://schemas.microsoft.com/office/drawing/2010/main" w="9525">
+                <a14:hiddenLine xmlns:a14="http://schemas.microsoft.com/office/drawing/2010/main" xmlns:p14="http://schemas.microsoft.com/office/powerpoint/2010/main" xmlns:a16="http://schemas.microsoft.com/office/drawing/2014/main" xmlns="" w="9525">
                   <a:solidFill>
                     <a:srgbClr val="000000"/>
                   </a:solidFill>
@@ -22582,7 +23039,7 @@
             </a:ln>
             <a:extLst>
               <a:ext uri="{91240B29-F687-4f45-9708-019B960494DF}">
-                <a14:hiddenLine xmlns="" xmlns:a16="http://schemas.microsoft.com/office/drawing/2014/main" xmlns:p14="http://schemas.microsoft.com/office/powerpoint/2010/main" xmlns:a14="http://schemas.microsoft.com/office/drawing/2010/main" w="9525">
+                <a14:hiddenLine xmlns:a14="http://schemas.microsoft.com/office/drawing/2010/main" xmlns:p14="http://schemas.microsoft.com/office/powerpoint/2010/main" xmlns:a16="http://schemas.microsoft.com/office/drawing/2014/main" xmlns="" w="9525">
                   <a:solidFill>
                     <a:srgbClr val="000000"/>
                   </a:solidFill>
@@ -22659,7 +23116,7 @@
             </a:ln>
             <a:extLst>
               <a:ext uri="{91240B29-F687-4f45-9708-019B960494DF}">
-                <a14:hiddenLine xmlns="" xmlns:a16="http://schemas.microsoft.com/office/drawing/2014/main" xmlns:p14="http://schemas.microsoft.com/office/powerpoint/2010/main" xmlns:a14="http://schemas.microsoft.com/office/drawing/2010/main" w="9525">
+                <a14:hiddenLine xmlns:a14="http://schemas.microsoft.com/office/drawing/2010/main" xmlns:p14="http://schemas.microsoft.com/office/powerpoint/2010/main" xmlns:a16="http://schemas.microsoft.com/office/drawing/2014/main" xmlns="" w="9525">
                   <a:solidFill>
                     <a:srgbClr val="000000"/>
                   </a:solidFill>
@@ -22764,7 +23221,7 @@
             </a:ln>
             <a:extLst>
               <a:ext uri="{91240B29-F687-4f45-9708-019B960494DF}">
-                <a14:hiddenLine xmlns="" xmlns:a16="http://schemas.microsoft.com/office/drawing/2014/main" xmlns:p14="http://schemas.microsoft.com/office/powerpoint/2010/main" xmlns:a14="http://schemas.microsoft.com/office/drawing/2010/main" w="9525">
+                <a14:hiddenLine xmlns:a14="http://schemas.microsoft.com/office/drawing/2010/main" xmlns:p14="http://schemas.microsoft.com/office/powerpoint/2010/main" xmlns:a16="http://schemas.microsoft.com/office/drawing/2014/main" xmlns="" w="9525">
                   <a:solidFill>
                     <a:srgbClr val="000000"/>
                   </a:solidFill>
@@ -22869,7 +23326,7 @@
             </a:ln>
             <a:extLst>
               <a:ext uri="{91240B29-F687-4f45-9708-019B960494DF}">
-                <a14:hiddenLine xmlns="" xmlns:a16="http://schemas.microsoft.com/office/drawing/2014/main" xmlns:p14="http://schemas.microsoft.com/office/powerpoint/2010/main" xmlns:a14="http://schemas.microsoft.com/office/drawing/2010/main" w="9525">
+                <a14:hiddenLine xmlns:a14="http://schemas.microsoft.com/office/drawing/2010/main" xmlns:p14="http://schemas.microsoft.com/office/powerpoint/2010/main" xmlns:a16="http://schemas.microsoft.com/office/drawing/2014/main" xmlns="" w="9525">
                   <a:solidFill>
                     <a:srgbClr val="000000"/>
                   </a:solidFill>
@@ -22949,7 +23406,7 @@
             </a:ln>
             <a:extLst>
               <a:ext uri="{91240B29-F687-4f45-9708-019B960494DF}">
-                <a14:hiddenLine xmlns="" xmlns:a16="http://schemas.microsoft.com/office/drawing/2014/main" xmlns:p14="http://schemas.microsoft.com/office/powerpoint/2010/main" xmlns:a14="http://schemas.microsoft.com/office/drawing/2010/main" w="9525">
+                <a14:hiddenLine xmlns:a14="http://schemas.microsoft.com/office/drawing/2010/main" xmlns:p14="http://schemas.microsoft.com/office/powerpoint/2010/main" xmlns:a16="http://schemas.microsoft.com/office/drawing/2014/main" xmlns="" w="9525">
                   <a:solidFill>
                     <a:srgbClr val="000000"/>
                   </a:solidFill>
@@ -23026,7 +23483,7 @@
             </a:ln>
             <a:extLst>
               <a:ext uri="{91240B29-F687-4f45-9708-019B960494DF}">
-                <a14:hiddenLine xmlns="" xmlns:a16="http://schemas.microsoft.com/office/drawing/2014/main" xmlns:p14="http://schemas.microsoft.com/office/powerpoint/2010/main" xmlns:a14="http://schemas.microsoft.com/office/drawing/2010/main" w="9525">
+                <a14:hiddenLine xmlns:a14="http://schemas.microsoft.com/office/drawing/2010/main" xmlns:p14="http://schemas.microsoft.com/office/powerpoint/2010/main" xmlns:a16="http://schemas.microsoft.com/office/drawing/2014/main" xmlns="" w="9525">
                   <a:solidFill>
                     <a:srgbClr val="000000"/>
                   </a:solidFill>
@@ -23131,7 +23588,7 @@
             </a:ln>
             <a:extLst>
               <a:ext uri="{91240B29-F687-4f45-9708-019B960494DF}">
-                <a14:hiddenLine xmlns="" xmlns:a16="http://schemas.microsoft.com/office/drawing/2014/main" xmlns:p14="http://schemas.microsoft.com/office/powerpoint/2010/main" xmlns:a14="http://schemas.microsoft.com/office/drawing/2010/main" w="9525">
+                <a14:hiddenLine xmlns:a14="http://schemas.microsoft.com/office/drawing/2010/main" xmlns:p14="http://schemas.microsoft.com/office/powerpoint/2010/main" xmlns:a16="http://schemas.microsoft.com/office/drawing/2014/main" xmlns="" w="9525">
                   <a:solidFill>
                     <a:srgbClr val="000000"/>
                   </a:solidFill>
@@ -23236,7 +23693,7 @@
             </a:ln>
             <a:extLst>
               <a:ext uri="{91240B29-F687-4f45-9708-019B960494DF}">
-                <a14:hiddenLine xmlns="" xmlns:a16="http://schemas.microsoft.com/office/drawing/2014/main" xmlns:p14="http://schemas.microsoft.com/office/powerpoint/2010/main" xmlns:a14="http://schemas.microsoft.com/office/drawing/2010/main" w="9525">
+                <a14:hiddenLine xmlns:a14="http://schemas.microsoft.com/office/drawing/2010/main" xmlns:p14="http://schemas.microsoft.com/office/powerpoint/2010/main" xmlns:a16="http://schemas.microsoft.com/office/drawing/2014/main" xmlns="" w="9525">
                   <a:solidFill>
                     <a:srgbClr val="000000"/>
                   </a:solidFill>
@@ -23313,7 +23770,7 @@
             </a:ln>
             <a:extLst>
               <a:ext uri="{91240B29-F687-4f45-9708-019B960494DF}">
-                <a14:hiddenLine xmlns="" xmlns:a16="http://schemas.microsoft.com/office/drawing/2014/main" xmlns:p14="http://schemas.microsoft.com/office/powerpoint/2010/main" xmlns:a14="http://schemas.microsoft.com/office/drawing/2010/main" w="9525">
+                <a14:hiddenLine xmlns:a14="http://schemas.microsoft.com/office/drawing/2010/main" xmlns:p14="http://schemas.microsoft.com/office/powerpoint/2010/main" xmlns:a16="http://schemas.microsoft.com/office/drawing/2014/main" xmlns="" w="9525">
                   <a:solidFill>
                     <a:srgbClr val="000000"/>
                   </a:solidFill>
@@ -23448,7 +23905,7 @@
             </a:ln>
             <a:extLst>
               <a:ext uri="{91240B29-F687-4f45-9708-019B960494DF}">
-                <a14:hiddenLine xmlns="" xmlns:a16="http://schemas.microsoft.com/office/drawing/2014/main" xmlns:p14="http://schemas.microsoft.com/office/powerpoint/2010/main" xmlns:a14="http://schemas.microsoft.com/office/drawing/2010/main" w="9525">
+                <a14:hiddenLine xmlns:a14="http://schemas.microsoft.com/office/drawing/2010/main" xmlns:p14="http://schemas.microsoft.com/office/powerpoint/2010/main" xmlns:a16="http://schemas.microsoft.com/office/drawing/2014/main" xmlns="" w="9525">
                   <a:solidFill>
                     <a:srgbClr val="000000"/>
                   </a:solidFill>
@@ -23531,7 +23988,7 @@
             </a:ln>
             <a:extLst>
               <a:ext uri="{91240B29-F687-4f45-9708-019B960494DF}">
-                <a14:hiddenLine xmlns="" xmlns:a16="http://schemas.microsoft.com/office/drawing/2014/main" xmlns:p14="http://schemas.microsoft.com/office/powerpoint/2010/main" xmlns:a14="http://schemas.microsoft.com/office/drawing/2010/main" w="9525">
+                <a14:hiddenLine xmlns:a14="http://schemas.microsoft.com/office/drawing/2010/main" xmlns:p14="http://schemas.microsoft.com/office/powerpoint/2010/main" xmlns:a16="http://schemas.microsoft.com/office/drawing/2014/main" xmlns="" w="9525">
                   <a:solidFill>
                     <a:srgbClr val="000000"/>
                   </a:solidFill>
@@ -23636,7 +24093,7 @@
             </a:ln>
             <a:extLst>
               <a:ext uri="{91240B29-F687-4f45-9708-019B960494DF}">
-                <a14:hiddenLine xmlns="" xmlns:a16="http://schemas.microsoft.com/office/drawing/2014/main" xmlns:p14="http://schemas.microsoft.com/office/powerpoint/2010/main" xmlns:a14="http://schemas.microsoft.com/office/drawing/2010/main" w="9525">
+                <a14:hiddenLine xmlns:a14="http://schemas.microsoft.com/office/drawing/2010/main" xmlns:p14="http://schemas.microsoft.com/office/powerpoint/2010/main" xmlns:a16="http://schemas.microsoft.com/office/drawing/2014/main" xmlns="" w="9525">
                   <a:solidFill>
                     <a:srgbClr val="000000"/>
                   </a:solidFill>
@@ -23817,7 +24274,7 @@
 </p:sld>
 </file>
 
-<file path=ppt/slides/slide15.xml><?xml version="1.0" encoding="utf-8"?>
+<file path=ppt/slides/slide17.xml><?xml version="1.0" encoding="utf-8"?>
 <p:sld xmlns:a="http://schemas.openxmlformats.org/drawingml/2006/main" xmlns:r="http://schemas.openxmlformats.org/officeDocument/2006/relationships" xmlns:p="http://schemas.openxmlformats.org/presentationml/2006/main">
   <p:cSld>
     <p:bg>
@@ -23890,7 +24347,7 @@
           <a:noFill/>
           <a:extLst>
             <a:ext uri="{909E8E84-426E-40dd-AFC4-6F175D3DCCD1}">
-              <a14:hiddenFill xmlns="" xmlns:a16="http://schemas.microsoft.com/office/drawing/2014/main" xmlns:a14="http://schemas.microsoft.com/office/drawing/2010/main">
+              <a14:hiddenFill xmlns:a14="http://schemas.microsoft.com/office/drawing/2010/main" xmlns:a16="http://schemas.microsoft.com/office/drawing/2014/main" xmlns="">
                 <a:solidFill>
                   <a:srgbClr val="FFFFFF"/>
                 </a:solidFill>
@@ -23982,7 +24439,7 @@
             </a:ln>
             <a:extLst>
               <a:ext uri="{91240B29-F687-4f45-9708-019B960494DF}">
-                <a14:hiddenLine xmlns="" xmlns:a16="http://schemas.microsoft.com/office/drawing/2014/main" xmlns:a14="http://schemas.microsoft.com/office/drawing/2010/main" w="9525">
+                <a14:hiddenLine xmlns:a14="http://schemas.microsoft.com/office/drawing/2010/main" xmlns:a16="http://schemas.microsoft.com/office/drawing/2014/main" xmlns="" w="9525">
                   <a:solidFill>
                     <a:srgbClr val="000000"/>
                   </a:solidFill>
@@ -24087,7 +24544,7 @@
             </a:ln>
             <a:extLst>
               <a:ext uri="{91240B29-F687-4f45-9708-019B960494DF}">
-                <a14:hiddenLine xmlns="" xmlns:a16="http://schemas.microsoft.com/office/drawing/2014/main" xmlns:a14="http://schemas.microsoft.com/office/drawing/2010/main" w="9525">
+                <a14:hiddenLine xmlns:a14="http://schemas.microsoft.com/office/drawing/2010/main" xmlns:a16="http://schemas.microsoft.com/office/drawing/2014/main" xmlns="" w="9525">
                   <a:solidFill>
                     <a:srgbClr val="000000"/>
                   </a:solidFill>
@@ -24192,7 +24649,7 @@
             </a:ln>
             <a:extLst>
               <a:ext uri="{91240B29-F687-4f45-9708-019B960494DF}">
-                <a14:hiddenLine xmlns="" xmlns:a16="http://schemas.microsoft.com/office/drawing/2014/main" xmlns:a14="http://schemas.microsoft.com/office/drawing/2010/main" w="9525">
+                <a14:hiddenLine xmlns:a14="http://schemas.microsoft.com/office/drawing/2010/main" xmlns:a16="http://schemas.microsoft.com/office/drawing/2014/main" xmlns="" w="9525">
                   <a:solidFill>
                     <a:srgbClr val="000000"/>
                   </a:solidFill>
@@ -24241,7 +24698,7 @@
             </a:ln>
             <a:extLst>
               <a:ext uri="{91240B29-F687-4f45-9708-019B960494DF}">
-                <a14:hiddenLine xmlns="" xmlns:a16="http://schemas.microsoft.com/office/drawing/2014/main" xmlns:a14="http://schemas.microsoft.com/office/drawing/2010/main" w="9525">
+                <a14:hiddenLine xmlns:a14="http://schemas.microsoft.com/office/drawing/2010/main" xmlns:a16="http://schemas.microsoft.com/office/drawing/2014/main" xmlns="" w="9525">
                   <a:solidFill>
                     <a:srgbClr val="000000"/>
                   </a:solidFill>
@@ -24346,7 +24803,7 @@
             </a:ln>
             <a:extLst>
               <a:ext uri="{91240B29-F687-4f45-9708-019B960494DF}">
-                <a14:hiddenLine xmlns="" xmlns:a16="http://schemas.microsoft.com/office/drawing/2014/main" xmlns:a14="http://schemas.microsoft.com/office/drawing/2010/main" w="9525">
+                <a14:hiddenLine xmlns:a14="http://schemas.microsoft.com/office/drawing/2010/main" xmlns:a16="http://schemas.microsoft.com/office/drawing/2014/main" xmlns="" w="9525">
                   <a:solidFill>
                     <a:srgbClr val="000000"/>
                   </a:solidFill>
@@ -24423,7 +24880,7 @@
             </a:ln>
             <a:extLst>
               <a:ext uri="{91240B29-F687-4f45-9708-019B960494DF}">
-                <a14:hiddenLine xmlns="" xmlns:a16="http://schemas.microsoft.com/office/drawing/2014/main" xmlns:a14="http://schemas.microsoft.com/office/drawing/2010/main" w="9525">
+                <a14:hiddenLine xmlns:a14="http://schemas.microsoft.com/office/drawing/2010/main" xmlns:a16="http://schemas.microsoft.com/office/drawing/2014/main" xmlns="" w="9525">
                   <a:solidFill>
                     <a:srgbClr val="000000"/>
                   </a:solidFill>
@@ -24500,7 +24957,7 @@
             </a:ln>
             <a:extLst>
               <a:ext uri="{91240B29-F687-4f45-9708-019B960494DF}">
-                <a14:hiddenLine xmlns="" xmlns:a16="http://schemas.microsoft.com/office/drawing/2014/main" xmlns:a14="http://schemas.microsoft.com/office/drawing/2010/main" w="9525">
+                <a14:hiddenLine xmlns:a14="http://schemas.microsoft.com/office/drawing/2010/main" xmlns:a16="http://schemas.microsoft.com/office/drawing/2014/main" xmlns="" w="9525">
                   <a:solidFill>
                     <a:srgbClr val="000000"/>
                   </a:solidFill>
@@ -24605,7 +25062,7 @@
             </a:ln>
             <a:extLst>
               <a:ext uri="{91240B29-F687-4f45-9708-019B960494DF}">
-                <a14:hiddenLine xmlns="" xmlns:a16="http://schemas.microsoft.com/office/drawing/2014/main" xmlns:a14="http://schemas.microsoft.com/office/drawing/2010/main" w="9525">
+                <a14:hiddenLine xmlns:a14="http://schemas.microsoft.com/office/drawing/2010/main" xmlns:a16="http://schemas.microsoft.com/office/drawing/2014/main" xmlns="" w="9525">
                   <a:solidFill>
                     <a:srgbClr val="000000"/>
                   </a:solidFill>
@@ -24682,7 +25139,7 @@
             </a:ln>
             <a:extLst>
               <a:ext uri="{91240B29-F687-4f45-9708-019B960494DF}">
-                <a14:hiddenLine xmlns="" xmlns:a16="http://schemas.microsoft.com/office/drawing/2014/main" xmlns:a14="http://schemas.microsoft.com/office/drawing/2010/main" w="9525">
+                <a14:hiddenLine xmlns:a14="http://schemas.microsoft.com/office/drawing/2010/main" xmlns:a16="http://schemas.microsoft.com/office/drawing/2014/main" xmlns="" w="9525">
                   <a:solidFill>
                     <a:srgbClr val="000000"/>
                   </a:solidFill>
@@ -24759,7 +25216,7 @@
             </a:ln>
             <a:extLst>
               <a:ext uri="{91240B29-F687-4f45-9708-019B960494DF}">
-                <a14:hiddenLine xmlns="" xmlns:a16="http://schemas.microsoft.com/office/drawing/2014/main" xmlns:a14="http://schemas.microsoft.com/office/drawing/2010/main" w="9525">
+                <a14:hiddenLine xmlns:a14="http://schemas.microsoft.com/office/drawing/2010/main" xmlns:a16="http://schemas.microsoft.com/office/drawing/2014/main" xmlns="" w="9525">
                   <a:solidFill>
                     <a:srgbClr val="000000"/>
                   </a:solidFill>
@@ -24864,7 +25321,7 @@
             </a:ln>
             <a:extLst>
               <a:ext uri="{91240B29-F687-4f45-9708-019B960494DF}">
-                <a14:hiddenLine xmlns="" xmlns:a16="http://schemas.microsoft.com/office/drawing/2014/main" xmlns:a14="http://schemas.microsoft.com/office/drawing/2010/main" w="9525">
+                <a14:hiddenLine xmlns:a14="http://schemas.microsoft.com/office/drawing/2010/main" xmlns:a16="http://schemas.microsoft.com/office/drawing/2014/main" xmlns="" w="9525">
                   <a:solidFill>
                     <a:srgbClr val="000000"/>
                   </a:solidFill>
@@ -24969,7 +25426,7 @@
             </a:ln>
             <a:extLst>
               <a:ext uri="{91240B29-F687-4f45-9708-019B960494DF}">
-                <a14:hiddenLine xmlns="" xmlns:a16="http://schemas.microsoft.com/office/drawing/2014/main" xmlns:a14="http://schemas.microsoft.com/office/drawing/2010/main" w="9525">
+                <a14:hiddenLine xmlns:a14="http://schemas.microsoft.com/office/drawing/2010/main" xmlns:a16="http://schemas.microsoft.com/office/drawing/2014/main" xmlns="" w="9525">
                   <a:solidFill>
                     <a:srgbClr val="000000"/>
                   </a:solidFill>
@@ -25046,7 +25503,7 @@
             </a:ln>
             <a:extLst>
               <a:ext uri="{91240B29-F687-4f45-9708-019B960494DF}">
-                <a14:hiddenLine xmlns="" xmlns:a16="http://schemas.microsoft.com/office/drawing/2014/main" xmlns:a14="http://schemas.microsoft.com/office/drawing/2010/main" w="9525">
+                <a14:hiddenLine xmlns:a14="http://schemas.microsoft.com/office/drawing/2010/main" xmlns:a16="http://schemas.microsoft.com/office/drawing/2014/main" xmlns="" w="9525">
                   <a:solidFill>
                     <a:srgbClr val="000000"/>
                   </a:solidFill>
@@ -25171,7 +25628,7 @@
             </a:ln>
             <a:extLst>
               <a:ext uri="{91240B29-F687-4f45-9708-019B960494DF}">
-                <a14:hiddenLine xmlns="" xmlns:a16="http://schemas.microsoft.com/office/drawing/2014/main" xmlns:a14="http://schemas.microsoft.com/office/drawing/2010/main" w="9525">
+                <a14:hiddenLine xmlns:a14="http://schemas.microsoft.com/office/drawing/2010/main" xmlns:a16="http://schemas.microsoft.com/office/drawing/2014/main" xmlns="" w="9525">
                   <a:solidFill>
                     <a:srgbClr val="000000"/>
                   </a:solidFill>
@@ -25248,7 +25705,7 @@
             </a:ln>
             <a:extLst>
               <a:ext uri="{91240B29-F687-4f45-9708-019B960494DF}">
-                <a14:hiddenLine xmlns="" xmlns:a16="http://schemas.microsoft.com/office/drawing/2014/main" xmlns:a14="http://schemas.microsoft.com/office/drawing/2010/main" w="9525">
+                <a14:hiddenLine xmlns:a14="http://schemas.microsoft.com/office/drawing/2010/main" xmlns:a16="http://schemas.microsoft.com/office/drawing/2014/main" xmlns="" w="9525">
                   <a:solidFill>
                     <a:srgbClr val="000000"/>
                   </a:solidFill>
@@ -25353,7 +25810,7 @@
             </a:ln>
             <a:extLst>
               <a:ext uri="{91240B29-F687-4f45-9708-019B960494DF}">
-                <a14:hiddenLine xmlns="" xmlns:a16="http://schemas.microsoft.com/office/drawing/2014/main" xmlns:a14="http://schemas.microsoft.com/office/drawing/2010/main" w="9525">
+                <a14:hiddenLine xmlns:a14="http://schemas.microsoft.com/office/drawing/2010/main" xmlns:a16="http://schemas.microsoft.com/office/drawing/2014/main" xmlns="" w="9525">
                   <a:solidFill>
                     <a:srgbClr val="000000"/>
                   </a:solidFill>
@@ -25458,7 +25915,7 @@
             </a:ln>
             <a:extLst>
               <a:ext uri="{91240B29-F687-4f45-9708-019B960494DF}">
-                <a14:hiddenLine xmlns="" xmlns:a16="http://schemas.microsoft.com/office/drawing/2014/main" xmlns:a14="http://schemas.microsoft.com/office/drawing/2010/main" w="9525">
+                <a14:hiddenLine xmlns:a14="http://schemas.microsoft.com/office/drawing/2010/main" xmlns:a16="http://schemas.microsoft.com/office/drawing/2014/main" xmlns="" w="9525">
                   <a:solidFill>
                     <a:srgbClr val="000000"/>
                   </a:solidFill>
@@ -25535,7 +25992,7 @@
             </a:ln>
             <a:extLst>
               <a:ext uri="{91240B29-F687-4f45-9708-019B960494DF}">
-                <a14:hiddenLine xmlns="" xmlns:a16="http://schemas.microsoft.com/office/drawing/2014/main" xmlns:a14="http://schemas.microsoft.com/office/drawing/2010/main" w="9525">
+                <a14:hiddenLine xmlns:a14="http://schemas.microsoft.com/office/drawing/2010/main" xmlns:a16="http://schemas.microsoft.com/office/drawing/2014/main" xmlns="" w="9525">
                   <a:solidFill>
                     <a:srgbClr val="000000"/>
                   </a:solidFill>
@@ -25640,7 +26097,7 @@
             </a:ln>
             <a:extLst>
               <a:ext uri="{91240B29-F687-4f45-9708-019B960494DF}">
-                <a14:hiddenLine xmlns="" xmlns:a16="http://schemas.microsoft.com/office/drawing/2014/main" xmlns:a14="http://schemas.microsoft.com/office/drawing/2010/main" w="9525">
+                <a14:hiddenLine xmlns:a14="http://schemas.microsoft.com/office/drawing/2010/main" xmlns:a16="http://schemas.microsoft.com/office/drawing/2014/main" xmlns="" w="9525">
                   <a:solidFill>
                     <a:srgbClr val="000000"/>
                   </a:solidFill>
@@ -25745,7 +26202,7 @@
             </a:ln>
             <a:extLst>
               <a:ext uri="{91240B29-F687-4f45-9708-019B960494DF}">
-                <a14:hiddenLine xmlns="" xmlns:a16="http://schemas.microsoft.com/office/drawing/2014/main" xmlns:a14="http://schemas.microsoft.com/office/drawing/2010/main" w="9525">
+                <a14:hiddenLine xmlns:a14="http://schemas.microsoft.com/office/drawing/2010/main" xmlns:a16="http://schemas.microsoft.com/office/drawing/2014/main" xmlns="" w="9525">
                   <a:solidFill>
                     <a:srgbClr val="000000"/>
                   </a:solidFill>
@@ -25816,7 +26273,7 @@
             </a:ln>
             <a:extLst>
               <a:ext uri="{91240B29-F687-4f45-9708-019B960494DF}">
-                <a14:hiddenLine xmlns="" xmlns:a16="http://schemas.microsoft.com/office/drawing/2014/main" xmlns:a14="http://schemas.microsoft.com/office/drawing/2010/main" w="9525">
+                <a14:hiddenLine xmlns:a14="http://schemas.microsoft.com/office/drawing/2010/main" xmlns:a16="http://schemas.microsoft.com/office/drawing/2014/main" xmlns="" w="9525">
                   <a:solidFill>
                     <a:srgbClr val="000000"/>
                   </a:solidFill>
@@ -25921,7 +26378,7 @@
             </a:ln>
             <a:extLst>
               <a:ext uri="{91240B29-F687-4f45-9708-019B960494DF}">
-                <a14:hiddenLine xmlns="" xmlns:a16="http://schemas.microsoft.com/office/drawing/2014/main" xmlns:a14="http://schemas.microsoft.com/office/drawing/2010/main" w="9525">
+                <a14:hiddenLine xmlns:a14="http://schemas.microsoft.com/office/drawing/2010/main" xmlns:a16="http://schemas.microsoft.com/office/drawing/2014/main" xmlns="" w="9525">
                   <a:solidFill>
                     <a:srgbClr val="000000"/>
                   </a:solidFill>
@@ -25992,7 +26449,7 @@
             </a:ln>
             <a:extLst>
               <a:ext uri="{91240B29-F687-4f45-9708-019B960494DF}">
-                <a14:hiddenLine xmlns="" xmlns:a16="http://schemas.microsoft.com/office/drawing/2014/main" xmlns:a14="http://schemas.microsoft.com/office/drawing/2010/main" w="9525">
+                <a14:hiddenLine xmlns:a14="http://schemas.microsoft.com/office/drawing/2010/main" xmlns:a16="http://schemas.microsoft.com/office/drawing/2014/main" xmlns="" w="9525">
                   <a:solidFill>
                     <a:srgbClr val="000000"/>
                   </a:solidFill>
@@ -26097,7 +26554,7 @@
             </a:ln>
             <a:extLst>
               <a:ext uri="{91240B29-F687-4f45-9708-019B960494DF}">
-                <a14:hiddenLine xmlns="" xmlns:a16="http://schemas.microsoft.com/office/drawing/2014/main" xmlns:a14="http://schemas.microsoft.com/office/drawing/2010/main" w="9525">
+                <a14:hiddenLine xmlns:a14="http://schemas.microsoft.com/office/drawing/2010/main" xmlns:a16="http://schemas.microsoft.com/office/drawing/2014/main" xmlns="" w="9525">
                   <a:solidFill>
                     <a:srgbClr val="000000"/>
                   </a:solidFill>
@@ -26180,7 +26637,7 @@
             </a:ln>
             <a:extLst>
               <a:ext uri="{91240B29-F687-4f45-9708-019B960494DF}">
-                <a14:hiddenLine xmlns="" xmlns:a16="http://schemas.microsoft.com/office/drawing/2014/main" xmlns:a14="http://schemas.microsoft.com/office/drawing/2010/main" w="9525">
+                <a14:hiddenLine xmlns:a14="http://schemas.microsoft.com/office/drawing/2010/main" xmlns:a16="http://schemas.microsoft.com/office/drawing/2014/main" xmlns="" w="9525">
                   <a:solidFill>
                     <a:srgbClr val="000000"/>
                   </a:solidFill>
@@ -26285,7 +26742,7 @@
             </a:ln>
             <a:extLst>
               <a:ext uri="{91240B29-F687-4f45-9708-019B960494DF}">
-                <a14:hiddenLine xmlns="" xmlns:a16="http://schemas.microsoft.com/office/drawing/2014/main" xmlns:a14="http://schemas.microsoft.com/office/drawing/2010/main" w="9525">
+                <a14:hiddenLine xmlns:a14="http://schemas.microsoft.com/office/drawing/2010/main" xmlns:a16="http://schemas.microsoft.com/office/drawing/2014/main" xmlns="" w="9525">
                   <a:solidFill>
                     <a:srgbClr val="000000"/>
                   </a:solidFill>
@@ -26368,7 +26825,7 @@
             </a:ln>
             <a:extLst>
               <a:ext uri="{91240B29-F687-4f45-9708-019B960494DF}">
-                <a14:hiddenLine xmlns="" xmlns:a16="http://schemas.microsoft.com/office/drawing/2014/main" xmlns:a14="http://schemas.microsoft.com/office/drawing/2010/main" w="9525">
+                <a14:hiddenLine xmlns:a14="http://schemas.microsoft.com/office/drawing/2010/main" xmlns:a16="http://schemas.microsoft.com/office/drawing/2014/main" xmlns="" w="9525">
                   <a:solidFill>
                     <a:srgbClr val="000000"/>
                   </a:solidFill>
@@ -26473,7 +26930,7 @@
             </a:ln>
             <a:extLst>
               <a:ext uri="{91240B29-F687-4f45-9708-019B960494DF}">
-                <a14:hiddenLine xmlns="" xmlns:a16="http://schemas.microsoft.com/office/drawing/2014/main" xmlns:a14="http://schemas.microsoft.com/office/drawing/2010/main" w="9525">
+                <a14:hiddenLine xmlns:a14="http://schemas.microsoft.com/office/drawing/2010/main" xmlns:a16="http://schemas.microsoft.com/office/drawing/2014/main" xmlns="" w="9525">
                   <a:solidFill>
                     <a:srgbClr val="000000"/>
                   </a:solidFill>
@@ -26522,7 +26979,7 @@
             </a:ln>
             <a:extLst>
               <a:ext uri="{91240B29-F687-4f45-9708-019B960494DF}">
-                <a14:hiddenLine xmlns="" xmlns:a16="http://schemas.microsoft.com/office/drawing/2014/main" xmlns:a14="http://schemas.microsoft.com/office/drawing/2010/main" w="9525">
+                <a14:hiddenLine xmlns:a14="http://schemas.microsoft.com/office/drawing/2010/main" xmlns:a16="http://schemas.microsoft.com/office/drawing/2014/main" xmlns="" w="9525">
                   <a:solidFill>
                     <a:srgbClr val="000000"/>
                   </a:solidFill>
@@ -26627,7 +27084,7 @@
             </a:ln>
             <a:extLst>
               <a:ext uri="{91240B29-F687-4f45-9708-019B960494DF}">
-                <a14:hiddenLine xmlns="" xmlns:a16="http://schemas.microsoft.com/office/drawing/2014/main" xmlns:a14="http://schemas.microsoft.com/office/drawing/2010/main" w="9525">
+                <a14:hiddenLine xmlns:a14="http://schemas.microsoft.com/office/drawing/2010/main" xmlns:a16="http://schemas.microsoft.com/office/drawing/2014/main" xmlns="" w="9525">
                   <a:solidFill>
                     <a:srgbClr val="000000"/>
                   </a:solidFill>
@@ -26704,7 +27161,7 @@
             </a:ln>
             <a:extLst>
               <a:ext uri="{91240B29-F687-4f45-9708-019B960494DF}">
-                <a14:hiddenLine xmlns="" xmlns:a16="http://schemas.microsoft.com/office/drawing/2014/main" xmlns:a14="http://schemas.microsoft.com/office/drawing/2010/main" w="9525">
+                <a14:hiddenLine xmlns:a14="http://schemas.microsoft.com/office/drawing/2010/main" xmlns:a16="http://schemas.microsoft.com/office/drawing/2014/main" xmlns="" w="9525">
                   <a:solidFill>
                     <a:srgbClr val="000000"/>
                   </a:solidFill>
@@ -26781,7 +27238,7 @@
             </a:ln>
             <a:extLst>
               <a:ext uri="{91240B29-F687-4f45-9708-019B960494DF}">
-                <a14:hiddenLine xmlns="" xmlns:a16="http://schemas.microsoft.com/office/drawing/2014/main" xmlns:a14="http://schemas.microsoft.com/office/drawing/2010/main" w="9525">
+                <a14:hiddenLine xmlns:a14="http://schemas.microsoft.com/office/drawing/2010/main" xmlns:a16="http://schemas.microsoft.com/office/drawing/2014/main" xmlns="" w="9525">
                   <a:solidFill>
                     <a:srgbClr val="000000"/>
                   </a:solidFill>
@@ -26886,7 +27343,7 @@
             </a:ln>
             <a:extLst>
               <a:ext uri="{91240B29-F687-4f45-9708-019B960494DF}">
-                <a14:hiddenLine xmlns="" xmlns:a16="http://schemas.microsoft.com/office/drawing/2014/main" xmlns:a14="http://schemas.microsoft.com/office/drawing/2010/main" w="9525">
+                <a14:hiddenLine xmlns:a14="http://schemas.microsoft.com/office/drawing/2010/main" xmlns:a16="http://schemas.microsoft.com/office/drawing/2014/main" xmlns="" w="9525">
                   <a:solidFill>
                     <a:srgbClr val="000000"/>
                   </a:solidFill>
@@ -26969,7 +27426,7 @@
             </a:ln>
             <a:extLst>
               <a:ext uri="{91240B29-F687-4f45-9708-019B960494DF}">
-                <a14:hiddenLine xmlns="" xmlns:a16="http://schemas.microsoft.com/office/drawing/2014/main" xmlns:a14="http://schemas.microsoft.com/office/drawing/2010/main" w="9525">
+                <a14:hiddenLine xmlns:a14="http://schemas.microsoft.com/office/drawing/2010/main" xmlns:a16="http://schemas.microsoft.com/office/drawing/2014/main" xmlns="" w="9525">
                   <a:solidFill>
                     <a:srgbClr val="000000"/>
                   </a:solidFill>
@@ -27046,7 +27503,7 @@
             </a:ln>
             <a:extLst>
               <a:ext uri="{91240B29-F687-4f45-9708-019B960494DF}">
-                <a14:hiddenLine xmlns="" xmlns:a16="http://schemas.microsoft.com/office/drawing/2014/main" xmlns:a14="http://schemas.microsoft.com/office/drawing/2010/main" w="9525">
+                <a14:hiddenLine xmlns:a14="http://schemas.microsoft.com/office/drawing/2010/main" xmlns:a16="http://schemas.microsoft.com/office/drawing/2014/main" xmlns="" w="9525">
                   <a:solidFill>
                     <a:srgbClr val="000000"/>
                   </a:solidFill>
@@ -27151,7 +27608,7 @@
             </a:ln>
             <a:extLst>
               <a:ext uri="{91240B29-F687-4f45-9708-019B960494DF}">
-                <a14:hiddenLine xmlns="" xmlns:a16="http://schemas.microsoft.com/office/drawing/2014/main" xmlns:a14="http://schemas.microsoft.com/office/drawing/2010/main" w="9525">
+                <a14:hiddenLine xmlns:a14="http://schemas.microsoft.com/office/drawing/2010/main" xmlns:a16="http://schemas.microsoft.com/office/drawing/2014/main" xmlns="" w="9525">
                   <a:solidFill>
                     <a:srgbClr val="000000"/>
                   </a:solidFill>
@@ -27228,7 +27685,7 @@
             </a:ln>
             <a:extLst>
               <a:ext uri="{91240B29-F687-4f45-9708-019B960494DF}">
-                <a14:hiddenLine xmlns="" xmlns:a16="http://schemas.microsoft.com/office/drawing/2014/main" xmlns:a14="http://schemas.microsoft.com/office/drawing/2010/main" w="9525">
+                <a14:hiddenLine xmlns:a14="http://schemas.microsoft.com/office/drawing/2010/main" xmlns:a16="http://schemas.microsoft.com/office/drawing/2014/main" xmlns="" w="9525">
                   <a:solidFill>
                     <a:srgbClr val="000000"/>
                   </a:solidFill>
@@ -27333,7 +27790,7 @@
             </a:ln>
             <a:extLst>
               <a:ext uri="{91240B29-F687-4f45-9708-019B960494DF}">
-                <a14:hiddenLine xmlns="" xmlns:a16="http://schemas.microsoft.com/office/drawing/2014/main" xmlns:a14="http://schemas.microsoft.com/office/drawing/2010/main" w="9525">
+                <a14:hiddenLine xmlns:a14="http://schemas.microsoft.com/office/drawing/2010/main" xmlns:a16="http://schemas.microsoft.com/office/drawing/2014/main" xmlns="" w="9525">
                   <a:solidFill>
                     <a:srgbClr val="000000"/>
                   </a:solidFill>
@@ -27410,7 +27867,7 @@
             </a:ln>
             <a:extLst>
               <a:ext uri="{91240B29-F687-4f45-9708-019B960494DF}">
-                <a14:hiddenLine xmlns="" xmlns:a16="http://schemas.microsoft.com/office/drawing/2014/main" xmlns:a14="http://schemas.microsoft.com/office/drawing/2010/main" w="9525">
+                <a14:hiddenLine xmlns:a14="http://schemas.microsoft.com/office/drawing/2010/main" xmlns:a16="http://schemas.microsoft.com/office/drawing/2014/main" xmlns="" w="9525">
                   <a:solidFill>
                     <a:srgbClr val="000000"/>
                   </a:solidFill>
@@ -27515,7 +27972,7 @@
             </a:ln>
             <a:extLst>
               <a:ext uri="{91240B29-F687-4f45-9708-019B960494DF}">
-                <a14:hiddenLine xmlns="" xmlns:a16="http://schemas.microsoft.com/office/drawing/2014/main" xmlns:a14="http://schemas.microsoft.com/office/drawing/2010/main" w="9525">
+                <a14:hiddenLine xmlns:a14="http://schemas.microsoft.com/office/drawing/2010/main" xmlns:a16="http://schemas.microsoft.com/office/drawing/2014/main" xmlns="" w="9525">
                   <a:solidFill>
                     <a:srgbClr val="000000"/>
                   </a:solidFill>
@@ -27564,7 +28021,7 @@
             </a:ln>
             <a:extLst>
               <a:ext uri="{91240B29-F687-4f45-9708-019B960494DF}">
-                <a14:hiddenLine xmlns="" xmlns:a16="http://schemas.microsoft.com/office/drawing/2014/main" xmlns:a14="http://schemas.microsoft.com/office/drawing/2010/main" w="9525">
+                <a14:hiddenLine xmlns:a14="http://schemas.microsoft.com/office/drawing/2010/main" xmlns:a16="http://schemas.microsoft.com/office/drawing/2014/main" xmlns="" w="9525">
                   <a:solidFill>
                     <a:srgbClr val="000000"/>
                   </a:solidFill>
@@ -27644,7 +28101,7 @@
             </a:ln>
             <a:extLst>
               <a:ext uri="{91240B29-F687-4f45-9708-019B960494DF}">
-                <a14:hiddenLine xmlns="" xmlns:a16="http://schemas.microsoft.com/office/drawing/2014/main" xmlns:a14="http://schemas.microsoft.com/office/drawing/2010/main" w="9525">
+                <a14:hiddenLine xmlns:a14="http://schemas.microsoft.com/office/drawing/2010/main" xmlns:a16="http://schemas.microsoft.com/office/drawing/2014/main" xmlns="" w="9525">
                   <a:solidFill>
                     <a:srgbClr val="000000"/>
                   </a:solidFill>
@@ -27749,7 +28206,7 @@
             </a:ln>
             <a:extLst>
               <a:ext uri="{91240B29-F687-4f45-9708-019B960494DF}">
-                <a14:hiddenLine xmlns="" xmlns:a16="http://schemas.microsoft.com/office/drawing/2014/main" xmlns:a14="http://schemas.microsoft.com/office/drawing/2010/main" w="9525">
+                <a14:hiddenLine xmlns:a14="http://schemas.microsoft.com/office/drawing/2010/main" xmlns:a16="http://schemas.microsoft.com/office/drawing/2014/main" xmlns="" w="9525">
                   <a:solidFill>
                     <a:srgbClr val="000000"/>
                   </a:solidFill>
@@ -27826,7 +28283,7 @@
             </a:ln>
             <a:extLst>
               <a:ext uri="{91240B29-F687-4f45-9708-019B960494DF}">
-                <a14:hiddenLine xmlns="" xmlns:a16="http://schemas.microsoft.com/office/drawing/2014/main" xmlns:a14="http://schemas.microsoft.com/office/drawing/2010/main" w="9525">
+                <a14:hiddenLine xmlns:a14="http://schemas.microsoft.com/office/drawing/2010/main" xmlns:a16="http://schemas.microsoft.com/office/drawing/2014/main" xmlns="" w="9525">
                   <a:solidFill>
                     <a:srgbClr val="000000"/>
                   </a:solidFill>
@@ -27931,7 +28388,7 @@
             </a:ln>
             <a:extLst>
               <a:ext uri="{91240B29-F687-4f45-9708-019B960494DF}">
-                <a14:hiddenLine xmlns="" xmlns:a16="http://schemas.microsoft.com/office/drawing/2014/main" xmlns:a14="http://schemas.microsoft.com/office/drawing/2010/main" w="9525">
+                <a14:hiddenLine xmlns:a14="http://schemas.microsoft.com/office/drawing/2010/main" xmlns:a16="http://schemas.microsoft.com/office/drawing/2014/main" xmlns="" w="9525">
                   <a:solidFill>
                     <a:srgbClr val="000000"/>
                   </a:solidFill>
@@ -28036,7 +28493,7 @@
             </a:ln>
             <a:extLst>
               <a:ext uri="{91240B29-F687-4f45-9708-019B960494DF}">
-                <a14:hiddenLine xmlns="" xmlns:a16="http://schemas.microsoft.com/office/drawing/2014/main" xmlns:a14="http://schemas.microsoft.com/office/drawing/2010/main" w="9525">
+                <a14:hiddenLine xmlns:a14="http://schemas.microsoft.com/office/drawing/2010/main" xmlns:a16="http://schemas.microsoft.com/office/drawing/2014/main" xmlns="" w="9525">
                   <a:solidFill>
                     <a:srgbClr val="000000"/>
                   </a:solidFill>
@@ -28116,7 +28573,7 @@
             </a:ln>
             <a:extLst>
               <a:ext uri="{91240B29-F687-4f45-9708-019B960494DF}">
-                <a14:hiddenLine xmlns="" xmlns:a16="http://schemas.microsoft.com/office/drawing/2014/main" xmlns:a14="http://schemas.microsoft.com/office/drawing/2010/main" w="9525">
+                <a14:hiddenLine xmlns:a14="http://schemas.microsoft.com/office/drawing/2010/main" xmlns:a16="http://schemas.microsoft.com/office/drawing/2014/main" xmlns="" w="9525">
                   <a:solidFill>
                     <a:srgbClr val="000000"/>
                   </a:solidFill>
@@ -28193,7 +28650,7 @@
             </a:ln>
             <a:extLst>
               <a:ext uri="{91240B29-F687-4f45-9708-019B960494DF}">
-                <a14:hiddenLine xmlns="" xmlns:a16="http://schemas.microsoft.com/office/drawing/2014/main" xmlns:a14="http://schemas.microsoft.com/office/drawing/2010/main" w="9525">
+                <a14:hiddenLine xmlns:a14="http://schemas.microsoft.com/office/drawing/2010/main" xmlns:a16="http://schemas.microsoft.com/office/drawing/2014/main" xmlns="" w="9525">
                   <a:solidFill>
                     <a:srgbClr val="000000"/>
                   </a:solidFill>
@@ -28298,7 +28755,7 @@
             </a:ln>
             <a:extLst>
               <a:ext uri="{91240B29-F687-4f45-9708-019B960494DF}">
-                <a14:hiddenLine xmlns="" xmlns:a16="http://schemas.microsoft.com/office/drawing/2014/main" xmlns:a14="http://schemas.microsoft.com/office/drawing/2010/main" w="9525">
+                <a14:hiddenLine xmlns:a14="http://schemas.microsoft.com/office/drawing/2010/main" xmlns:a16="http://schemas.microsoft.com/office/drawing/2014/main" xmlns="" w="9525">
                   <a:solidFill>
                     <a:srgbClr val="000000"/>
                   </a:solidFill>
@@ -28403,7 +28860,7 @@
             </a:ln>
             <a:extLst>
               <a:ext uri="{91240B29-F687-4f45-9708-019B960494DF}">
-                <a14:hiddenLine xmlns="" xmlns:a16="http://schemas.microsoft.com/office/drawing/2014/main" xmlns:a14="http://schemas.microsoft.com/office/drawing/2010/main" w="9525">
+                <a14:hiddenLine xmlns:a14="http://schemas.microsoft.com/office/drawing/2010/main" xmlns:a16="http://schemas.microsoft.com/office/drawing/2014/main" xmlns="" w="9525">
                   <a:solidFill>
                     <a:srgbClr val="000000"/>
                   </a:solidFill>
@@ -28480,7 +28937,7 @@
             </a:ln>
             <a:extLst>
               <a:ext uri="{91240B29-F687-4f45-9708-019B960494DF}">
-                <a14:hiddenLine xmlns="" xmlns:a16="http://schemas.microsoft.com/office/drawing/2014/main" xmlns:a14="http://schemas.microsoft.com/office/drawing/2010/main" w="9525">
+                <a14:hiddenLine xmlns:a14="http://schemas.microsoft.com/office/drawing/2010/main" xmlns:a16="http://schemas.microsoft.com/office/drawing/2014/main" xmlns="" w="9525">
                   <a:solidFill>
                     <a:srgbClr val="000000"/>
                   </a:solidFill>
@@ -28615,7 +29072,7 @@
             </a:ln>
             <a:extLst>
               <a:ext uri="{91240B29-F687-4f45-9708-019B960494DF}">
-                <a14:hiddenLine xmlns="" xmlns:a16="http://schemas.microsoft.com/office/drawing/2014/main" xmlns:a14="http://schemas.microsoft.com/office/drawing/2010/main" w="9525">
+                <a14:hiddenLine xmlns:a14="http://schemas.microsoft.com/office/drawing/2010/main" xmlns:a16="http://schemas.microsoft.com/office/drawing/2014/main" xmlns="" w="9525">
                   <a:solidFill>
                     <a:srgbClr val="000000"/>
                   </a:solidFill>
@@ -28698,7 +29155,7 @@
             </a:ln>
             <a:extLst>
               <a:ext uri="{91240B29-F687-4f45-9708-019B960494DF}">
-                <a14:hiddenLine xmlns="" xmlns:a16="http://schemas.microsoft.com/office/drawing/2014/main" xmlns:a14="http://schemas.microsoft.com/office/drawing/2010/main" w="9525">
+                <a14:hiddenLine xmlns:a14="http://schemas.microsoft.com/office/drawing/2010/main" xmlns:a16="http://schemas.microsoft.com/office/drawing/2014/main" xmlns="" w="9525">
                   <a:solidFill>
                     <a:srgbClr val="000000"/>
                   </a:solidFill>
@@ -28803,7 +29260,7 @@
             </a:ln>
             <a:extLst>
               <a:ext uri="{91240B29-F687-4f45-9708-019B960494DF}">
-                <a14:hiddenLine xmlns="" xmlns:a16="http://schemas.microsoft.com/office/drawing/2014/main" xmlns:a14="http://schemas.microsoft.com/office/drawing/2010/main" w="9525">
+                <a14:hiddenLine xmlns:a14="http://schemas.microsoft.com/office/drawing/2010/main" xmlns:a16="http://schemas.microsoft.com/office/drawing/2014/main" xmlns="" w="9525">
                   <a:solidFill>
                     <a:srgbClr val="000000"/>
                   </a:solidFill>
@@ -28997,7 +29454,7 @@
             </a:ln>
             <a:extLst>
               <a:ext uri="{91240B29-F687-4f45-9708-019B960494DF}">
-                <a14:hiddenLine xmlns="" xmlns:a16="http://schemas.microsoft.com/office/drawing/2014/main" xmlns:p14="http://schemas.microsoft.com/office/powerpoint/2010/main" xmlns:a14="http://schemas.microsoft.com/office/drawing/2010/main" w="9525">
+                <a14:hiddenLine xmlns:a14="http://schemas.microsoft.com/office/drawing/2010/main" xmlns:p14="http://schemas.microsoft.com/office/powerpoint/2010/main" xmlns:a16="http://schemas.microsoft.com/office/drawing/2014/main" xmlns="" w="9525">
                   <a:solidFill>
                     <a:srgbClr val="000000"/>
                   </a:solidFill>
@@ -29102,7 +29559,7 @@
             </a:ln>
             <a:extLst>
               <a:ext uri="{91240B29-F687-4f45-9708-019B960494DF}">
-                <a14:hiddenLine xmlns="" xmlns:a16="http://schemas.microsoft.com/office/drawing/2014/main" xmlns:p14="http://schemas.microsoft.com/office/powerpoint/2010/main" xmlns:a14="http://schemas.microsoft.com/office/drawing/2010/main" w="9525">
+                <a14:hiddenLine xmlns:a14="http://schemas.microsoft.com/office/drawing/2010/main" xmlns:p14="http://schemas.microsoft.com/office/powerpoint/2010/main" xmlns:a16="http://schemas.microsoft.com/office/drawing/2014/main" xmlns="" w="9525">
                   <a:solidFill>
                     <a:srgbClr val="000000"/>
                   </a:solidFill>
@@ -29207,7 +29664,7 @@
             </a:ln>
             <a:extLst>
               <a:ext uri="{91240B29-F687-4f45-9708-019B960494DF}">
-                <a14:hiddenLine xmlns="" xmlns:a16="http://schemas.microsoft.com/office/drawing/2014/main" xmlns:p14="http://schemas.microsoft.com/office/powerpoint/2010/main" xmlns:a14="http://schemas.microsoft.com/office/drawing/2010/main" w="9525">
+                <a14:hiddenLine xmlns:a14="http://schemas.microsoft.com/office/drawing/2010/main" xmlns:p14="http://schemas.microsoft.com/office/powerpoint/2010/main" xmlns:a16="http://schemas.microsoft.com/office/drawing/2014/main" xmlns="" w="9525">
                   <a:solidFill>
                     <a:srgbClr val="000000"/>
                   </a:solidFill>
@@ -29256,7 +29713,7 @@
             </a:ln>
             <a:extLst>
               <a:ext uri="{91240B29-F687-4f45-9708-019B960494DF}">
-                <a14:hiddenLine xmlns="" xmlns:a16="http://schemas.microsoft.com/office/drawing/2014/main" xmlns:p14="http://schemas.microsoft.com/office/powerpoint/2010/main" xmlns:a14="http://schemas.microsoft.com/office/drawing/2010/main" w="9525">
+                <a14:hiddenLine xmlns:a14="http://schemas.microsoft.com/office/drawing/2010/main" xmlns:p14="http://schemas.microsoft.com/office/powerpoint/2010/main" xmlns:a16="http://schemas.microsoft.com/office/drawing/2014/main" xmlns="" w="9525">
                   <a:solidFill>
                     <a:srgbClr val="000000"/>
                   </a:solidFill>
@@ -29361,7 +29818,7 @@
             </a:ln>
             <a:extLst>
               <a:ext uri="{91240B29-F687-4f45-9708-019B960494DF}">
-                <a14:hiddenLine xmlns="" xmlns:a16="http://schemas.microsoft.com/office/drawing/2014/main" xmlns:p14="http://schemas.microsoft.com/office/powerpoint/2010/main" xmlns:a14="http://schemas.microsoft.com/office/drawing/2010/main" w="9525">
+                <a14:hiddenLine xmlns:a14="http://schemas.microsoft.com/office/drawing/2010/main" xmlns:p14="http://schemas.microsoft.com/office/powerpoint/2010/main" xmlns:a16="http://schemas.microsoft.com/office/drawing/2014/main" xmlns="" w="9525">
                   <a:solidFill>
                     <a:srgbClr val="000000"/>
                   </a:solidFill>
@@ -29438,7 +29895,7 @@
             </a:ln>
             <a:extLst>
               <a:ext uri="{91240B29-F687-4f45-9708-019B960494DF}">
-                <a14:hiddenLine xmlns="" xmlns:a16="http://schemas.microsoft.com/office/drawing/2014/main" xmlns:p14="http://schemas.microsoft.com/office/powerpoint/2010/main" xmlns:a14="http://schemas.microsoft.com/office/drawing/2010/main" w="9525">
+                <a14:hiddenLine xmlns:a14="http://schemas.microsoft.com/office/drawing/2010/main" xmlns:p14="http://schemas.microsoft.com/office/powerpoint/2010/main" xmlns:a16="http://schemas.microsoft.com/office/drawing/2014/main" xmlns="" w="9525">
                   <a:solidFill>
                     <a:srgbClr val="000000"/>
                   </a:solidFill>
@@ -29515,7 +29972,7 @@
             </a:ln>
             <a:extLst>
               <a:ext uri="{91240B29-F687-4f45-9708-019B960494DF}">
-                <a14:hiddenLine xmlns="" xmlns:a16="http://schemas.microsoft.com/office/drawing/2014/main" xmlns:p14="http://schemas.microsoft.com/office/powerpoint/2010/main" xmlns:a14="http://schemas.microsoft.com/office/drawing/2010/main" w="9525">
+                <a14:hiddenLine xmlns:a14="http://schemas.microsoft.com/office/drawing/2010/main" xmlns:p14="http://schemas.microsoft.com/office/powerpoint/2010/main" xmlns:a16="http://schemas.microsoft.com/office/drawing/2014/main" xmlns="" w="9525">
                   <a:solidFill>
                     <a:srgbClr val="000000"/>
                   </a:solidFill>
@@ -29620,7 +30077,7 @@
             </a:ln>
             <a:extLst>
               <a:ext uri="{91240B29-F687-4f45-9708-019B960494DF}">
-                <a14:hiddenLine xmlns="" xmlns:a16="http://schemas.microsoft.com/office/drawing/2014/main" xmlns:p14="http://schemas.microsoft.com/office/powerpoint/2010/main" xmlns:a14="http://schemas.microsoft.com/office/drawing/2010/main" w="9525">
+                <a14:hiddenLine xmlns:a14="http://schemas.microsoft.com/office/drawing/2010/main" xmlns:p14="http://schemas.microsoft.com/office/powerpoint/2010/main" xmlns:a16="http://schemas.microsoft.com/office/drawing/2014/main" xmlns="" w="9525">
                   <a:solidFill>
                     <a:srgbClr val="000000"/>
                   </a:solidFill>
@@ -29697,7 +30154,7 @@
             </a:ln>
             <a:extLst>
               <a:ext uri="{91240B29-F687-4f45-9708-019B960494DF}">
-                <a14:hiddenLine xmlns="" xmlns:a16="http://schemas.microsoft.com/office/drawing/2014/main" xmlns:p14="http://schemas.microsoft.com/office/powerpoint/2010/main" xmlns:a14="http://schemas.microsoft.com/office/drawing/2010/main" w="9525">
+                <a14:hiddenLine xmlns:a14="http://schemas.microsoft.com/office/drawing/2010/main" xmlns:p14="http://schemas.microsoft.com/office/powerpoint/2010/main" xmlns:a16="http://schemas.microsoft.com/office/drawing/2014/main" xmlns="" w="9525">
                   <a:solidFill>
                     <a:srgbClr val="000000"/>
                   </a:solidFill>
@@ -29774,7 +30231,7 @@
             </a:ln>
             <a:extLst>
               <a:ext uri="{91240B29-F687-4f45-9708-019B960494DF}">
-                <a14:hiddenLine xmlns="" xmlns:a16="http://schemas.microsoft.com/office/drawing/2014/main" xmlns:p14="http://schemas.microsoft.com/office/powerpoint/2010/main" xmlns:a14="http://schemas.microsoft.com/office/drawing/2010/main" w="9525">
+                <a14:hiddenLine xmlns:a14="http://schemas.microsoft.com/office/drawing/2010/main" xmlns:p14="http://schemas.microsoft.com/office/powerpoint/2010/main" xmlns:a16="http://schemas.microsoft.com/office/drawing/2014/main" xmlns="" w="9525">
                   <a:solidFill>
                     <a:srgbClr val="000000"/>
                   </a:solidFill>
@@ -29879,7 +30336,7 @@
             </a:ln>
             <a:extLst>
               <a:ext uri="{91240B29-F687-4f45-9708-019B960494DF}">
-                <a14:hiddenLine xmlns="" xmlns:a16="http://schemas.microsoft.com/office/drawing/2014/main" xmlns:p14="http://schemas.microsoft.com/office/powerpoint/2010/main" xmlns:a14="http://schemas.microsoft.com/office/drawing/2010/main" w="9525">
+                <a14:hiddenLine xmlns:a14="http://schemas.microsoft.com/office/drawing/2010/main" xmlns:p14="http://schemas.microsoft.com/office/powerpoint/2010/main" xmlns:a16="http://schemas.microsoft.com/office/drawing/2014/main" xmlns="" w="9525">
                   <a:solidFill>
                     <a:srgbClr val="000000"/>
                   </a:solidFill>
@@ -29984,7 +30441,7 @@
             </a:ln>
             <a:extLst>
               <a:ext uri="{91240B29-F687-4f45-9708-019B960494DF}">
-                <a14:hiddenLine xmlns="" xmlns:a16="http://schemas.microsoft.com/office/drawing/2014/main" xmlns:p14="http://schemas.microsoft.com/office/powerpoint/2010/main" xmlns:a14="http://schemas.microsoft.com/office/drawing/2010/main" w="9525">
+                <a14:hiddenLine xmlns:a14="http://schemas.microsoft.com/office/drawing/2010/main" xmlns:p14="http://schemas.microsoft.com/office/powerpoint/2010/main" xmlns:a16="http://schemas.microsoft.com/office/drawing/2014/main" xmlns="" w="9525">
                   <a:solidFill>
                     <a:srgbClr val="000000"/>
                   </a:solidFill>
@@ -30061,7 +30518,7 @@
             </a:ln>
             <a:extLst>
               <a:ext uri="{91240B29-F687-4f45-9708-019B960494DF}">
-                <a14:hiddenLine xmlns="" xmlns:a16="http://schemas.microsoft.com/office/drawing/2014/main" xmlns:p14="http://schemas.microsoft.com/office/powerpoint/2010/main" xmlns:a14="http://schemas.microsoft.com/office/drawing/2010/main" w="9525">
+                <a14:hiddenLine xmlns:a14="http://schemas.microsoft.com/office/drawing/2010/main" xmlns:p14="http://schemas.microsoft.com/office/powerpoint/2010/main" xmlns:a16="http://schemas.microsoft.com/office/drawing/2014/main" xmlns="" w="9525">
                   <a:solidFill>
                     <a:srgbClr val="000000"/>
                   </a:solidFill>
@@ -30186,7 +30643,7 @@
             </a:ln>
             <a:extLst>
               <a:ext uri="{91240B29-F687-4f45-9708-019B960494DF}">
-                <a14:hiddenLine xmlns="" xmlns:a16="http://schemas.microsoft.com/office/drawing/2014/main" xmlns:p14="http://schemas.microsoft.com/office/powerpoint/2010/main" xmlns:a14="http://schemas.microsoft.com/office/drawing/2010/main" w="9525">
+                <a14:hiddenLine xmlns:a14="http://schemas.microsoft.com/office/drawing/2010/main" xmlns:p14="http://schemas.microsoft.com/office/powerpoint/2010/main" xmlns:a16="http://schemas.microsoft.com/office/drawing/2014/main" xmlns="" w="9525">
                   <a:solidFill>
                     <a:srgbClr val="000000"/>
                   </a:solidFill>
@@ -30263,7 +30720,7 @@
             </a:ln>
             <a:extLst>
               <a:ext uri="{91240B29-F687-4f45-9708-019B960494DF}">
-                <a14:hiddenLine xmlns="" xmlns:a16="http://schemas.microsoft.com/office/drawing/2014/main" xmlns:p14="http://schemas.microsoft.com/office/powerpoint/2010/main" xmlns:a14="http://schemas.microsoft.com/office/drawing/2010/main" w="9525">
+                <a14:hiddenLine xmlns:a14="http://schemas.microsoft.com/office/drawing/2010/main" xmlns:p14="http://schemas.microsoft.com/office/powerpoint/2010/main" xmlns:a16="http://schemas.microsoft.com/office/drawing/2014/main" xmlns="" w="9525">
                   <a:solidFill>
                     <a:srgbClr val="000000"/>
                   </a:solidFill>
@@ -30368,7 +30825,7 @@
             </a:ln>
             <a:extLst>
               <a:ext uri="{91240B29-F687-4f45-9708-019B960494DF}">
-                <a14:hiddenLine xmlns="" xmlns:a16="http://schemas.microsoft.com/office/drawing/2014/main" xmlns:p14="http://schemas.microsoft.com/office/powerpoint/2010/main" xmlns:a14="http://schemas.microsoft.com/office/drawing/2010/main" w="9525">
+                <a14:hiddenLine xmlns:a14="http://schemas.microsoft.com/office/drawing/2010/main" xmlns:p14="http://schemas.microsoft.com/office/powerpoint/2010/main" xmlns:a16="http://schemas.microsoft.com/office/drawing/2014/main" xmlns="" w="9525">
                   <a:solidFill>
                     <a:srgbClr val="000000"/>
                   </a:solidFill>
@@ -30473,7 +30930,7 @@
             </a:ln>
             <a:extLst>
               <a:ext uri="{91240B29-F687-4f45-9708-019B960494DF}">
-                <a14:hiddenLine xmlns="" xmlns:a16="http://schemas.microsoft.com/office/drawing/2014/main" xmlns:p14="http://schemas.microsoft.com/office/powerpoint/2010/main" xmlns:a14="http://schemas.microsoft.com/office/drawing/2010/main" w="9525">
+                <a14:hiddenLine xmlns:a14="http://schemas.microsoft.com/office/drawing/2010/main" xmlns:p14="http://schemas.microsoft.com/office/powerpoint/2010/main" xmlns:a16="http://schemas.microsoft.com/office/drawing/2014/main" xmlns="" w="9525">
                   <a:solidFill>
                     <a:srgbClr val="000000"/>
                   </a:solidFill>
@@ -30550,7 +31007,7 @@
             </a:ln>
             <a:extLst>
               <a:ext uri="{91240B29-F687-4f45-9708-019B960494DF}">
-                <a14:hiddenLine xmlns="" xmlns:a16="http://schemas.microsoft.com/office/drawing/2014/main" xmlns:p14="http://schemas.microsoft.com/office/powerpoint/2010/main" xmlns:a14="http://schemas.microsoft.com/office/drawing/2010/main" w="9525">
+                <a14:hiddenLine xmlns:a14="http://schemas.microsoft.com/office/drawing/2010/main" xmlns:p14="http://schemas.microsoft.com/office/powerpoint/2010/main" xmlns:a16="http://schemas.microsoft.com/office/drawing/2014/main" xmlns="" w="9525">
                   <a:solidFill>
                     <a:srgbClr val="000000"/>
                   </a:solidFill>
@@ -30655,7 +31112,7 @@
             </a:ln>
             <a:extLst>
               <a:ext uri="{91240B29-F687-4f45-9708-019B960494DF}">
-                <a14:hiddenLine xmlns="" xmlns:a16="http://schemas.microsoft.com/office/drawing/2014/main" xmlns:p14="http://schemas.microsoft.com/office/powerpoint/2010/main" xmlns:a14="http://schemas.microsoft.com/office/drawing/2010/main" w="9525">
+                <a14:hiddenLine xmlns:a14="http://schemas.microsoft.com/office/drawing/2010/main" xmlns:p14="http://schemas.microsoft.com/office/powerpoint/2010/main" xmlns:a16="http://schemas.microsoft.com/office/drawing/2014/main" xmlns="" w="9525">
                   <a:solidFill>
                     <a:srgbClr val="000000"/>
                   </a:solidFill>
@@ -30760,7 +31217,7 @@
             </a:ln>
             <a:extLst>
               <a:ext uri="{91240B29-F687-4f45-9708-019B960494DF}">
-                <a14:hiddenLine xmlns="" xmlns:a16="http://schemas.microsoft.com/office/drawing/2014/main" xmlns:p14="http://schemas.microsoft.com/office/powerpoint/2010/main" xmlns:a14="http://schemas.microsoft.com/office/drawing/2010/main" w="9525">
+                <a14:hiddenLine xmlns:a14="http://schemas.microsoft.com/office/drawing/2010/main" xmlns:p14="http://schemas.microsoft.com/office/powerpoint/2010/main" xmlns:a16="http://schemas.microsoft.com/office/drawing/2014/main" xmlns="" w="9525">
                   <a:solidFill>
                     <a:srgbClr val="000000"/>
                   </a:solidFill>
@@ -30831,7 +31288,7 @@
             </a:ln>
             <a:extLst>
               <a:ext uri="{91240B29-F687-4f45-9708-019B960494DF}">
-                <a14:hiddenLine xmlns="" xmlns:a16="http://schemas.microsoft.com/office/drawing/2014/main" xmlns:p14="http://schemas.microsoft.com/office/powerpoint/2010/main" xmlns:a14="http://schemas.microsoft.com/office/drawing/2010/main" w="9525">
+                <a14:hiddenLine xmlns:a14="http://schemas.microsoft.com/office/drawing/2010/main" xmlns:p14="http://schemas.microsoft.com/office/powerpoint/2010/main" xmlns:a16="http://schemas.microsoft.com/office/drawing/2014/main" xmlns="" w="9525">
                   <a:solidFill>
                     <a:srgbClr val="000000"/>
                   </a:solidFill>
@@ -30936,7 +31393,7 @@
             </a:ln>
             <a:extLst>
               <a:ext uri="{91240B29-F687-4f45-9708-019B960494DF}">
-                <a14:hiddenLine xmlns="" xmlns:a16="http://schemas.microsoft.com/office/drawing/2014/main" xmlns:p14="http://schemas.microsoft.com/office/powerpoint/2010/main" xmlns:a14="http://schemas.microsoft.com/office/drawing/2010/main" w="9525">
+                <a14:hiddenLine xmlns:a14="http://schemas.microsoft.com/office/drawing/2010/main" xmlns:p14="http://schemas.microsoft.com/office/powerpoint/2010/main" xmlns:a16="http://schemas.microsoft.com/office/drawing/2014/main" xmlns="" w="9525">
                   <a:solidFill>
                     <a:srgbClr val="000000"/>
                   </a:solidFill>
@@ -31007,7 +31464,7 @@
             </a:ln>
             <a:extLst>
               <a:ext uri="{91240B29-F687-4f45-9708-019B960494DF}">
-                <a14:hiddenLine xmlns="" xmlns:a16="http://schemas.microsoft.com/office/drawing/2014/main" xmlns:p14="http://schemas.microsoft.com/office/powerpoint/2010/main" xmlns:a14="http://schemas.microsoft.com/office/drawing/2010/main" w="9525">
+                <a14:hiddenLine xmlns:a14="http://schemas.microsoft.com/office/drawing/2010/main" xmlns:p14="http://schemas.microsoft.com/office/powerpoint/2010/main" xmlns:a16="http://schemas.microsoft.com/office/drawing/2014/main" xmlns="" w="9525">
                   <a:solidFill>
                     <a:srgbClr val="000000"/>
                   </a:solidFill>
@@ -31112,7 +31569,7 @@
             </a:ln>
             <a:extLst>
               <a:ext uri="{91240B29-F687-4f45-9708-019B960494DF}">
-                <a14:hiddenLine xmlns="" xmlns:a16="http://schemas.microsoft.com/office/drawing/2014/main" xmlns:p14="http://schemas.microsoft.com/office/powerpoint/2010/main" xmlns:a14="http://schemas.microsoft.com/office/drawing/2010/main" w="9525">
+                <a14:hiddenLine xmlns:a14="http://schemas.microsoft.com/office/drawing/2010/main" xmlns:p14="http://schemas.microsoft.com/office/powerpoint/2010/main" xmlns:a16="http://schemas.microsoft.com/office/drawing/2014/main" xmlns="" w="9525">
                   <a:solidFill>
                     <a:srgbClr val="000000"/>
                   </a:solidFill>
@@ -31195,7 +31652,7 @@
             </a:ln>
             <a:extLst>
               <a:ext uri="{91240B29-F687-4f45-9708-019B960494DF}">
-                <a14:hiddenLine xmlns="" xmlns:a16="http://schemas.microsoft.com/office/drawing/2014/main" xmlns:p14="http://schemas.microsoft.com/office/powerpoint/2010/main" xmlns:a14="http://schemas.microsoft.com/office/drawing/2010/main" w="9525">
+                <a14:hiddenLine xmlns:a14="http://schemas.microsoft.com/office/drawing/2010/main" xmlns:p14="http://schemas.microsoft.com/office/powerpoint/2010/main" xmlns:a16="http://schemas.microsoft.com/office/drawing/2014/main" xmlns="" w="9525">
                   <a:solidFill>
                     <a:srgbClr val="000000"/>
                   </a:solidFill>
@@ -31300,7 +31757,7 @@
             </a:ln>
             <a:extLst>
               <a:ext uri="{91240B29-F687-4f45-9708-019B960494DF}">
-                <a14:hiddenLine xmlns="" xmlns:a16="http://schemas.microsoft.com/office/drawing/2014/main" xmlns:p14="http://schemas.microsoft.com/office/powerpoint/2010/main" xmlns:a14="http://schemas.microsoft.com/office/drawing/2010/main" w="9525">
+                <a14:hiddenLine xmlns:a14="http://schemas.microsoft.com/office/drawing/2010/main" xmlns:p14="http://schemas.microsoft.com/office/powerpoint/2010/main" xmlns:a16="http://schemas.microsoft.com/office/drawing/2014/main" xmlns="" w="9525">
                   <a:solidFill>
                     <a:srgbClr val="000000"/>
                   </a:solidFill>
@@ -31383,7 +31840,7 @@
             </a:ln>
             <a:extLst>
               <a:ext uri="{91240B29-F687-4f45-9708-019B960494DF}">
-                <a14:hiddenLine xmlns="" xmlns:a16="http://schemas.microsoft.com/office/drawing/2014/main" xmlns:p14="http://schemas.microsoft.com/office/powerpoint/2010/main" xmlns:a14="http://schemas.microsoft.com/office/drawing/2010/main" w="9525">
+                <a14:hiddenLine xmlns:a14="http://schemas.microsoft.com/office/drawing/2010/main" xmlns:p14="http://schemas.microsoft.com/office/powerpoint/2010/main" xmlns:a16="http://schemas.microsoft.com/office/drawing/2014/main" xmlns="" w="9525">
                   <a:solidFill>
                     <a:srgbClr val="000000"/>
                   </a:solidFill>
@@ -31488,7 +31945,7 @@
             </a:ln>
             <a:extLst>
               <a:ext uri="{91240B29-F687-4f45-9708-019B960494DF}">
-                <a14:hiddenLine xmlns="" xmlns:a16="http://schemas.microsoft.com/office/drawing/2014/main" xmlns:p14="http://schemas.microsoft.com/office/powerpoint/2010/main" xmlns:a14="http://schemas.microsoft.com/office/drawing/2010/main" w="9525">
+                <a14:hiddenLine xmlns:a14="http://schemas.microsoft.com/office/drawing/2010/main" xmlns:p14="http://schemas.microsoft.com/office/powerpoint/2010/main" xmlns:a16="http://schemas.microsoft.com/office/drawing/2014/main" xmlns="" w="9525">
                   <a:solidFill>
                     <a:srgbClr val="000000"/>
                   </a:solidFill>
@@ -31537,7 +31994,7 @@
             </a:ln>
             <a:extLst>
               <a:ext uri="{91240B29-F687-4f45-9708-019B960494DF}">
-                <a14:hiddenLine xmlns="" xmlns:a16="http://schemas.microsoft.com/office/drawing/2014/main" xmlns:p14="http://schemas.microsoft.com/office/powerpoint/2010/main" xmlns:a14="http://schemas.microsoft.com/office/drawing/2010/main" w="9525">
+                <a14:hiddenLine xmlns:a14="http://schemas.microsoft.com/office/drawing/2010/main" xmlns:p14="http://schemas.microsoft.com/office/powerpoint/2010/main" xmlns:a16="http://schemas.microsoft.com/office/drawing/2014/main" xmlns="" w="9525">
                   <a:solidFill>
                     <a:srgbClr val="000000"/>
                   </a:solidFill>
@@ -31642,7 +32099,7 @@
             </a:ln>
             <a:extLst>
               <a:ext uri="{91240B29-F687-4f45-9708-019B960494DF}">
-                <a14:hiddenLine xmlns="" xmlns:a16="http://schemas.microsoft.com/office/drawing/2014/main" xmlns:p14="http://schemas.microsoft.com/office/powerpoint/2010/main" xmlns:a14="http://schemas.microsoft.com/office/drawing/2010/main" w="9525">
+                <a14:hiddenLine xmlns:a14="http://schemas.microsoft.com/office/drawing/2010/main" xmlns:p14="http://schemas.microsoft.com/office/powerpoint/2010/main" xmlns:a16="http://schemas.microsoft.com/office/drawing/2014/main" xmlns="" w="9525">
                   <a:solidFill>
                     <a:srgbClr val="000000"/>
                   </a:solidFill>
@@ -31719,7 +32176,7 @@
             </a:ln>
             <a:extLst>
               <a:ext uri="{91240B29-F687-4f45-9708-019B960494DF}">
-                <a14:hiddenLine xmlns="" xmlns:a16="http://schemas.microsoft.com/office/drawing/2014/main" xmlns:p14="http://schemas.microsoft.com/office/powerpoint/2010/main" xmlns:a14="http://schemas.microsoft.com/office/drawing/2010/main" w="9525">
+                <a14:hiddenLine xmlns:a14="http://schemas.microsoft.com/office/drawing/2010/main" xmlns:p14="http://schemas.microsoft.com/office/powerpoint/2010/main" xmlns:a16="http://schemas.microsoft.com/office/drawing/2014/main" xmlns="" w="9525">
                   <a:solidFill>
                     <a:srgbClr val="000000"/>
                   </a:solidFill>
@@ -31796,7 +32253,7 @@
             </a:ln>
             <a:extLst>
               <a:ext uri="{91240B29-F687-4f45-9708-019B960494DF}">
-                <a14:hiddenLine xmlns="" xmlns:a16="http://schemas.microsoft.com/office/drawing/2014/main" xmlns:p14="http://schemas.microsoft.com/office/powerpoint/2010/main" xmlns:a14="http://schemas.microsoft.com/office/drawing/2010/main" w="9525">
+                <a14:hiddenLine xmlns:a14="http://schemas.microsoft.com/office/drawing/2010/main" xmlns:p14="http://schemas.microsoft.com/office/powerpoint/2010/main" xmlns:a16="http://schemas.microsoft.com/office/drawing/2014/main" xmlns="" w="9525">
                   <a:solidFill>
                     <a:srgbClr val="000000"/>
                   </a:solidFill>
@@ -31901,7 +32358,7 @@
             </a:ln>
             <a:extLst>
               <a:ext uri="{91240B29-F687-4f45-9708-019B960494DF}">
-                <a14:hiddenLine xmlns="" xmlns:a16="http://schemas.microsoft.com/office/drawing/2014/main" xmlns:p14="http://schemas.microsoft.com/office/powerpoint/2010/main" xmlns:a14="http://schemas.microsoft.com/office/drawing/2010/main" w="9525">
+                <a14:hiddenLine xmlns:a14="http://schemas.microsoft.com/office/drawing/2010/main" xmlns:p14="http://schemas.microsoft.com/office/powerpoint/2010/main" xmlns:a16="http://schemas.microsoft.com/office/drawing/2014/main" xmlns="" w="9525">
                   <a:solidFill>
                     <a:srgbClr val="000000"/>
                   </a:solidFill>
@@ -31984,7 +32441,7 @@
             </a:ln>
             <a:extLst>
               <a:ext uri="{91240B29-F687-4f45-9708-019B960494DF}">
-                <a14:hiddenLine xmlns="" xmlns:a16="http://schemas.microsoft.com/office/drawing/2014/main" xmlns:p14="http://schemas.microsoft.com/office/powerpoint/2010/main" xmlns:a14="http://schemas.microsoft.com/office/drawing/2010/main" w="9525">
+                <a14:hiddenLine xmlns:a14="http://schemas.microsoft.com/office/drawing/2010/main" xmlns:p14="http://schemas.microsoft.com/office/powerpoint/2010/main" xmlns:a16="http://schemas.microsoft.com/office/drawing/2014/main" xmlns="" w="9525">
                   <a:solidFill>
                     <a:srgbClr val="000000"/>
                   </a:solidFill>
@@ -32061,7 +32518,7 @@
             </a:ln>
             <a:extLst>
               <a:ext uri="{91240B29-F687-4f45-9708-019B960494DF}">
-                <a14:hiddenLine xmlns="" xmlns:a16="http://schemas.microsoft.com/office/drawing/2014/main" xmlns:p14="http://schemas.microsoft.com/office/powerpoint/2010/main" xmlns:a14="http://schemas.microsoft.com/office/drawing/2010/main" w="9525">
+                <a14:hiddenLine xmlns:a14="http://schemas.microsoft.com/office/drawing/2010/main" xmlns:p14="http://schemas.microsoft.com/office/powerpoint/2010/main" xmlns:a16="http://schemas.microsoft.com/office/drawing/2014/main" xmlns="" w="9525">
                   <a:solidFill>
                     <a:srgbClr val="000000"/>
                   </a:solidFill>
@@ -32166,7 +32623,7 @@
             </a:ln>
             <a:extLst>
               <a:ext uri="{91240B29-F687-4f45-9708-019B960494DF}">
-                <a14:hiddenLine xmlns="" xmlns:a16="http://schemas.microsoft.com/office/drawing/2014/main" xmlns:p14="http://schemas.microsoft.com/office/powerpoint/2010/main" xmlns:a14="http://schemas.microsoft.com/office/drawing/2010/main" w="9525">
+                <a14:hiddenLine xmlns:a14="http://schemas.microsoft.com/office/drawing/2010/main" xmlns:p14="http://schemas.microsoft.com/office/powerpoint/2010/main" xmlns:a16="http://schemas.microsoft.com/office/drawing/2014/main" xmlns="" w="9525">
                   <a:solidFill>
                     <a:srgbClr val="000000"/>
                   </a:solidFill>
@@ -32243,7 +32700,7 @@
             </a:ln>
             <a:extLst>
               <a:ext uri="{91240B29-F687-4f45-9708-019B960494DF}">
-                <a14:hiddenLine xmlns="" xmlns:a16="http://schemas.microsoft.com/office/drawing/2014/main" xmlns:p14="http://schemas.microsoft.com/office/powerpoint/2010/main" xmlns:a14="http://schemas.microsoft.com/office/drawing/2010/main" w="9525">
+                <a14:hiddenLine xmlns:a14="http://schemas.microsoft.com/office/drawing/2010/main" xmlns:p14="http://schemas.microsoft.com/office/powerpoint/2010/main" xmlns:a16="http://schemas.microsoft.com/office/drawing/2014/main" xmlns="" w="9525">
                   <a:solidFill>
                     <a:srgbClr val="000000"/>
                   </a:solidFill>
@@ -32348,7 +32805,7 @@
             </a:ln>
             <a:extLst>
               <a:ext uri="{91240B29-F687-4f45-9708-019B960494DF}">
-                <a14:hiddenLine xmlns="" xmlns:a16="http://schemas.microsoft.com/office/drawing/2014/main" xmlns:p14="http://schemas.microsoft.com/office/powerpoint/2010/main" xmlns:a14="http://schemas.microsoft.com/office/drawing/2010/main" w="9525">
+                <a14:hiddenLine xmlns:a14="http://schemas.microsoft.com/office/drawing/2010/main" xmlns:p14="http://schemas.microsoft.com/office/powerpoint/2010/main" xmlns:a16="http://schemas.microsoft.com/office/drawing/2014/main" xmlns="" w="9525">
                   <a:solidFill>
                     <a:srgbClr val="000000"/>
                   </a:solidFill>
@@ -32425,7 +32882,7 @@
             </a:ln>
             <a:extLst>
               <a:ext uri="{91240B29-F687-4f45-9708-019B960494DF}">
-                <a14:hiddenLine xmlns="" xmlns:a16="http://schemas.microsoft.com/office/drawing/2014/main" xmlns:p14="http://schemas.microsoft.com/office/powerpoint/2010/main" xmlns:a14="http://schemas.microsoft.com/office/drawing/2010/main" w="9525">
+                <a14:hiddenLine xmlns:a14="http://schemas.microsoft.com/office/drawing/2010/main" xmlns:p14="http://schemas.microsoft.com/office/powerpoint/2010/main" xmlns:a16="http://schemas.microsoft.com/office/drawing/2014/main" xmlns="" w="9525">
                   <a:solidFill>
                     <a:srgbClr val="000000"/>
                   </a:solidFill>
@@ -32530,7 +32987,7 @@
             </a:ln>
             <a:extLst>
               <a:ext uri="{91240B29-F687-4f45-9708-019B960494DF}">
-                <a14:hiddenLine xmlns="" xmlns:a16="http://schemas.microsoft.com/office/drawing/2014/main" xmlns:p14="http://schemas.microsoft.com/office/powerpoint/2010/main" xmlns:a14="http://schemas.microsoft.com/office/drawing/2010/main" w="9525">
+                <a14:hiddenLine xmlns:a14="http://schemas.microsoft.com/office/drawing/2010/main" xmlns:p14="http://schemas.microsoft.com/office/powerpoint/2010/main" xmlns:a16="http://schemas.microsoft.com/office/drawing/2014/main" xmlns="" w="9525">
                   <a:solidFill>
                     <a:srgbClr val="000000"/>
                   </a:solidFill>
@@ -32579,7 +33036,7 @@
             </a:ln>
             <a:extLst>
               <a:ext uri="{91240B29-F687-4f45-9708-019B960494DF}">
-                <a14:hiddenLine xmlns="" xmlns:a16="http://schemas.microsoft.com/office/drawing/2014/main" xmlns:p14="http://schemas.microsoft.com/office/powerpoint/2010/main" xmlns:a14="http://schemas.microsoft.com/office/drawing/2010/main" w="9525">
+                <a14:hiddenLine xmlns:a14="http://schemas.microsoft.com/office/drawing/2010/main" xmlns:p14="http://schemas.microsoft.com/office/powerpoint/2010/main" xmlns:a16="http://schemas.microsoft.com/office/drawing/2014/main" xmlns="" w="9525">
                   <a:solidFill>
                     <a:srgbClr val="000000"/>
                   </a:solidFill>
@@ -32659,7 +33116,7 @@
             </a:ln>
             <a:extLst>
               <a:ext uri="{91240B29-F687-4f45-9708-019B960494DF}">
-                <a14:hiddenLine xmlns="" xmlns:a16="http://schemas.microsoft.com/office/drawing/2014/main" xmlns:p14="http://schemas.microsoft.com/office/powerpoint/2010/main" xmlns:a14="http://schemas.microsoft.com/office/drawing/2010/main" w="9525">
+                <a14:hiddenLine xmlns:a14="http://schemas.microsoft.com/office/drawing/2010/main" xmlns:p14="http://schemas.microsoft.com/office/powerpoint/2010/main" xmlns:a16="http://schemas.microsoft.com/office/drawing/2014/main" xmlns="" w="9525">
                   <a:solidFill>
                     <a:srgbClr val="000000"/>
                   </a:solidFill>
@@ -32764,7 +33221,7 @@
             </a:ln>
             <a:extLst>
               <a:ext uri="{91240B29-F687-4f45-9708-019B960494DF}">
-                <a14:hiddenLine xmlns="" xmlns:a16="http://schemas.microsoft.com/office/drawing/2014/main" xmlns:p14="http://schemas.microsoft.com/office/powerpoint/2010/main" xmlns:a14="http://schemas.microsoft.com/office/drawing/2010/main" w="9525">
+                <a14:hiddenLine xmlns:a14="http://schemas.microsoft.com/office/drawing/2010/main" xmlns:p14="http://schemas.microsoft.com/office/powerpoint/2010/main" xmlns:a16="http://schemas.microsoft.com/office/drawing/2014/main" xmlns="" w="9525">
                   <a:solidFill>
                     <a:srgbClr val="000000"/>
                   </a:solidFill>
@@ -32841,7 +33298,7 @@
             </a:ln>
             <a:extLst>
               <a:ext uri="{91240B29-F687-4f45-9708-019B960494DF}">
-                <a14:hiddenLine xmlns="" xmlns:a16="http://schemas.microsoft.com/office/drawing/2014/main" xmlns:p14="http://schemas.microsoft.com/office/powerpoint/2010/main" xmlns:a14="http://schemas.microsoft.com/office/drawing/2010/main" w="9525">
+                <a14:hiddenLine xmlns:a14="http://schemas.microsoft.com/office/drawing/2010/main" xmlns:p14="http://schemas.microsoft.com/office/powerpoint/2010/main" xmlns:a16="http://schemas.microsoft.com/office/drawing/2014/main" xmlns="" w="9525">
                   <a:solidFill>
                     <a:srgbClr val="000000"/>
                   </a:solidFill>
@@ -32946,7 +33403,7 @@
             </a:ln>
             <a:extLst>
               <a:ext uri="{91240B29-F687-4f45-9708-019B960494DF}">
-                <a14:hiddenLine xmlns="" xmlns:a16="http://schemas.microsoft.com/office/drawing/2014/main" xmlns:p14="http://schemas.microsoft.com/office/powerpoint/2010/main" xmlns:a14="http://schemas.microsoft.com/office/drawing/2010/main" w="9525">
+                <a14:hiddenLine xmlns:a14="http://schemas.microsoft.com/office/drawing/2010/main" xmlns:p14="http://schemas.microsoft.com/office/powerpoint/2010/main" xmlns:a16="http://schemas.microsoft.com/office/drawing/2014/main" xmlns="" w="9525">
                   <a:solidFill>
                     <a:srgbClr val="000000"/>
                   </a:solidFill>
@@ -33051,7 +33508,7 @@
             </a:ln>
             <a:extLst>
               <a:ext uri="{91240B29-F687-4f45-9708-019B960494DF}">
-                <a14:hiddenLine xmlns="" xmlns:a16="http://schemas.microsoft.com/office/drawing/2014/main" xmlns:p14="http://schemas.microsoft.com/office/powerpoint/2010/main" xmlns:a14="http://schemas.microsoft.com/office/drawing/2010/main" w="9525">
+                <a14:hiddenLine xmlns:a14="http://schemas.microsoft.com/office/drawing/2010/main" xmlns:p14="http://schemas.microsoft.com/office/powerpoint/2010/main" xmlns:a16="http://schemas.microsoft.com/office/drawing/2014/main" xmlns="" w="9525">
                   <a:solidFill>
                     <a:srgbClr val="000000"/>
                   </a:solidFill>
@@ -33131,7 +33588,7 @@
             </a:ln>
             <a:extLst>
               <a:ext uri="{91240B29-F687-4f45-9708-019B960494DF}">
-                <a14:hiddenLine xmlns="" xmlns:a16="http://schemas.microsoft.com/office/drawing/2014/main" xmlns:p14="http://schemas.microsoft.com/office/powerpoint/2010/main" xmlns:a14="http://schemas.microsoft.com/office/drawing/2010/main" w="9525">
+                <a14:hiddenLine xmlns:a14="http://schemas.microsoft.com/office/drawing/2010/main" xmlns:p14="http://schemas.microsoft.com/office/powerpoint/2010/main" xmlns:a16="http://schemas.microsoft.com/office/drawing/2014/main" xmlns="" w="9525">
                   <a:solidFill>
                     <a:srgbClr val="000000"/>
                   </a:solidFill>
@@ -33208,7 +33665,7 @@
             </a:ln>
             <a:extLst>
               <a:ext uri="{91240B29-F687-4f45-9708-019B960494DF}">
-                <a14:hiddenLine xmlns="" xmlns:a16="http://schemas.microsoft.com/office/drawing/2014/main" xmlns:p14="http://schemas.microsoft.com/office/powerpoint/2010/main" xmlns:a14="http://schemas.microsoft.com/office/drawing/2010/main" w="9525">
+                <a14:hiddenLine xmlns:a14="http://schemas.microsoft.com/office/drawing/2010/main" xmlns:p14="http://schemas.microsoft.com/office/powerpoint/2010/main" xmlns:a16="http://schemas.microsoft.com/office/drawing/2014/main" xmlns="" w="9525">
                   <a:solidFill>
                     <a:srgbClr val="000000"/>
                   </a:solidFill>
@@ -33313,7 +33770,7 @@
             </a:ln>
             <a:extLst>
               <a:ext uri="{91240B29-F687-4f45-9708-019B960494DF}">
-                <a14:hiddenLine xmlns="" xmlns:a16="http://schemas.microsoft.com/office/drawing/2014/main" xmlns:p14="http://schemas.microsoft.com/office/powerpoint/2010/main" xmlns:a14="http://schemas.microsoft.com/office/drawing/2010/main" w="9525">
+                <a14:hiddenLine xmlns:a14="http://schemas.microsoft.com/office/drawing/2010/main" xmlns:p14="http://schemas.microsoft.com/office/powerpoint/2010/main" xmlns:a16="http://schemas.microsoft.com/office/drawing/2014/main" xmlns="" w="9525">
                   <a:solidFill>
                     <a:srgbClr val="000000"/>
                   </a:solidFill>
@@ -33418,7 +33875,7 @@
             </a:ln>
             <a:extLst>
               <a:ext uri="{91240B29-F687-4f45-9708-019B960494DF}">
-                <a14:hiddenLine xmlns="" xmlns:a16="http://schemas.microsoft.com/office/drawing/2014/main" xmlns:p14="http://schemas.microsoft.com/office/powerpoint/2010/main" xmlns:a14="http://schemas.microsoft.com/office/drawing/2010/main" w="9525">
+                <a14:hiddenLine xmlns:a14="http://schemas.microsoft.com/office/drawing/2010/main" xmlns:p14="http://schemas.microsoft.com/office/powerpoint/2010/main" xmlns:a16="http://schemas.microsoft.com/office/drawing/2014/main" xmlns="" w="9525">
                   <a:solidFill>
                     <a:srgbClr val="000000"/>
                   </a:solidFill>
@@ -33495,7 +33952,7 @@
             </a:ln>
             <a:extLst>
               <a:ext uri="{91240B29-F687-4f45-9708-019B960494DF}">
-                <a14:hiddenLine xmlns="" xmlns:a16="http://schemas.microsoft.com/office/drawing/2014/main" xmlns:p14="http://schemas.microsoft.com/office/powerpoint/2010/main" xmlns:a14="http://schemas.microsoft.com/office/drawing/2010/main" w="9525">
+                <a14:hiddenLine xmlns:a14="http://schemas.microsoft.com/office/drawing/2010/main" xmlns:p14="http://schemas.microsoft.com/office/powerpoint/2010/main" xmlns:a16="http://schemas.microsoft.com/office/drawing/2014/main" xmlns="" w="9525">
                   <a:solidFill>
                     <a:srgbClr val="000000"/>
                   </a:solidFill>
@@ -33630,7 +34087,7 @@
             </a:ln>
             <a:extLst>
               <a:ext uri="{91240B29-F687-4f45-9708-019B960494DF}">
-                <a14:hiddenLine xmlns="" xmlns:a16="http://schemas.microsoft.com/office/drawing/2014/main" xmlns:p14="http://schemas.microsoft.com/office/powerpoint/2010/main" xmlns:a14="http://schemas.microsoft.com/office/drawing/2010/main" w="9525">
+                <a14:hiddenLine xmlns:a14="http://schemas.microsoft.com/office/drawing/2010/main" xmlns:p14="http://schemas.microsoft.com/office/powerpoint/2010/main" xmlns:a16="http://schemas.microsoft.com/office/drawing/2014/main" xmlns="" w="9525">
                   <a:solidFill>
                     <a:srgbClr val="000000"/>
                   </a:solidFill>
@@ -33713,7 +34170,7 @@
             </a:ln>
             <a:extLst>
               <a:ext uri="{91240B29-F687-4f45-9708-019B960494DF}">
-                <a14:hiddenLine xmlns="" xmlns:a16="http://schemas.microsoft.com/office/drawing/2014/main" xmlns:p14="http://schemas.microsoft.com/office/powerpoint/2010/main" xmlns:a14="http://schemas.microsoft.com/office/drawing/2010/main" w="9525">
+                <a14:hiddenLine xmlns:a14="http://schemas.microsoft.com/office/drawing/2010/main" xmlns:p14="http://schemas.microsoft.com/office/powerpoint/2010/main" xmlns:a16="http://schemas.microsoft.com/office/drawing/2014/main" xmlns="" w="9525">
                   <a:solidFill>
                     <a:srgbClr val="000000"/>
                   </a:solidFill>
@@ -33818,7 +34275,7 @@
             </a:ln>
             <a:extLst>
               <a:ext uri="{91240B29-F687-4f45-9708-019B960494DF}">
-                <a14:hiddenLine xmlns="" xmlns:a16="http://schemas.microsoft.com/office/drawing/2014/main" xmlns:p14="http://schemas.microsoft.com/office/powerpoint/2010/main" xmlns:a14="http://schemas.microsoft.com/office/drawing/2010/main" w="9525">
+                <a14:hiddenLine xmlns:a14="http://schemas.microsoft.com/office/drawing/2010/main" xmlns:p14="http://schemas.microsoft.com/office/powerpoint/2010/main" xmlns:a16="http://schemas.microsoft.com/office/drawing/2014/main" xmlns="" w="9525">
                   <a:solidFill>
                     <a:srgbClr val="000000"/>
                   </a:solidFill>
@@ -33845,6 +34302,484 @@
 </file>
 
 <file path=ppt/slides/slide2.xml><?xml version="1.0" encoding="utf-8"?>
+<p:sld xmlns:a="http://schemas.openxmlformats.org/drawingml/2006/main" xmlns:r="http://schemas.openxmlformats.org/officeDocument/2006/relationships" xmlns:p="http://schemas.openxmlformats.org/presentationml/2006/main">
+  <p:cSld>
+    <p:spTree>
+      <p:nvGrpSpPr>
+        <p:cNvPr id="1" name=""/>
+        <p:cNvGrpSpPr/>
+        <p:nvPr/>
+      </p:nvGrpSpPr>
+      <p:grpSpPr>
+        <a:xfrm>
+          <a:off x="0" y="0"/>
+          <a:ext cx="0" cy="0"/>
+          <a:chOff x="0" y="0"/>
+          <a:chExt cx="0" cy="0"/>
+        </a:xfrm>
+      </p:grpSpPr>
+      <p:sp>
+        <p:nvSpPr>
+          <p:cNvPr id="2" name="Title 1">
+            <a:extLst>
+              <a:ext uri="{FF2B5EF4-FFF2-40B4-BE49-F238E27FC236}">
+                <a16:creationId xmlns:a16="http://schemas.microsoft.com/office/drawing/2014/main" id="{6B9B0A15-048A-4A19-B865-42FDE12F7917}"/>
+              </a:ext>
+            </a:extLst>
+          </p:cNvPr>
+          <p:cNvSpPr>
+            <a:spLocks noGrp="1"/>
+          </p:cNvSpPr>
+          <p:nvPr>
+            <p:ph type="title"/>
+          </p:nvPr>
+        </p:nvSpPr>
+        <p:spPr/>
+        <p:txBody>
+          <a:bodyPr/>
+          <a:lstStyle/>
+          <a:p>
+            <a:r>
+              <a:rPr lang="en-US" dirty="0" err="1"/>
+              <a:t>Umfrage</a:t>
+            </a:r>
+            <a:r>
+              <a:rPr lang="en-US" dirty="0"/>
+              <a:t> an chat</a:t>
+            </a:r>
+            <a:endParaRPr lang="en-DE" dirty="0"/>
+          </a:p>
+        </p:txBody>
+      </p:sp>
+      <p:sp>
+        <p:nvSpPr>
+          <p:cNvPr id="3" name="Content Placeholder 2">
+            <a:extLst>
+              <a:ext uri="{FF2B5EF4-FFF2-40B4-BE49-F238E27FC236}">
+                <a16:creationId xmlns:a16="http://schemas.microsoft.com/office/drawing/2014/main" id="{B0717D57-A861-44AB-A162-44B3FA4C2296}"/>
+              </a:ext>
+            </a:extLst>
+          </p:cNvPr>
+          <p:cNvSpPr>
+            <a:spLocks noGrp="1"/>
+          </p:cNvSpPr>
+          <p:nvPr>
+            <p:ph idx="1"/>
+          </p:nvPr>
+        </p:nvSpPr>
+        <p:spPr/>
+        <p:txBody>
+          <a:bodyPr/>
+          <a:lstStyle/>
+          <a:p>
+            <a:r>
+              <a:rPr lang="en-US" dirty="0"/>
+              <a:t>Beginner = 1</a:t>
+            </a:r>
+          </a:p>
+          <a:p>
+            <a:r>
+              <a:rPr lang="en-US" dirty="0"/>
+              <a:t>Schon mal </a:t>
+            </a:r>
+            <a:r>
+              <a:rPr lang="en-US" dirty="0" err="1"/>
+              <a:t>mit</a:t>
+            </a:r>
+            <a:r>
+              <a:rPr lang="en-US" dirty="0"/>
+              <a:t> </a:t>
+            </a:r>
+            <a:r>
+              <a:rPr lang="en-US" dirty="0" err="1"/>
+              <a:t>gearbeitet</a:t>
+            </a:r>
+            <a:r>
+              <a:rPr lang="en-US" dirty="0"/>
+              <a:t> = 2</a:t>
+            </a:r>
+          </a:p>
+          <a:p>
+            <a:r>
+              <a:rPr lang="en-US" dirty="0" err="1"/>
+              <a:t>Produktiv</a:t>
+            </a:r>
+            <a:r>
+              <a:rPr lang="en-US" dirty="0"/>
+              <a:t> </a:t>
+            </a:r>
+            <a:r>
+              <a:rPr lang="en-US" dirty="0" err="1"/>
+              <a:t>im</a:t>
+            </a:r>
+            <a:r>
+              <a:rPr lang="en-US" dirty="0"/>
+              <a:t> </a:t>
+            </a:r>
+            <a:r>
+              <a:rPr lang="en-US" dirty="0" err="1"/>
+              <a:t>einsatz</a:t>
+            </a:r>
+            <a:r>
+              <a:rPr lang="en-US" dirty="0"/>
+              <a:t> = 3</a:t>
+            </a:r>
+          </a:p>
+          <a:p>
+            <a:r>
+              <a:rPr lang="en-US" dirty="0" err="1"/>
+              <a:t>Experte</a:t>
+            </a:r>
+            <a:r>
+              <a:rPr lang="en-US" dirty="0"/>
+              <a:t> = 4</a:t>
+            </a:r>
+            <a:endParaRPr lang="en-DE" dirty="0"/>
+          </a:p>
+        </p:txBody>
+      </p:sp>
+    </p:spTree>
+    <p:extLst>
+      <p:ext uri="{BB962C8B-B14F-4D97-AF65-F5344CB8AC3E}">
+        <p14:creationId xmlns:p14="http://schemas.microsoft.com/office/powerpoint/2010/main" val="4250901748"/>
+      </p:ext>
+    </p:extLst>
+  </p:cSld>
+  <p:clrMapOvr>
+    <a:masterClrMapping/>
+  </p:clrMapOvr>
+</p:sld>
+</file>
+
+<file path=ppt/slides/slide3.xml><?xml version="1.0" encoding="utf-8"?>
+<p:sld xmlns:a="http://schemas.openxmlformats.org/drawingml/2006/main" xmlns:r="http://schemas.openxmlformats.org/officeDocument/2006/relationships" xmlns:p="http://schemas.openxmlformats.org/presentationml/2006/main">
+  <p:cSld>
+    <p:bg>
+      <p:bgPr>
+        <a:blipFill>
+          <a:blip r:embed="rId2">
+            <a:duotone>
+              <a:schemeClr val="bg2">
+                <a:shade val="88000"/>
+                <a:hueMod val="106000"/>
+                <a:satMod val="140000"/>
+                <a:lumMod val="54000"/>
+              </a:schemeClr>
+              <a:schemeClr val="bg2">
+                <a:tint val="98000"/>
+                <a:hueMod val="90000"/>
+                <a:satMod val="150000"/>
+                <a:lumMod val="160000"/>
+              </a:schemeClr>
+            </a:duotone>
+          </a:blip>
+          <a:stretch/>
+        </a:blipFill>
+        <a:effectLst/>
+      </p:bgPr>
+    </p:bg>
+    <p:spTree>
+      <p:nvGrpSpPr>
+        <p:cNvPr id="1" name=""/>
+        <p:cNvGrpSpPr/>
+        <p:nvPr/>
+      </p:nvGrpSpPr>
+      <p:grpSpPr>
+        <a:xfrm>
+          <a:off x="0" y="0"/>
+          <a:ext cx="0" cy="0"/>
+          <a:chOff x="0" y="0"/>
+          <a:chExt cx="0" cy="0"/>
+        </a:xfrm>
+      </p:grpSpPr>
+      <p:sp>
+        <p:nvSpPr>
+          <p:cNvPr id="4" name="Title 1">
+            <a:extLst>
+              <a:ext uri="{FF2B5EF4-FFF2-40B4-BE49-F238E27FC236}">
+                <a16:creationId xmlns:a16="http://schemas.microsoft.com/office/drawing/2014/main" id="{C844E9D0-2567-43EF-B03E-E6C593F86298}"/>
+              </a:ext>
+            </a:extLst>
+          </p:cNvPr>
+          <p:cNvSpPr>
+            <a:spLocks noGrp="1"/>
+          </p:cNvSpPr>
+          <p:nvPr>
+            <p:ph type="title"/>
+          </p:nvPr>
+        </p:nvSpPr>
+        <p:spPr>
+          <a:xfrm>
+            <a:off x="1141412" y="618518"/>
+            <a:ext cx="5894387" cy="1478570"/>
+          </a:xfrm>
+        </p:spPr>
+        <p:txBody>
+          <a:bodyPr anchor="b">
+            <a:normAutofit/>
+          </a:bodyPr>
+          <a:lstStyle/>
+          <a:p>
+            <a:r>
+              <a:rPr lang="en-US"/>
+              <a:t>Who</a:t>
+            </a:r>
+            <a:endParaRPr lang="en-US" dirty="0"/>
+          </a:p>
+        </p:txBody>
+      </p:sp>
+      <p:sp>
+        <p:nvSpPr>
+          <p:cNvPr id="5" name="Content Placeholder 2">
+            <a:extLst>
+              <a:ext uri="{FF2B5EF4-FFF2-40B4-BE49-F238E27FC236}">
+                <a16:creationId xmlns:a16="http://schemas.microsoft.com/office/drawing/2014/main" id="{F04B9C7D-1B12-43A0-89A3-792A0E4ED899}"/>
+              </a:ext>
+            </a:extLst>
+          </p:cNvPr>
+          <p:cNvSpPr>
+            <a:spLocks noGrp="1"/>
+          </p:cNvSpPr>
+          <p:nvPr>
+            <p:ph idx="1"/>
+          </p:nvPr>
+        </p:nvSpPr>
+        <p:spPr>
+          <a:xfrm>
+            <a:off x="1141412" y="2249487"/>
+            <a:ext cx="5894388" cy="3541714"/>
+          </a:xfrm>
+        </p:spPr>
+        <p:txBody>
+          <a:bodyPr numCol="2">
+            <a:normAutofit/>
+          </a:bodyPr>
+          <a:lstStyle/>
+          <a:p>
+            <a:pPr>
+              <a:lnSpc>
+                <a:spcPct val="110000"/>
+              </a:lnSpc>
+            </a:pPr>
+            <a:r>
+              <a:rPr lang="en-US" sz="1500"/>
+              <a:t>Sia-Consulting</a:t>
+            </a:r>
+            <a:endParaRPr lang="en-US" sz="1500" dirty="0"/>
+          </a:p>
+          <a:p>
+            <a:pPr lvl="1">
+              <a:lnSpc>
+                <a:spcPct val="110000"/>
+              </a:lnSpc>
+            </a:pPr>
+            <a:r>
+              <a:rPr lang="en-US" sz="1500" dirty="0"/>
+              <a:t>Cloud-Consultancy</a:t>
+            </a:r>
+          </a:p>
+          <a:p>
+            <a:pPr lvl="1">
+              <a:lnSpc>
+                <a:spcPct val="110000"/>
+              </a:lnSpc>
+            </a:pPr>
+            <a:r>
+              <a:rPr lang="en-US" sz="1500" dirty="0"/>
+              <a:t>Developing</a:t>
+            </a:r>
+          </a:p>
+          <a:p>
+            <a:pPr lvl="1">
+              <a:lnSpc>
+                <a:spcPct val="110000"/>
+              </a:lnSpc>
+            </a:pPr>
+            <a:r>
+              <a:rPr lang="en-US" sz="1500" dirty="0"/>
+              <a:t>Trainings</a:t>
+            </a:r>
+          </a:p>
+          <a:p>
+            <a:pPr>
+              <a:lnSpc>
+                <a:spcPct val="110000"/>
+              </a:lnSpc>
+            </a:pPr>
+            <a:endParaRPr lang="en-US" sz="1500" dirty="0"/>
+          </a:p>
+          <a:p>
+            <a:pPr>
+              <a:lnSpc>
+                <a:spcPct val="110000"/>
+              </a:lnSpc>
+            </a:pPr>
+            <a:endParaRPr lang="en-US" sz="1500" dirty="0"/>
+          </a:p>
+          <a:p>
+            <a:pPr>
+              <a:lnSpc>
+                <a:spcPct val="110000"/>
+              </a:lnSpc>
+            </a:pPr>
+            <a:endParaRPr lang="en-US" sz="1500" dirty="0"/>
+          </a:p>
+          <a:p>
+            <a:pPr>
+              <a:lnSpc>
+                <a:spcPct val="110000"/>
+              </a:lnSpc>
+            </a:pPr>
+            <a:endParaRPr lang="en-US" sz="1500" dirty="0"/>
+          </a:p>
+          <a:p>
+            <a:pPr>
+              <a:lnSpc>
+                <a:spcPct val="110000"/>
+              </a:lnSpc>
+            </a:pPr>
+            <a:endParaRPr lang="en-US" sz="1500" dirty="0"/>
+          </a:p>
+          <a:p>
+            <a:pPr>
+              <a:lnSpc>
+                <a:spcPct val="110000"/>
+              </a:lnSpc>
+            </a:pPr>
+            <a:endParaRPr lang="en-US" sz="1500" dirty="0"/>
+          </a:p>
+          <a:p>
+            <a:pPr>
+              <a:lnSpc>
+                <a:spcPct val="110000"/>
+              </a:lnSpc>
+            </a:pPr>
+            <a:r>
+              <a:rPr lang="en-US" sz="1500" dirty="0"/>
+              <a:t>Sia</a:t>
+            </a:r>
+          </a:p>
+          <a:p>
+            <a:pPr lvl="1">
+              <a:lnSpc>
+                <a:spcPct val="110000"/>
+              </a:lnSpc>
+            </a:pPr>
+            <a:r>
+              <a:rPr lang="en-US" sz="1500" dirty="0" err="1"/>
+              <a:t>Softwaredeveloper</a:t>
+            </a:r>
+            <a:r>
+              <a:rPr lang="en-US" sz="1500" dirty="0"/>
+              <a:t> and –architect</a:t>
+            </a:r>
+          </a:p>
+          <a:p>
+            <a:pPr lvl="1">
+              <a:lnSpc>
+                <a:spcPct val="110000"/>
+              </a:lnSpc>
+            </a:pPr>
+            <a:r>
+              <a:rPr lang="en-US" sz="1500" dirty="0"/>
+              <a:t>Microsoft Azure MVP</a:t>
+            </a:r>
+          </a:p>
+          <a:p>
+            <a:pPr lvl="1">
+              <a:lnSpc>
+                <a:spcPct val="110000"/>
+              </a:lnSpc>
+            </a:pPr>
+            <a:r>
+              <a:rPr lang="en-US" sz="1500" dirty="0"/>
+              <a:t>Co-</a:t>
+            </a:r>
+            <a:r>
+              <a:rPr lang="en-US" sz="1500" dirty="0" err="1"/>
+              <a:t>Organisator</a:t>
+            </a:r>
+            <a:r>
+              <a:rPr lang="en-US" sz="1500" dirty="0"/>
+              <a:t> Meetup Hamburg</a:t>
+            </a:r>
+          </a:p>
+          <a:p>
+            <a:pPr lvl="1">
+              <a:lnSpc>
+                <a:spcPct val="110000"/>
+              </a:lnSpc>
+            </a:pPr>
+            <a:r>
+              <a:rPr lang="en-US" sz="1500" dirty="0"/>
+              <a:t>@DerSia</a:t>
+            </a:r>
+          </a:p>
+        </p:txBody>
+      </p:sp>
+      <p:pic>
+        <p:nvPicPr>
+          <p:cNvPr id="7" name="Picture 6" descr="A person posing for the camera&#10;&#10;Description automatically generated">
+            <a:extLst>
+              <a:ext uri="{FF2B5EF4-FFF2-40B4-BE49-F238E27FC236}">
+                <a16:creationId xmlns:a16="http://schemas.microsoft.com/office/drawing/2014/main" id="{8ED723E1-48B3-430D-9AC8-A04B2122E6DF}"/>
+              </a:ext>
+            </a:extLst>
+          </p:cNvPr>
+          <p:cNvPicPr>
+            <a:picLocks noChangeAspect="1"/>
+          </p:cNvPicPr>
+          <p:nvPr/>
+        </p:nvPicPr>
+        <p:blipFill rotWithShape="1">
+          <a:blip r:embed="rId3"/>
+          <a:srcRect l="14618" r="14619" b="1"/>
+          <a:stretch/>
+        </p:blipFill>
+        <p:spPr>
+          <a:xfrm>
+            <a:off x="7619998" y="780235"/>
+            <a:ext cx="3425199" cy="4840332"/>
+          </a:xfrm>
+          <a:prstGeom prst="round2DiagRect">
+            <a:avLst>
+              <a:gd name="adj1" fmla="val 4860"/>
+              <a:gd name="adj2" fmla="val 0"/>
+            </a:avLst>
+          </a:prstGeom>
+          <a:ln w="19050" cap="sq">
+            <a:solidFill>
+              <a:schemeClr val="tx2">
+                <a:lumMod val="60000"/>
+                <a:lumOff val="40000"/>
+                <a:alpha val="60000"/>
+              </a:schemeClr>
+            </a:solidFill>
+            <a:miter lim="800000"/>
+          </a:ln>
+          <a:effectLst>
+            <a:outerShdw blurRad="88900" dist="38100" dir="5400000" algn="t" rotWithShape="0">
+              <a:prstClr val="black">
+                <a:alpha val="40000"/>
+              </a:prstClr>
+            </a:outerShdw>
+          </a:effectLst>
+        </p:spPr>
+      </p:pic>
+    </p:spTree>
+    <p:extLst>
+      <p:ext uri="{BB962C8B-B14F-4D97-AF65-F5344CB8AC3E}">
+        <p14:creationId xmlns:p14="http://schemas.microsoft.com/office/powerpoint/2010/main" val="204968733"/>
+      </p:ext>
+    </p:extLst>
+  </p:cSld>
+  <p:clrMapOvr>
+    <a:masterClrMapping/>
+  </p:clrMapOvr>
+</p:sld>
+</file>
+
+<file path=ppt/slides/slide4.xml><?xml version="1.0" encoding="utf-8"?>
 <p:sld xmlns:a="http://schemas.openxmlformats.org/drawingml/2006/main" xmlns:r="http://schemas.openxmlformats.org/officeDocument/2006/relationships" xmlns:p="http://schemas.openxmlformats.org/presentationml/2006/main">
   <p:cSld>
     <p:spTree>
@@ -33954,7 +34889,7 @@
 </p:sld>
 </file>
 
-<file path=ppt/slides/slide3.xml><?xml version="1.0" encoding="utf-8"?>
+<file path=ppt/slides/slide5.xml><?xml version="1.0" encoding="utf-8"?>
 <p:sld xmlns:a="http://schemas.openxmlformats.org/drawingml/2006/main" xmlns:r="http://schemas.openxmlformats.org/officeDocument/2006/relationships" xmlns:p="http://schemas.openxmlformats.org/presentationml/2006/main">
   <p:cSld>
     <p:spTree>
@@ -34095,7 +35030,7 @@
 </p:sld>
 </file>
 
-<file path=ppt/slides/slide4.xml><?xml version="1.0" encoding="utf-8"?>
+<file path=ppt/slides/slide6.xml><?xml version="1.0" encoding="utf-8"?>
 <p:sld xmlns:a="http://schemas.openxmlformats.org/drawingml/2006/main" xmlns:r="http://schemas.openxmlformats.org/officeDocument/2006/relationships" xmlns:p="http://schemas.openxmlformats.org/presentationml/2006/main">
   <p:cSld>
     <p:spTree>
@@ -34256,7 +35191,7 @@
 </p:sld>
 </file>
 
-<file path=ppt/slides/slide5.xml><?xml version="1.0" encoding="utf-8"?>
+<file path=ppt/slides/slide7.xml><?xml version="1.0" encoding="utf-8"?>
 <p:sld xmlns:a="http://schemas.openxmlformats.org/drawingml/2006/main" xmlns:r="http://schemas.openxmlformats.org/officeDocument/2006/relationships" xmlns:p="http://schemas.openxmlformats.org/presentationml/2006/main">
   <p:cSld>
     <p:spTree>
@@ -34367,7 +35302,7 @@
 </p:sld>
 </file>
 
-<file path=ppt/slides/slide6.xml><?xml version="1.0" encoding="utf-8"?>
+<file path=ppt/slides/slide8.xml><?xml version="1.0" encoding="utf-8"?>
 <p:sld xmlns:a="http://schemas.openxmlformats.org/drawingml/2006/main" xmlns:r="http://schemas.openxmlformats.org/officeDocument/2006/relationships" xmlns:p="http://schemas.openxmlformats.org/presentationml/2006/main">
   <p:cSld>
     <p:spTree>
@@ -34643,7 +35578,7 @@
 </p:sld>
 </file>
 
-<file path=ppt/slides/slide7.xml><?xml version="1.0" encoding="utf-8"?>
+<file path=ppt/slides/slide9.xml><?xml version="1.0" encoding="utf-8"?>
 <p:sld xmlns:a="http://schemas.openxmlformats.org/drawingml/2006/main" xmlns:r="http://schemas.openxmlformats.org/officeDocument/2006/relationships" xmlns:p="http://schemas.openxmlformats.org/presentationml/2006/main">
   <p:cSld>
     <p:spTree>
@@ -34844,461 +35779,6 @@
     <p:extLst>
       <p:ext uri="{BB962C8B-B14F-4D97-AF65-F5344CB8AC3E}">
         <p14:creationId xmlns:p14="http://schemas.microsoft.com/office/powerpoint/2010/main" val="2513190015"/>
-      </p:ext>
-    </p:extLst>
-  </p:cSld>
-  <p:clrMapOvr>
-    <a:masterClrMapping/>
-  </p:clrMapOvr>
-</p:sld>
-</file>
-
-<file path=ppt/slides/slide8.xml><?xml version="1.0" encoding="utf-8"?>
-<p:sld xmlns:a="http://schemas.openxmlformats.org/drawingml/2006/main" xmlns:r="http://schemas.openxmlformats.org/officeDocument/2006/relationships" xmlns:p="http://schemas.openxmlformats.org/presentationml/2006/main">
-  <p:cSld>
-    <p:spTree>
-      <p:nvGrpSpPr>
-        <p:cNvPr id="1" name=""/>
-        <p:cNvGrpSpPr/>
-        <p:nvPr/>
-      </p:nvGrpSpPr>
-      <p:grpSpPr>
-        <a:xfrm>
-          <a:off x="0" y="0"/>
-          <a:ext cx="0" cy="0"/>
-          <a:chOff x="0" y="0"/>
-          <a:chExt cx="0" cy="0"/>
-        </a:xfrm>
-      </p:grpSpPr>
-      <p:sp>
-        <p:nvSpPr>
-          <p:cNvPr id="2" name="Title 1">
-            <a:extLst>
-              <a:ext uri="{FF2B5EF4-FFF2-40B4-BE49-F238E27FC236}">
-                <a16:creationId xmlns:a16="http://schemas.microsoft.com/office/drawing/2014/main" id="{18AB1DAC-28FD-4282-8843-E1A4E19CA250}"/>
-              </a:ext>
-            </a:extLst>
-          </p:cNvPr>
-          <p:cNvSpPr>
-            <a:spLocks noGrp="1"/>
-          </p:cNvSpPr>
-          <p:nvPr>
-            <p:ph type="title"/>
-          </p:nvPr>
-        </p:nvSpPr>
-        <p:spPr/>
-        <p:txBody>
-          <a:bodyPr/>
-          <a:lstStyle/>
-          <a:p>
-            <a:r>
-              <a:rPr lang="en-CA" dirty="0"/>
-              <a:t>Azure Functions V2</a:t>
-            </a:r>
-            <a:br>
-              <a:rPr lang="en-CA" dirty="0"/>
-            </a:br>
-            <a:r>
-              <a:rPr lang="en-CA" dirty="0"/>
-              <a:t>(Preview)</a:t>
-            </a:r>
-            <a:endParaRPr lang="en-US" dirty="0"/>
-          </a:p>
-        </p:txBody>
-      </p:sp>
-      <p:sp>
-        <p:nvSpPr>
-          <p:cNvPr id="4" name="Text Placeholder 3">
-            <a:extLst>
-              <a:ext uri="{FF2B5EF4-FFF2-40B4-BE49-F238E27FC236}">
-                <a16:creationId xmlns:a16="http://schemas.microsoft.com/office/drawing/2014/main" id="{CB63142D-9E34-42D0-917A-37D57039C7BF}"/>
-              </a:ext>
-            </a:extLst>
-          </p:cNvPr>
-          <p:cNvSpPr>
-            <a:spLocks noGrp="1"/>
-          </p:cNvSpPr>
-          <p:nvPr>
-            <p:ph type="body" idx="1"/>
-          </p:nvPr>
-        </p:nvSpPr>
-        <p:spPr/>
-        <p:txBody>
-          <a:bodyPr/>
-          <a:lstStyle/>
-          <a:p>
-            <a:r>
-              <a:rPr lang="en-US" dirty="0"/>
-              <a:t>Features</a:t>
-            </a:r>
-          </a:p>
-        </p:txBody>
-      </p:sp>
-      <p:sp>
-        <p:nvSpPr>
-          <p:cNvPr id="3" name="Content Placeholder 2">
-            <a:extLst>
-              <a:ext uri="{FF2B5EF4-FFF2-40B4-BE49-F238E27FC236}">
-                <a16:creationId xmlns:a16="http://schemas.microsoft.com/office/drawing/2014/main" id="{6633C9AC-D137-4511-8049-664F9776374C}"/>
-              </a:ext>
-            </a:extLst>
-          </p:cNvPr>
-          <p:cNvSpPr>
-            <a:spLocks noGrp="1"/>
-          </p:cNvSpPr>
-          <p:nvPr>
-            <p:ph sz="half" idx="2"/>
-          </p:nvPr>
-        </p:nvSpPr>
-        <p:spPr/>
-        <p:txBody>
-          <a:bodyPr/>
-          <a:lstStyle/>
-          <a:p>
-            <a:r>
-              <a:rPr lang="en-CA" dirty="0"/>
-              <a:t>BYOB</a:t>
-            </a:r>
-          </a:p>
-          <a:p>
-            <a:r>
-              <a:rPr lang="en-CA" dirty="0"/>
-              <a:t>.NET Core</a:t>
-            </a:r>
-            <a:endParaRPr lang="en-US" dirty="0"/>
-          </a:p>
-        </p:txBody>
-      </p:sp>
-      <p:sp>
-        <p:nvSpPr>
-          <p:cNvPr id="5" name="Text Placeholder 4">
-            <a:extLst>
-              <a:ext uri="{FF2B5EF4-FFF2-40B4-BE49-F238E27FC236}">
-                <a16:creationId xmlns:a16="http://schemas.microsoft.com/office/drawing/2014/main" id="{24C403BB-4441-47E9-BBFE-2381C6D74FD1}"/>
-              </a:ext>
-            </a:extLst>
-          </p:cNvPr>
-          <p:cNvSpPr>
-            <a:spLocks noGrp="1"/>
-          </p:cNvSpPr>
-          <p:nvPr>
-            <p:ph type="body" sz="quarter" idx="3"/>
-          </p:nvPr>
-        </p:nvSpPr>
-        <p:spPr/>
-        <p:txBody>
-          <a:bodyPr/>
-          <a:lstStyle/>
-          <a:p>
-            <a:r>
-              <a:rPr lang="en-US" dirty="0"/>
-              <a:t>Cons</a:t>
-            </a:r>
-          </a:p>
-        </p:txBody>
-      </p:sp>
-      <p:sp>
-        <p:nvSpPr>
-          <p:cNvPr id="6" name="Content Placeholder 5">
-            <a:extLst>
-              <a:ext uri="{FF2B5EF4-FFF2-40B4-BE49-F238E27FC236}">
-                <a16:creationId xmlns:a16="http://schemas.microsoft.com/office/drawing/2014/main" id="{6C9924E9-A97B-4F11-A165-D504723393D2}"/>
-              </a:ext>
-            </a:extLst>
-          </p:cNvPr>
-          <p:cNvSpPr>
-            <a:spLocks noGrp="1"/>
-          </p:cNvSpPr>
-          <p:nvPr>
-            <p:ph sz="quarter" idx="4"/>
-          </p:nvPr>
-        </p:nvSpPr>
-        <p:spPr/>
-        <p:txBody>
-          <a:bodyPr/>
-          <a:lstStyle/>
-          <a:p>
-            <a:r>
-              <a:rPr lang="en-US" dirty="0"/>
-              <a:t>The Steffen-Issue</a:t>
-            </a:r>
-          </a:p>
-          <a:p>
-            <a:r>
-              <a:rPr lang="en-US" dirty="0"/>
-              <a:t>Limited on a few assemblies that are needed in a specific version by core</a:t>
-            </a:r>
-          </a:p>
-          <a:p>
-            <a:r>
-              <a:rPr lang="en-US" dirty="0"/>
-              <a:t>Less supported Languages*</a:t>
-            </a:r>
-          </a:p>
-        </p:txBody>
-      </p:sp>
-    </p:spTree>
-    <p:extLst>
-      <p:ext uri="{BB962C8B-B14F-4D97-AF65-F5344CB8AC3E}">
-        <p14:creationId xmlns:p14="http://schemas.microsoft.com/office/powerpoint/2010/main" val="3241859040"/>
-      </p:ext>
-    </p:extLst>
-  </p:cSld>
-  <p:clrMapOvr>
-    <a:masterClrMapping/>
-  </p:clrMapOvr>
-</p:sld>
-</file>
-
-<file path=ppt/slides/slide9.xml><?xml version="1.0" encoding="utf-8"?>
-<p:sld xmlns:a="http://schemas.openxmlformats.org/drawingml/2006/main" xmlns:r="http://schemas.openxmlformats.org/officeDocument/2006/relationships" xmlns:p="http://schemas.openxmlformats.org/presentationml/2006/main">
-  <p:cSld>
-    <p:spTree>
-      <p:nvGrpSpPr>
-        <p:cNvPr id="1" name=""/>
-        <p:cNvGrpSpPr/>
-        <p:nvPr/>
-      </p:nvGrpSpPr>
-      <p:grpSpPr>
-        <a:xfrm>
-          <a:off x="0" y="0"/>
-          <a:ext cx="0" cy="0"/>
-          <a:chOff x="0" y="0"/>
-          <a:chExt cx="0" cy="0"/>
-        </a:xfrm>
-      </p:grpSpPr>
-      <p:sp>
-        <p:nvSpPr>
-          <p:cNvPr id="2" name="Title 1">
-            <a:extLst>
-              <a:ext uri="{FF2B5EF4-FFF2-40B4-BE49-F238E27FC236}">
-                <a16:creationId xmlns:a16="http://schemas.microsoft.com/office/drawing/2014/main" id="{9EB7865A-211F-49C6-B670-6F4B13612BDA}"/>
-              </a:ext>
-            </a:extLst>
-          </p:cNvPr>
-          <p:cNvSpPr>
-            <a:spLocks noGrp="1"/>
-          </p:cNvSpPr>
-          <p:nvPr>
-            <p:ph type="title"/>
-          </p:nvPr>
-        </p:nvSpPr>
-        <p:spPr/>
-        <p:txBody>
-          <a:bodyPr/>
-          <a:lstStyle/>
-          <a:p>
-            <a:r>
-              <a:rPr lang="en-CA" dirty="0"/>
-              <a:t>Azure Functions </a:t>
-            </a:r>
-            <a:r>
-              <a:rPr lang="en-CA" cap="none" dirty="0"/>
-              <a:t>V2 (GA)</a:t>
-            </a:r>
-            <a:endParaRPr lang="en-US" dirty="0"/>
-          </a:p>
-        </p:txBody>
-      </p:sp>
-      <p:sp>
-        <p:nvSpPr>
-          <p:cNvPr id="6" name="Text Placeholder 5">
-            <a:extLst>
-              <a:ext uri="{FF2B5EF4-FFF2-40B4-BE49-F238E27FC236}">
-                <a16:creationId xmlns:a16="http://schemas.microsoft.com/office/drawing/2014/main" id="{DB589ECB-D9BD-4DCF-966C-7219F454B873}"/>
-              </a:ext>
-            </a:extLst>
-          </p:cNvPr>
-          <p:cNvSpPr>
-            <a:spLocks noGrp="1"/>
-          </p:cNvSpPr>
-          <p:nvPr>
-            <p:ph type="body" idx="1"/>
-          </p:nvPr>
-        </p:nvSpPr>
-        <p:spPr/>
-        <p:txBody>
-          <a:bodyPr/>
-          <a:lstStyle/>
-          <a:p>
-            <a:r>
-              <a:rPr lang="en-US" dirty="0"/>
-              <a:t>Features</a:t>
-            </a:r>
-          </a:p>
-        </p:txBody>
-      </p:sp>
-      <p:sp>
-        <p:nvSpPr>
-          <p:cNvPr id="3" name="Content Placeholder 2">
-            <a:extLst>
-              <a:ext uri="{FF2B5EF4-FFF2-40B4-BE49-F238E27FC236}">
-                <a16:creationId xmlns:a16="http://schemas.microsoft.com/office/drawing/2014/main" id="{2734AA78-7D5D-4F99-A2D7-3F0F01B2E7F1}"/>
-              </a:ext>
-            </a:extLst>
-          </p:cNvPr>
-          <p:cNvSpPr>
-            <a:spLocks noGrp="1"/>
-          </p:cNvSpPr>
-          <p:nvPr>
-            <p:ph sz="half" idx="2"/>
-          </p:nvPr>
-        </p:nvSpPr>
-        <p:spPr/>
-        <p:txBody>
-          <a:bodyPr>
-            <a:normAutofit fontScale="62500" lnSpcReduction="20000"/>
-          </a:bodyPr>
-          <a:lstStyle/>
-          <a:p>
-            <a:r>
-              <a:rPr lang="en-CA" dirty="0"/>
-              <a:t>Out-of-Proc Worker (</a:t>
-            </a:r>
-            <a:r>
-              <a:rPr lang="en-CA" dirty="0" err="1"/>
-              <a:t>gRPC</a:t>
-            </a:r>
-            <a:r>
-              <a:rPr lang="en-CA" dirty="0"/>
-              <a:t>) for JavaScript</a:t>
-            </a:r>
-          </a:p>
-          <a:p>
-            <a:r>
-              <a:rPr lang="en-CA" dirty="0"/>
-              <a:t>Supported Languages (</a:t>
-            </a:r>
-            <a:r>
-              <a:rPr lang="en-CA" dirty="0" err="1"/>
-              <a:t>ooproc</a:t>
-            </a:r>
-            <a:r>
-              <a:rPr lang="en-CA" dirty="0"/>
-              <a:t>): Node.js, Java, Golang, Python</a:t>
-            </a:r>
-          </a:p>
-          <a:p>
-            <a:r>
-              <a:rPr lang="en-CA" dirty="0"/>
-              <a:t>Docker Support</a:t>
-            </a:r>
-          </a:p>
-          <a:p>
-            <a:r>
-              <a:rPr lang="en-CA" dirty="0"/>
-              <a:t>Better Scaling</a:t>
-            </a:r>
-          </a:p>
-          <a:p>
-            <a:r>
-              <a:rPr lang="en-CA" dirty="0"/>
-              <a:t>Better Performance</a:t>
-            </a:r>
-          </a:p>
-          <a:p>
-            <a:r>
-              <a:rPr lang="en-CA" dirty="0"/>
-              <a:t>Host runs on Service Fabric Mesh*</a:t>
-            </a:r>
-          </a:p>
-          <a:p>
-            <a:r>
-              <a:rPr lang="en-CA" dirty="0"/>
-              <a:t>New </a:t>
-            </a:r>
-            <a:r>
-              <a:rPr lang="en-CA" dirty="0" err="1"/>
-              <a:t>host.json</a:t>
-            </a:r>
-            <a:r>
-              <a:rPr lang="en-CA" dirty="0"/>
-              <a:t> (V2)</a:t>
-            </a:r>
-            <a:endParaRPr lang="en-US" dirty="0"/>
-          </a:p>
-        </p:txBody>
-      </p:sp>
-      <p:sp>
-        <p:nvSpPr>
-          <p:cNvPr id="7" name="Text Placeholder 6">
-            <a:extLst>
-              <a:ext uri="{FF2B5EF4-FFF2-40B4-BE49-F238E27FC236}">
-                <a16:creationId xmlns:a16="http://schemas.microsoft.com/office/drawing/2014/main" id="{679F4E80-9B0F-4F55-B4E8-11388F67E588}"/>
-              </a:ext>
-            </a:extLst>
-          </p:cNvPr>
-          <p:cNvSpPr>
-            <a:spLocks noGrp="1"/>
-          </p:cNvSpPr>
-          <p:nvPr>
-            <p:ph type="body" sz="quarter" idx="3"/>
-          </p:nvPr>
-        </p:nvSpPr>
-        <p:spPr/>
-        <p:txBody>
-          <a:bodyPr/>
-          <a:lstStyle/>
-          <a:p>
-            <a:r>
-              <a:rPr lang="en-US" dirty="0"/>
-              <a:t>CONS</a:t>
-            </a:r>
-          </a:p>
-        </p:txBody>
-      </p:sp>
-      <p:sp>
-        <p:nvSpPr>
-          <p:cNvPr id="8" name="Content Placeholder 7">
-            <a:extLst>
-              <a:ext uri="{FF2B5EF4-FFF2-40B4-BE49-F238E27FC236}">
-                <a16:creationId xmlns:a16="http://schemas.microsoft.com/office/drawing/2014/main" id="{6AE6B0FC-6B08-483E-A783-84F151D2DE7B}"/>
-              </a:ext>
-            </a:extLst>
-          </p:cNvPr>
-          <p:cNvSpPr>
-            <a:spLocks noGrp="1"/>
-          </p:cNvSpPr>
-          <p:nvPr>
-            <p:ph sz="quarter" idx="4"/>
-          </p:nvPr>
-        </p:nvSpPr>
-        <p:spPr/>
-        <p:txBody>
-          <a:bodyPr>
-            <a:normAutofit fontScale="62500" lnSpcReduction="20000"/>
-          </a:bodyPr>
-          <a:lstStyle/>
-          <a:p>
-            <a:r>
-              <a:rPr lang="en-US" dirty="0"/>
-              <a:t>The Steffen-Issue</a:t>
-            </a:r>
-          </a:p>
-          <a:p>
-            <a:r>
-              <a:rPr lang="en-US" dirty="0"/>
-              <a:t>Breaking Changes to V2 Preview</a:t>
-            </a:r>
-          </a:p>
-          <a:p>
-            <a:r>
-              <a:rPr lang="en-US" dirty="0"/>
-              <a:t>C#/F# Worker still In-Proc</a:t>
-            </a:r>
-          </a:p>
-          <a:p>
-            <a:r>
-              <a:rPr lang="en-US" dirty="0"/>
-              <a:t>Only one language per Function App supported</a:t>
-            </a:r>
-          </a:p>
-        </p:txBody>
-      </p:sp>
-    </p:spTree>
-    <p:extLst>
-      <p:ext uri="{BB962C8B-B14F-4D97-AF65-F5344CB8AC3E}">
-        <p14:creationId xmlns:p14="http://schemas.microsoft.com/office/powerpoint/2010/main" val="2310348885"/>
       </p:ext>
     </p:extLst>
   </p:cSld>

</xml_diff>